<commit_message>
"done week 5 for plat tech"
</commit_message>
<xml_diff>
--- a/Platform Technologies/Midterm/Week 3/Lecture/Chapter 3-Basic Linux  Command.pptx
+++ b/Platform Technologies/Midterm/Week 3/Lecture/Chapter 3-Basic Linux  Command.pptx
@@ -224,7 +224,7 @@
           <a:p>
             <a:fld id="{59041DB8-B66F-4DC8-A96E-33677E0F90FF}" type="datetimeFigureOut">
               <a:rPr lang="en-US" smtClean="0"/>
-              <a:t>7/18/2025</a:t>
+              <a:t>7/19/2025</a:t>
             </a:fld>
             <a:endParaRPr lang="en-US"/>
           </a:p>
@@ -389,7 +389,7 @@
           <a:p>
             <a:fld id="{DEB49C4A-65AC-492D-9701-81B46C3AD0E4}" type="datetimeFigureOut">
               <a:rPr lang="en-US" smtClean="0"/>
-              <a:t>7/18/2025</a:t>
+              <a:t>7/19/2025</a:t>
             </a:fld>
             <a:endParaRPr lang="en-US"/>
           </a:p>
@@ -700,6 +700,61 @@
           <a:bodyPr/>
           <a:lstStyle/>
           <a:p>
+            <a:pPr marL="0" marR="0" lvl="0" indent="0" algn="l" defTabSz="914400" rtl="0" eaLnBrk="1" fontAlgn="auto" latinLnBrk="0" hangingPunct="1">
+              <a:lnSpc>
+                <a:spcPct val="100000"/>
+              </a:lnSpc>
+              <a:spcBef>
+                <a:spcPts val="0"/>
+              </a:spcBef>
+              <a:spcAft>
+                <a:spcPts val="0"/>
+              </a:spcAft>
+              <a:buClrTx/>
+              <a:buSzTx/>
+              <a:buFontTx/>
+              <a:buNone/>
+              <a:tabLst/>
+              <a:defRPr/>
+            </a:pPr>
+            <a:r>
+              <a:rPr lang="es-ES" dirty="0"/>
+              <a:t>sudo </a:t>
+            </a:r>
+            <a:r>
+              <a:rPr lang="es-ES" dirty="0" err="1"/>
+              <a:t>apt</a:t>
+            </a:r>
+            <a:r>
+              <a:rPr lang="es-ES" dirty="0"/>
+              <a:t> </a:t>
+            </a:r>
+            <a:r>
+              <a:rPr lang="es-ES" dirty="0" err="1"/>
+              <a:t>update</a:t>
+            </a:r>
+            <a:r>
+              <a:rPr lang="es-ES" dirty="0"/>
+              <a:t> &amp;&amp; sudo </a:t>
+            </a:r>
+            <a:r>
+              <a:rPr lang="es-ES" dirty="0" err="1"/>
+              <a:t>apt</a:t>
+            </a:r>
+            <a:r>
+              <a:rPr lang="es-ES" dirty="0"/>
+              <a:t> </a:t>
+            </a:r>
+            <a:r>
+              <a:rPr lang="es-ES" dirty="0" err="1"/>
+              <a:t>upgrade</a:t>
+            </a:r>
+            <a:r>
+              <a:rPr lang="es-ES"/>
+              <a:t> -y</a:t>
+            </a:r>
+          </a:p>
+          <a:p>
             <a:endParaRPr lang="en-US"/>
           </a:p>
         </p:txBody>
@@ -711,7 +766,7 @@
             <a:spLocks noGrp="1"/>
           </p:cNvSpPr>
           <p:nvPr>
-            <p:ph type="sldNum" sz="quarter" idx="10"/>
+            <p:ph type="sldNum" sz="quarter" idx="5"/>
           </p:nvPr>
         </p:nvSpPr>
         <p:spPr/>
@@ -721,7 +776,7 @@
           <a:p>
             <a:fld id="{82869989-EB00-4EE7-BCB5-25BDC5BB29F8}" type="slidenum">
               <a:rPr lang="en-US" smtClean="0"/>
-              <a:t>2</a:t>
+              <a:t>1</a:t>
             </a:fld>
             <a:endParaRPr lang="en-US"/>
           </a:p>
@@ -730,7 +785,91 @@
     </p:spTree>
     <p:extLst>
       <p:ext uri="{BB962C8B-B14F-4D97-AF65-F5344CB8AC3E}">
-        <p14:creationId xmlns:p14="http://schemas.microsoft.com/office/powerpoint/2010/main" val="1980303916"/>
+        <p14:creationId xmlns:p14="http://schemas.microsoft.com/office/powerpoint/2010/main" val="1687417482"/>
+      </p:ext>
+    </p:extLst>
+  </p:cSld>
+  <p:clrMapOvr>
+    <a:masterClrMapping/>
+  </p:clrMapOvr>
+</p:notes>
+</file>
+
+<file path=ppt/notesSlides/notesSlide10.xml><?xml version="1.0" encoding="utf-8"?>
+<p:notes xmlns:a="http://schemas.openxmlformats.org/drawingml/2006/main" xmlns:r="http://schemas.openxmlformats.org/officeDocument/2006/relationships" xmlns:p="http://schemas.openxmlformats.org/presentationml/2006/main">
+  <p:cSld>
+    <p:spTree>
+      <p:nvGrpSpPr>
+        <p:cNvPr id="1" name=""/>
+        <p:cNvGrpSpPr/>
+        <p:nvPr/>
+      </p:nvGrpSpPr>
+      <p:grpSpPr>
+        <a:xfrm>
+          <a:off x="0" y="0"/>
+          <a:ext cx="0" cy="0"/>
+          <a:chOff x="0" y="0"/>
+          <a:chExt cx="0" cy="0"/>
+        </a:xfrm>
+      </p:grpSpPr>
+      <p:sp>
+        <p:nvSpPr>
+          <p:cNvPr id="2" name="Slide Image Placeholder 1"/>
+          <p:cNvSpPr>
+            <a:spLocks noGrp="1" noRot="1" noChangeAspect="1"/>
+          </p:cNvSpPr>
+          <p:nvPr>
+            <p:ph type="sldImg"/>
+          </p:nvPr>
+        </p:nvSpPr>
+        <p:spPr/>
+      </p:sp>
+      <p:sp>
+        <p:nvSpPr>
+          <p:cNvPr id="3" name="Notes Placeholder 2"/>
+          <p:cNvSpPr>
+            <a:spLocks noGrp="1"/>
+          </p:cNvSpPr>
+          <p:nvPr>
+            <p:ph type="body" idx="1"/>
+          </p:nvPr>
+        </p:nvSpPr>
+        <p:spPr/>
+        <p:txBody>
+          <a:bodyPr/>
+          <a:lstStyle/>
+          <a:p>
+            <a:endParaRPr lang="en-US"/>
+          </a:p>
+        </p:txBody>
+      </p:sp>
+      <p:sp>
+        <p:nvSpPr>
+          <p:cNvPr id="4" name="Slide Number Placeholder 3"/>
+          <p:cNvSpPr>
+            <a:spLocks noGrp="1"/>
+          </p:cNvSpPr>
+          <p:nvPr>
+            <p:ph type="sldNum" sz="quarter" idx="5"/>
+          </p:nvPr>
+        </p:nvSpPr>
+        <p:spPr/>
+        <p:txBody>
+          <a:bodyPr/>
+          <a:lstStyle/>
+          <a:p>
+            <a:fld id="{82869989-EB00-4EE7-BCB5-25BDC5BB29F8}" type="slidenum">
+              <a:rPr lang="en-US" smtClean="0"/>
+              <a:t>11</a:t>
+            </a:fld>
+            <a:endParaRPr lang="en-US"/>
+          </a:p>
+        </p:txBody>
+      </p:sp>
+    </p:spTree>
+    <p:extLst>
+      <p:ext uri="{BB962C8B-B14F-4D97-AF65-F5344CB8AC3E}">
+        <p14:creationId xmlns:p14="http://schemas.microsoft.com/office/powerpoint/2010/main" val="1277556596"/>
       </p:ext>
     </p:extLst>
   </p:cSld>
@@ -784,6 +923,90 @@
           <a:bodyPr/>
           <a:lstStyle/>
           <a:p>
+            <a:endParaRPr lang="en-US"/>
+          </a:p>
+        </p:txBody>
+      </p:sp>
+      <p:sp>
+        <p:nvSpPr>
+          <p:cNvPr id="4" name="Slide Number Placeholder 3"/>
+          <p:cNvSpPr>
+            <a:spLocks noGrp="1"/>
+          </p:cNvSpPr>
+          <p:nvPr>
+            <p:ph type="sldNum" sz="quarter" idx="10"/>
+          </p:nvPr>
+        </p:nvSpPr>
+        <p:spPr/>
+        <p:txBody>
+          <a:bodyPr/>
+          <a:lstStyle/>
+          <a:p>
+            <a:fld id="{82869989-EB00-4EE7-BCB5-25BDC5BB29F8}" type="slidenum">
+              <a:rPr lang="en-US" smtClean="0"/>
+              <a:t>2</a:t>
+            </a:fld>
+            <a:endParaRPr lang="en-US"/>
+          </a:p>
+        </p:txBody>
+      </p:sp>
+    </p:spTree>
+    <p:extLst>
+      <p:ext uri="{BB962C8B-B14F-4D97-AF65-F5344CB8AC3E}">
+        <p14:creationId xmlns:p14="http://schemas.microsoft.com/office/powerpoint/2010/main" val="1980303916"/>
+      </p:ext>
+    </p:extLst>
+  </p:cSld>
+  <p:clrMapOvr>
+    <a:masterClrMapping/>
+  </p:clrMapOvr>
+</p:notes>
+</file>
+
+<file path=ppt/notesSlides/notesSlide3.xml><?xml version="1.0" encoding="utf-8"?>
+<p:notes xmlns:a="http://schemas.openxmlformats.org/drawingml/2006/main" xmlns:r="http://schemas.openxmlformats.org/officeDocument/2006/relationships" xmlns:p="http://schemas.openxmlformats.org/presentationml/2006/main">
+  <p:cSld>
+    <p:spTree>
+      <p:nvGrpSpPr>
+        <p:cNvPr id="1" name=""/>
+        <p:cNvGrpSpPr/>
+        <p:nvPr/>
+      </p:nvGrpSpPr>
+      <p:grpSpPr>
+        <a:xfrm>
+          <a:off x="0" y="0"/>
+          <a:ext cx="0" cy="0"/>
+          <a:chOff x="0" y="0"/>
+          <a:chExt cx="0" cy="0"/>
+        </a:xfrm>
+      </p:grpSpPr>
+      <p:sp>
+        <p:nvSpPr>
+          <p:cNvPr id="2" name="Slide Image Placeholder 1"/>
+          <p:cNvSpPr>
+            <a:spLocks noGrp="1" noRot="1" noChangeAspect="1"/>
+          </p:cNvSpPr>
+          <p:nvPr>
+            <p:ph type="sldImg"/>
+          </p:nvPr>
+        </p:nvSpPr>
+        <p:spPr/>
+      </p:sp>
+      <p:sp>
+        <p:nvSpPr>
+          <p:cNvPr id="3" name="Notes Placeholder 2"/>
+          <p:cNvSpPr>
+            <a:spLocks noGrp="1"/>
+          </p:cNvSpPr>
+          <p:nvPr>
+            <p:ph type="body" idx="1"/>
+          </p:nvPr>
+        </p:nvSpPr>
+        <p:spPr/>
+        <p:txBody>
+          <a:bodyPr/>
+          <a:lstStyle/>
+          <a:p>
             <a:r>
               <a:rPr lang="en-US" dirty="0"/>
               <a:t>Linux is a powerful OS known for stability and flexibility. Unlike Windows, it's open-source, meaning anyone can modify and distribute it. It's the backbone of most web servers and cloud systems. It uses a command-line interface (CLI) for many tasks, especially for administrators and developers.</a:t>
@@ -827,7 +1050,7 @@
 </p:notes>
 </file>
 
-<file path=ppt/notesSlides/notesSlide3.xml><?xml version="1.0" encoding="utf-8"?>
+<file path=ppt/notesSlides/notesSlide4.xml><?xml version="1.0" encoding="utf-8"?>
 <p:notes xmlns:a="http://schemas.openxmlformats.org/drawingml/2006/main" xmlns:r="http://schemas.openxmlformats.org/officeDocument/2006/relationships" xmlns:p="http://schemas.openxmlformats.org/presentationml/2006/main">
   <p:cSld>
     <p:spTree>
@@ -1028,7 +1251,7 @@
 </p:notes>
 </file>
 
-<file path=ppt/notesSlides/notesSlide4.xml><?xml version="1.0" encoding="utf-8"?>
+<file path=ppt/notesSlides/notesSlide5.xml><?xml version="1.0" encoding="utf-8"?>
 <p:notes xmlns:a="http://schemas.openxmlformats.org/drawingml/2006/main" xmlns:r="http://schemas.openxmlformats.org/officeDocument/2006/relationships" xmlns:p="http://schemas.openxmlformats.org/presentationml/2006/main">
   <p:cSld>
     <p:spTree>
@@ -1190,7 +1413,7 @@
 </p:notes>
 </file>
 
-<file path=ppt/notesSlides/notesSlide5.xml><?xml version="1.0" encoding="utf-8"?>
+<file path=ppt/notesSlides/notesSlide6.xml><?xml version="1.0" encoding="utf-8"?>
 <p:notes xmlns:a="http://schemas.openxmlformats.org/drawingml/2006/main" xmlns:r="http://schemas.openxmlformats.org/officeDocument/2006/relationships" xmlns:p="http://schemas.openxmlformats.org/presentationml/2006/main">
   <p:cSld>
     <p:spTree>
@@ -1274,7 +1497,7 @@
 </p:notes>
 </file>
 
-<file path=ppt/notesSlides/notesSlide6.xml><?xml version="1.0" encoding="utf-8"?>
+<file path=ppt/notesSlides/notesSlide7.xml><?xml version="1.0" encoding="utf-8"?>
 <p:notes xmlns:a="http://schemas.openxmlformats.org/drawingml/2006/main" xmlns:r="http://schemas.openxmlformats.org/officeDocument/2006/relationships" xmlns:p="http://schemas.openxmlformats.org/presentationml/2006/main">
   <p:cSld>
     <p:spTree>
@@ -1412,7 +1635,7 @@
 </p:notes>
 </file>
 
-<file path=ppt/notesSlides/notesSlide7.xml><?xml version="1.0" encoding="utf-8"?>
+<file path=ppt/notesSlides/notesSlide8.xml><?xml version="1.0" encoding="utf-8"?>
 <p:notes xmlns:a="http://schemas.openxmlformats.org/drawingml/2006/main" xmlns:r="http://schemas.openxmlformats.org/officeDocument/2006/relationships" xmlns:p="http://schemas.openxmlformats.org/presentationml/2006/main">
   <p:cSld>
     <p:spTree>
@@ -1842,7 +2065,7 @@
 </p:notes>
 </file>
 
-<file path=ppt/notesSlides/notesSlide8.xml><?xml version="1.0" encoding="utf-8"?>
+<file path=ppt/notesSlides/notesSlide9.xml><?xml version="1.0" encoding="utf-8"?>
 <p:notes xmlns:a="http://schemas.openxmlformats.org/drawingml/2006/main" xmlns:r="http://schemas.openxmlformats.org/officeDocument/2006/relationships" xmlns:p="http://schemas.openxmlformats.org/presentationml/2006/main">
   <p:cSld>
     <p:spTree>
@@ -1944,90 +2167,6 @@
     <p:extLst>
       <p:ext uri="{BB962C8B-B14F-4D97-AF65-F5344CB8AC3E}">
         <p14:creationId xmlns:p14="http://schemas.microsoft.com/office/powerpoint/2010/main" val="1261773958"/>
-      </p:ext>
-    </p:extLst>
-  </p:cSld>
-  <p:clrMapOvr>
-    <a:masterClrMapping/>
-  </p:clrMapOvr>
-</p:notes>
-</file>
-
-<file path=ppt/notesSlides/notesSlide9.xml><?xml version="1.0" encoding="utf-8"?>
-<p:notes xmlns:a="http://schemas.openxmlformats.org/drawingml/2006/main" xmlns:r="http://schemas.openxmlformats.org/officeDocument/2006/relationships" xmlns:p="http://schemas.openxmlformats.org/presentationml/2006/main">
-  <p:cSld>
-    <p:spTree>
-      <p:nvGrpSpPr>
-        <p:cNvPr id="1" name=""/>
-        <p:cNvGrpSpPr/>
-        <p:nvPr/>
-      </p:nvGrpSpPr>
-      <p:grpSpPr>
-        <a:xfrm>
-          <a:off x="0" y="0"/>
-          <a:ext cx="0" cy="0"/>
-          <a:chOff x="0" y="0"/>
-          <a:chExt cx="0" cy="0"/>
-        </a:xfrm>
-      </p:grpSpPr>
-      <p:sp>
-        <p:nvSpPr>
-          <p:cNvPr id="2" name="Slide Image Placeholder 1"/>
-          <p:cNvSpPr>
-            <a:spLocks noGrp="1" noRot="1" noChangeAspect="1"/>
-          </p:cNvSpPr>
-          <p:nvPr>
-            <p:ph type="sldImg"/>
-          </p:nvPr>
-        </p:nvSpPr>
-        <p:spPr/>
-      </p:sp>
-      <p:sp>
-        <p:nvSpPr>
-          <p:cNvPr id="3" name="Notes Placeholder 2"/>
-          <p:cNvSpPr>
-            <a:spLocks noGrp="1"/>
-          </p:cNvSpPr>
-          <p:nvPr>
-            <p:ph type="body" idx="1"/>
-          </p:nvPr>
-        </p:nvSpPr>
-        <p:spPr/>
-        <p:txBody>
-          <a:bodyPr/>
-          <a:lstStyle/>
-          <a:p>
-            <a:endParaRPr lang="en-US"/>
-          </a:p>
-        </p:txBody>
-      </p:sp>
-      <p:sp>
-        <p:nvSpPr>
-          <p:cNvPr id="4" name="Slide Number Placeholder 3"/>
-          <p:cNvSpPr>
-            <a:spLocks noGrp="1"/>
-          </p:cNvSpPr>
-          <p:nvPr>
-            <p:ph type="sldNum" sz="quarter" idx="5"/>
-          </p:nvPr>
-        </p:nvSpPr>
-        <p:spPr/>
-        <p:txBody>
-          <a:bodyPr/>
-          <a:lstStyle/>
-          <a:p>
-            <a:fld id="{82869989-EB00-4EE7-BCB5-25BDC5BB29F8}" type="slidenum">
-              <a:rPr lang="en-US" smtClean="0"/>
-              <a:t>11</a:t>
-            </a:fld>
-            <a:endParaRPr lang="en-US"/>
-          </a:p>
-        </p:txBody>
-      </p:sp>
-    </p:spTree>
-    <p:extLst>
-      <p:ext uri="{BB962C8B-B14F-4D97-AF65-F5344CB8AC3E}">
-        <p14:creationId xmlns:p14="http://schemas.microsoft.com/office/powerpoint/2010/main" val="1277556596"/>
       </p:ext>
     </p:extLst>
   </p:cSld>
@@ -4178,7 +4317,7 @@
           <a:p>
             <a:fld id="{384A29A4-78C8-47AB-BA06-22CB45938951}" type="datetime1">
               <a:rPr lang="en-US" smtClean="0"/>
-              <a:t>7/18/2025</a:t>
+              <a:t>7/19/2025</a:t>
             </a:fld>
             <a:endParaRPr lang="en-US"/>
           </a:p>
@@ -4373,7 +4512,7 @@
           <a:p>
             <a:fld id="{E1ED4ACF-2D82-46F2-A8E9-23963AA34E86}" type="datetime1">
               <a:rPr lang="en-US" smtClean="0"/>
-              <a:t>7/18/2025</a:t>
+              <a:t>7/19/2025</a:t>
             </a:fld>
             <a:endParaRPr lang="en-US"/>
           </a:p>
@@ -4557,7 +4696,7 @@
           <a:p>
             <a:fld id="{AE374B5B-21A0-4192-BF4C-38187F1A68D8}" type="datetime1">
               <a:rPr lang="en-US" smtClean="0"/>
-              <a:t>7/18/2025</a:t>
+              <a:t>7/19/2025</a:t>
             </a:fld>
             <a:endParaRPr lang="en-US"/>
           </a:p>
@@ -6898,7 +7037,7 @@
           <a:p>
             <a:fld id="{33B5CF7C-B333-48E1-A4A6-83A3C8B73AC0}" type="datetime1">
               <a:rPr lang="en-US" smtClean="0"/>
-              <a:t>7/18/2025</a:t>
+              <a:t>7/19/2025</a:t>
             </a:fld>
             <a:endParaRPr lang="en-US"/>
           </a:p>
@@ -7351,7 +7490,7 @@
           <a:p>
             <a:fld id="{AE320762-5CBF-4210-AB54-376B091119F8}" type="datetime1">
               <a:rPr lang="en-US" smtClean="0"/>
-              <a:t>7/18/2025</a:t>
+              <a:t>7/19/2025</a:t>
             </a:fld>
             <a:endParaRPr lang="en-US"/>
           </a:p>
@@ -7483,7 +7622,7 @@
           <a:p>
             <a:fld id="{7F0DB371-BF5F-4058-A212-1A908E4D2674}" type="datetime1">
               <a:rPr lang="en-US" smtClean="0"/>
-              <a:t>7/18/2025</a:t>
+              <a:t>7/19/2025</a:t>
             </a:fld>
             <a:endParaRPr lang="en-US"/>
           </a:p>
@@ -9416,7 +9555,7 @@
           <a:p>
             <a:fld id="{60A4083B-90AA-48CF-BAD5-00AA24D7F288}" type="datetime1">
               <a:rPr lang="en-US" smtClean="0"/>
-              <a:t>7/18/2025</a:t>
+              <a:t>7/19/2025</a:t>
             </a:fld>
             <a:endParaRPr lang="en-US"/>
           </a:p>
@@ -11675,7 +11814,7 @@
             <a:fld id="{F5BAF629-ECA2-4CF3-B790-9D9BDED98269}" type="datetime1">
               <a:rPr lang="en-US" smtClean="0"/>
               <a:pPr/>
-              <a:t>7/18/2025</a:t>
+              <a:t>7/19/2025</a:t>
             </a:fld>
             <a:endParaRPr lang="en-US"/>
           </a:p>
@@ -15970,7 +16109,7 @@
             <a:fld id="{B51B2453-8663-4C69-AF73-9FD7B1DEC5D0}" type="datetime1">
               <a:rPr lang="en-US" smtClean="0"/>
               <a:pPr/>
-              <a:t>7/18/2025</a:t>
+              <a:t>7/19/2025</a:t>
             </a:fld>
             <a:endParaRPr lang="en-US" dirty="0"/>
           </a:p>
@@ -16826,13 +16965,13 @@
   <p:clrMapOvr>
     <a:masterClrMapping/>
   </p:clrMapOvr>
-  <mc:AlternateContent xmlns:mc="http://schemas.openxmlformats.org/markup-compatibility/2006">
-    <mc:Choice xmlns:p14="http://schemas.microsoft.com/office/powerpoint/2010/main" Requires="p14">
+  <mc:AlternateContent xmlns:mc="http://schemas.openxmlformats.org/markup-compatibility/2006" xmlns:p14="http://schemas.microsoft.com/office/powerpoint/2010/main">
+    <mc:Choice Requires="p14">
       <p:transition spd="med" p14:dur="700">
         <p:fade/>
       </p:transition>
     </mc:Choice>
-    <mc:Fallback>
+    <mc:Fallback xmlns="">
       <p:transition spd="med">
         <p:fade/>
       </p:transition>
@@ -17714,15 +17853,6 @@
           <a:solidFill>
             <a:srgbClr val="FFFFFF"/>
           </a:solidFill>
-          <a:extLst>
-            <a:ext uri="{909E8E84-426E-40DD-AFC4-6F175D3DCCD1}">
-              <a14:hiddenFill xmlns:a14="http://schemas.microsoft.com/office/drawing/2010/main">
-                <a:solidFill>
-                  <a:srgbClr val="FFFFFF"/>
-                </a:solidFill>
-              </a14:hiddenFill>
-            </a:ext>
-          </a:extLst>
         </p:spPr>
       </p:pic>
     </p:spTree>
@@ -18325,13 +18455,13 @@
   <p:clrMapOvr>
     <a:masterClrMapping/>
   </p:clrMapOvr>
-  <mc:AlternateContent xmlns:mc="http://schemas.openxmlformats.org/markup-compatibility/2006">
-    <mc:Choice xmlns:p14="http://schemas.microsoft.com/office/powerpoint/2010/main" Requires="p14">
+  <mc:AlternateContent xmlns:mc="http://schemas.openxmlformats.org/markup-compatibility/2006" xmlns:p14="http://schemas.microsoft.com/office/powerpoint/2010/main">
+    <mc:Choice Requires="p14">
       <p:transition spd="med" p14:dur="700">
         <p:fade/>
       </p:transition>
     </mc:Choice>
-    <mc:Fallback>
+    <mc:Fallback xmlns="">
       <p:transition spd="med">
         <p:fade/>
       </p:transition>
@@ -18569,13 +18699,13 @@
   <p:clrMapOvr>
     <a:masterClrMapping/>
   </p:clrMapOvr>
-  <mc:AlternateContent xmlns:mc="http://schemas.openxmlformats.org/markup-compatibility/2006">
-    <mc:Choice xmlns:p14="http://schemas.microsoft.com/office/powerpoint/2010/main" Requires="p14">
+  <mc:AlternateContent xmlns:mc="http://schemas.openxmlformats.org/markup-compatibility/2006" xmlns:p14="http://schemas.microsoft.com/office/powerpoint/2010/main">
+    <mc:Choice Requires="p14">
       <p:transition spd="med" p14:dur="700">
         <p:fade/>
       </p:transition>
     </mc:Choice>
-    <mc:Fallback>
+    <mc:Fallback xmlns="">
       <p:transition spd="med">
         <p:fade/>
       </p:transition>
@@ -18873,13 +19003,13 @@
   <p:clrMapOvr>
     <a:masterClrMapping/>
   </p:clrMapOvr>
-  <mc:AlternateContent xmlns:mc="http://schemas.openxmlformats.org/markup-compatibility/2006">
-    <mc:Choice xmlns:p14="http://schemas.microsoft.com/office/powerpoint/2010/main" Requires="p14">
+  <mc:AlternateContent xmlns:mc="http://schemas.openxmlformats.org/markup-compatibility/2006" xmlns:p14="http://schemas.microsoft.com/office/powerpoint/2010/main">
+    <mc:Choice Requires="p14">
       <p:transition spd="med" p14:dur="700">
         <p:fade/>
       </p:transition>
     </mc:Choice>
-    <mc:Fallback>
+    <mc:Fallback xmlns="">
       <p:transition spd="med">
         <p:fade/>
       </p:transition>

</xml_diff>

<commit_message>
"done week 9 oop["
</commit_message>
<xml_diff>
--- a/Platform Technologies/Midterm/Week 3/Lecture/Chapter 3-Basic Linux  Command.pptx
+++ b/Platform Technologies/Midterm/Week 3/Lecture/Chapter 3-Basic Linux  Command.pptx
@@ -5,23 +5,26 @@
     <p:sldMasterId id="2147483648" r:id="rId1"/>
   </p:sldMasterIdLst>
   <p:notesMasterIdLst>
-    <p:notesMasterId r:id="rId13"/>
+    <p:notesMasterId r:id="rId16"/>
   </p:notesMasterIdLst>
   <p:handoutMasterIdLst>
-    <p:handoutMasterId r:id="rId14"/>
+    <p:handoutMasterId r:id="rId17"/>
   </p:handoutMasterIdLst>
   <p:sldIdLst>
     <p:sldId id="261" r:id="rId2"/>
     <p:sldId id="257" r:id="rId3"/>
     <p:sldId id="263" r:id="rId4"/>
-    <p:sldId id="271" r:id="rId5"/>
-    <p:sldId id="272" r:id="rId6"/>
-    <p:sldId id="264" r:id="rId7"/>
-    <p:sldId id="273" r:id="rId8"/>
-    <p:sldId id="274" r:id="rId9"/>
-    <p:sldId id="275" r:id="rId10"/>
-    <p:sldId id="267" r:id="rId11"/>
-    <p:sldId id="276" r:id="rId12"/>
+    <p:sldId id="279" r:id="rId5"/>
+    <p:sldId id="271" r:id="rId6"/>
+    <p:sldId id="272" r:id="rId7"/>
+    <p:sldId id="277" r:id="rId8"/>
+    <p:sldId id="264" r:id="rId9"/>
+    <p:sldId id="278" r:id="rId10"/>
+    <p:sldId id="273" r:id="rId11"/>
+    <p:sldId id="274" r:id="rId12"/>
+    <p:sldId id="275" r:id="rId13"/>
+    <p:sldId id="267" r:id="rId14"/>
+    <p:sldId id="276" r:id="rId15"/>
   </p:sldIdLst>
   <p:sldSz cx="12192000" cy="6858000"/>
   <p:notesSz cx="6858000" cy="9144000"/>
@@ -224,7 +227,7 @@
           <a:p>
             <a:fld id="{59041DB8-B66F-4DC8-A96E-33677E0F90FF}" type="datetimeFigureOut">
               <a:rPr lang="en-US" smtClean="0"/>
-              <a:t>7/19/2025</a:t>
+              <a:t>7/21/2025</a:t>
             </a:fld>
             <a:endParaRPr lang="en-US"/>
           </a:p>
@@ -389,7 +392,7 @@
           <a:p>
             <a:fld id="{DEB49C4A-65AC-492D-9701-81B46C3AD0E4}" type="datetimeFigureOut">
               <a:rPr lang="en-US" smtClean="0"/>
-              <a:t>7/19/2025</a:t>
+              <a:t>7/21/2025</a:t>
             </a:fld>
             <a:endParaRPr lang="en-US"/>
           </a:p>
@@ -800,6 +803,685 @@
   <p:cSld>
     <p:spTree>
       <p:nvGrpSpPr>
+        <p:cNvPr id="1" name="">
+          <a:extLst>
+            <a:ext uri="{FF2B5EF4-FFF2-40B4-BE49-F238E27FC236}">
+              <a16:creationId xmlns:a16="http://schemas.microsoft.com/office/drawing/2014/main" id="{F10EABBD-BC8D-82DA-2ED5-DC3ADEC8D340}"/>
+            </a:ext>
+          </a:extLst>
+        </p:cNvPr>
+        <p:cNvGrpSpPr/>
+        <p:nvPr/>
+      </p:nvGrpSpPr>
+      <p:grpSpPr>
+        <a:xfrm>
+          <a:off x="0" y="0"/>
+          <a:ext cx="0" cy="0"/>
+          <a:chOff x="0" y="0"/>
+          <a:chExt cx="0" cy="0"/>
+        </a:xfrm>
+      </p:grpSpPr>
+      <p:sp>
+        <p:nvSpPr>
+          <p:cNvPr id="2" name="Slide Image Placeholder 1">
+            <a:extLst>
+              <a:ext uri="{FF2B5EF4-FFF2-40B4-BE49-F238E27FC236}">
+                <a16:creationId xmlns:a16="http://schemas.microsoft.com/office/drawing/2014/main" id="{36B24FEE-060F-EDFB-1842-7A4E90077979}"/>
+              </a:ext>
+            </a:extLst>
+          </p:cNvPr>
+          <p:cNvSpPr>
+            <a:spLocks noGrp="1" noRot="1" noChangeAspect="1"/>
+          </p:cNvSpPr>
+          <p:nvPr>
+            <p:ph type="sldImg"/>
+          </p:nvPr>
+        </p:nvSpPr>
+        <p:spPr/>
+      </p:sp>
+      <p:sp>
+        <p:nvSpPr>
+          <p:cNvPr id="3" name="Notes Placeholder 2">
+            <a:extLst>
+              <a:ext uri="{FF2B5EF4-FFF2-40B4-BE49-F238E27FC236}">
+                <a16:creationId xmlns:a16="http://schemas.microsoft.com/office/drawing/2014/main" id="{399D80C7-11E5-7629-7754-C3FC5D61A1BD}"/>
+              </a:ext>
+            </a:extLst>
+          </p:cNvPr>
+          <p:cNvSpPr>
+            <a:spLocks noGrp="1"/>
+          </p:cNvSpPr>
+          <p:nvPr>
+            <p:ph type="body" idx="1"/>
+          </p:nvPr>
+        </p:nvSpPr>
+        <p:spPr/>
+        <p:txBody>
+          <a:bodyPr/>
+          <a:lstStyle/>
+          <a:p>
+            <a:r>
+              <a:rPr lang="en-US" dirty="0" err="1"/>
+              <a:t>pwd</a:t>
+            </a:r>
+            <a:r>
+              <a:rPr lang="en-US" dirty="0"/>
+              <a:t> shows you where you are in the file system.</a:t>
+            </a:r>
+          </a:p>
+          <a:p>
+            <a:r>
+              <a:rPr lang="en-US" dirty="0"/>
+              <a:t>cd </a:t>
+            </a:r>
+            <a:r>
+              <a:rPr lang="en-US" dirty="0" err="1"/>
+              <a:t>foldername</a:t>
+            </a:r>
+            <a:r>
+              <a:rPr lang="en-US" dirty="0"/>
+              <a:t> lets you move into folders.</a:t>
+            </a:r>
+          </a:p>
+          <a:p>
+            <a:r>
+              <a:rPr lang="en-US" dirty="0"/>
+              <a:t>ls lists contents in the current folder. Use ls -l for detailed view.</a:t>
+            </a:r>
+          </a:p>
+          <a:p>
+            <a:endParaRPr lang="en-US" dirty="0"/>
+          </a:p>
+        </p:txBody>
+      </p:sp>
+      <p:sp>
+        <p:nvSpPr>
+          <p:cNvPr id="4" name="Slide Number Placeholder 3">
+            <a:extLst>
+              <a:ext uri="{FF2B5EF4-FFF2-40B4-BE49-F238E27FC236}">
+                <a16:creationId xmlns:a16="http://schemas.microsoft.com/office/drawing/2014/main" id="{808B5BFA-E578-661B-AF47-8389BB06B9F8}"/>
+              </a:ext>
+            </a:extLst>
+          </p:cNvPr>
+          <p:cNvSpPr>
+            <a:spLocks noGrp="1"/>
+          </p:cNvSpPr>
+          <p:nvPr>
+            <p:ph type="sldNum" sz="quarter" idx="5"/>
+          </p:nvPr>
+        </p:nvSpPr>
+        <p:spPr/>
+        <p:txBody>
+          <a:bodyPr/>
+          <a:lstStyle/>
+          <a:p>
+            <a:fld id="{82869989-EB00-4EE7-BCB5-25BDC5BB29F8}" type="slidenum">
+              <a:rPr lang="en-US" smtClean="0"/>
+              <a:t>10</a:t>
+            </a:fld>
+            <a:endParaRPr lang="en-US"/>
+          </a:p>
+        </p:txBody>
+      </p:sp>
+    </p:spTree>
+    <p:extLst>
+      <p:ext uri="{BB962C8B-B14F-4D97-AF65-F5344CB8AC3E}">
+        <p14:creationId xmlns:p14="http://schemas.microsoft.com/office/powerpoint/2010/main" val="268914562"/>
+      </p:ext>
+    </p:extLst>
+  </p:cSld>
+  <p:clrMapOvr>
+    <a:masterClrMapping/>
+  </p:clrMapOvr>
+</p:notes>
+</file>
+
+<file path=ppt/notesSlides/notesSlide11.xml><?xml version="1.0" encoding="utf-8"?>
+<p:notes xmlns:a="http://schemas.openxmlformats.org/drawingml/2006/main" xmlns:r="http://schemas.openxmlformats.org/officeDocument/2006/relationships" xmlns:p="http://schemas.openxmlformats.org/presentationml/2006/main">
+  <p:cSld>
+    <p:spTree>
+      <p:nvGrpSpPr>
+        <p:cNvPr id="1" name="">
+          <a:extLst>
+            <a:ext uri="{FF2B5EF4-FFF2-40B4-BE49-F238E27FC236}">
+              <a16:creationId xmlns:a16="http://schemas.microsoft.com/office/drawing/2014/main" id="{426112F3-08C9-0260-7304-5681AF47ADB6}"/>
+            </a:ext>
+          </a:extLst>
+        </p:cNvPr>
+        <p:cNvGrpSpPr/>
+        <p:nvPr/>
+      </p:nvGrpSpPr>
+      <p:grpSpPr>
+        <a:xfrm>
+          <a:off x="0" y="0"/>
+          <a:ext cx="0" cy="0"/>
+          <a:chOff x="0" y="0"/>
+          <a:chExt cx="0" cy="0"/>
+        </a:xfrm>
+      </p:grpSpPr>
+      <p:sp>
+        <p:nvSpPr>
+          <p:cNvPr id="2" name="Slide Image Placeholder 1">
+            <a:extLst>
+              <a:ext uri="{FF2B5EF4-FFF2-40B4-BE49-F238E27FC236}">
+                <a16:creationId xmlns:a16="http://schemas.microsoft.com/office/drawing/2014/main" id="{458F4D28-1CEF-BDB9-9A57-9A31129A02B7}"/>
+              </a:ext>
+            </a:extLst>
+          </p:cNvPr>
+          <p:cNvSpPr>
+            <a:spLocks noGrp="1" noRot="1" noChangeAspect="1"/>
+          </p:cNvSpPr>
+          <p:nvPr>
+            <p:ph type="sldImg"/>
+          </p:nvPr>
+        </p:nvSpPr>
+        <p:spPr/>
+      </p:sp>
+      <p:sp>
+        <p:nvSpPr>
+          <p:cNvPr id="3" name="Notes Placeholder 2">
+            <a:extLst>
+              <a:ext uri="{FF2B5EF4-FFF2-40B4-BE49-F238E27FC236}">
+                <a16:creationId xmlns:a16="http://schemas.microsoft.com/office/drawing/2014/main" id="{263FCE9E-EE1E-1EA4-8C86-3C6A680771F7}"/>
+              </a:ext>
+            </a:extLst>
+          </p:cNvPr>
+          <p:cNvSpPr>
+            <a:spLocks noGrp="1"/>
+          </p:cNvSpPr>
+          <p:nvPr>
+            <p:ph type="body" idx="1"/>
+          </p:nvPr>
+        </p:nvSpPr>
+        <p:spPr/>
+        <p:txBody>
+          <a:bodyPr/>
+          <a:lstStyle/>
+          <a:p>
+            <a:r>
+              <a:rPr lang="en-US" dirty="0"/>
+              <a:t>View permissions:</a:t>
+            </a:r>
+          </a:p>
+          <a:p>
+            <a:r>
+              <a:rPr lang="en-US" dirty="0"/>
+              <a:t>ls -l file.txt</a:t>
+            </a:r>
+          </a:p>
+          <a:p>
+            <a:endParaRPr lang="en-US" dirty="0"/>
+          </a:p>
+          <a:p>
+            <a:r>
+              <a:rPr lang="en-US" dirty="0"/>
+              <a:t>Change permissions:</a:t>
+            </a:r>
+          </a:p>
+          <a:p>
+            <a:r>
+              <a:rPr lang="en-US" dirty="0" err="1"/>
+              <a:t>chmod</a:t>
+            </a:r>
+            <a:r>
+              <a:rPr lang="en-US" dirty="0"/>
+              <a:t> 755 script.sh</a:t>
+            </a:r>
+          </a:p>
+          <a:p>
+            <a:endParaRPr lang="en-US" dirty="0"/>
+          </a:p>
+          <a:p>
+            <a:r>
+              <a:rPr lang="en-US" dirty="0"/>
+              <a:t>Change owner:</a:t>
+            </a:r>
+          </a:p>
+          <a:p>
+            <a:r>
+              <a:rPr lang="en-US" dirty="0" err="1"/>
+              <a:t>chown</a:t>
+            </a:r>
+            <a:r>
+              <a:rPr lang="en-US" dirty="0"/>
+              <a:t> </a:t>
+            </a:r>
+            <a:r>
+              <a:rPr lang="en-US" dirty="0" err="1"/>
+              <a:t>user:group</a:t>
+            </a:r>
+            <a:r>
+              <a:rPr lang="en-US" dirty="0"/>
+              <a:t> file.txt</a:t>
+            </a:r>
+          </a:p>
+          <a:p>
+            <a:endParaRPr lang="en-US" dirty="0"/>
+          </a:p>
+          <a:p>
+            <a:r>
+              <a:rPr lang="en-US" dirty="0"/>
+              <a:t>Permission Output Example:</a:t>
+            </a:r>
+          </a:p>
+          <a:p>
+            <a:endParaRPr lang="en-US" dirty="0"/>
+          </a:p>
+          <a:p>
+            <a:r>
+              <a:rPr lang="en-US" dirty="0"/>
+              <a:t>-</a:t>
+            </a:r>
+            <a:r>
+              <a:rPr lang="en-US" dirty="0" err="1"/>
+              <a:t>rwxr-xr</a:t>
+            </a:r>
+            <a:r>
+              <a:rPr lang="en-US" dirty="0"/>
+              <a:t>--  1 user group  file.txt</a:t>
+            </a:r>
+          </a:p>
+          <a:p>
+            <a:endParaRPr lang="en-US" dirty="0"/>
+          </a:p>
+          <a:p>
+            <a:endParaRPr lang="en-US" dirty="0"/>
+          </a:p>
+          <a:p>
+            <a:endParaRPr lang="en-US" dirty="0"/>
+          </a:p>
+          <a:p>
+            <a:r>
+              <a:rPr lang="en-US" dirty="0"/>
+              <a:t>Let's break down how it works:</a:t>
+            </a:r>
+          </a:p>
+          <a:p>
+            <a:endParaRPr lang="en-US" dirty="0"/>
+          </a:p>
+          <a:p>
+            <a:r>
+              <a:rPr lang="en-US" dirty="0" err="1"/>
+              <a:t>chmod</a:t>
+            </a:r>
+            <a:endParaRPr lang="en-US" dirty="0"/>
+          </a:p>
+          <a:p>
+            <a:r>
+              <a:rPr lang="en-US" dirty="0"/>
+              <a:t>This is the command itself, short for "change mode." It's used to modify file permissions.</a:t>
+            </a:r>
+          </a:p>
+          <a:p>
+            <a:endParaRPr lang="en-US" dirty="0"/>
+          </a:p>
+          <a:p>
+            <a:r>
+              <a:rPr lang="en-US" dirty="0"/>
+              <a:t>755</a:t>
+            </a:r>
+          </a:p>
+          <a:p>
+            <a:r>
+              <a:rPr lang="en-US" dirty="0"/>
+              <a:t>This is the octal representation of the permissions, and it's the core of the command. It's a three-digit number, where each digit corresponds to a specific set of permissions:</a:t>
+            </a:r>
+          </a:p>
+          <a:p>
+            <a:endParaRPr lang="en-US" dirty="0"/>
+          </a:p>
+          <a:p>
+            <a:r>
+              <a:rPr lang="en-US" dirty="0"/>
+              <a:t>First Digit (7): Owner Permissions</a:t>
+            </a:r>
+          </a:p>
+          <a:p>
+            <a:endParaRPr lang="en-US" dirty="0"/>
+          </a:p>
+          <a:p>
+            <a:r>
+              <a:rPr lang="en-US" dirty="0"/>
+              <a:t>This 7 means the owner of the file has read, write, and execute permissions.</a:t>
+            </a:r>
+          </a:p>
+          <a:p>
+            <a:endParaRPr lang="en-US" dirty="0"/>
+          </a:p>
+          <a:p>
+            <a:r>
+              <a:rPr lang="en-US" dirty="0"/>
+              <a:t>Second Digit (5): Group Permissions</a:t>
+            </a:r>
+          </a:p>
+          <a:p>
+            <a:endParaRPr lang="en-US" dirty="0"/>
+          </a:p>
+          <a:p>
+            <a:r>
+              <a:rPr lang="en-US" dirty="0"/>
+              <a:t>This 5 means users belonging to the file's group have read and execute permissions, but not write permission.</a:t>
+            </a:r>
+          </a:p>
+          <a:p>
+            <a:endParaRPr lang="en-US" dirty="0"/>
+          </a:p>
+          <a:p>
+            <a:r>
+              <a:rPr lang="en-US" dirty="0"/>
+              <a:t>Third Digit (5): Others Permissions</a:t>
+            </a:r>
+          </a:p>
+          <a:p>
+            <a:endParaRPr lang="en-US" dirty="0"/>
+          </a:p>
+          <a:p>
+            <a:r>
+              <a:rPr lang="en-US" dirty="0"/>
+              <a:t>This 5 means all other users on the system (who are neither the owner nor in the file's group) have read and execute permissions, but not write permission.</a:t>
+            </a:r>
+          </a:p>
+          <a:p>
+            <a:endParaRPr lang="en-US" dirty="0"/>
+          </a:p>
+          <a:p>
+            <a:r>
+              <a:rPr lang="en-US" dirty="0"/>
+              <a:t>How the Numbers Map to Permissions:</a:t>
+            </a:r>
+          </a:p>
+          <a:p>
+            <a:r>
+              <a:rPr lang="en-US" dirty="0"/>
+              <a:t>Each permission type has a numerical value:</a:t>
+            </a:r>
+          </a:p>
+          <a:p>
+            <a:endParaRPr lang="en-US" dirty="0"/>
+          </a:p>
+          <a:p>
+            <a:r>
+              <a:rPr lang="en-US" dirty="0"/>
+              <a:t>r (read) = 4</a:t>
+            </a:r>
+          </a:p>
+          <a:p>
+            <a:endParaRPr lang="en-US" dirty="0"/>
+          </a:p>
+          <a:p>
+            <a:r>
+              <a:rPr lang="en-US" dirty="0"/>
+              <a:t>w (write) = 2</a:t>
+            </a:r>
+          </a:p>
+          <a:p>
+            <a:endParaRPr lang="en-US" dirty="0"/>
+          </a:p>
+          <a:p>
+            <a:r>
+              <a:rPr lang="en-US" dirty="0"/>
+              <a:t>x (execute) = 1</a:t>
+            </a:r>
+          </a:p>
+          <a:p>
+            <a:endParaRPr lang="en-US" dirty="0"/>
+          </a:p>
+          <a:p>
+            <a:r>
+              <a:rPr lang="en-US" dirty="0"/>
+              <a:t>No permission = 0</a:t>
+            </a:r>
+          </a:p>
+          <a:p>
+            <a:endParaRPr lang="en-US" dirty="0"/>
+          </a:p>
+          <a:p>
+            <a:r>
+              <a:rPr lang="en-US" dirty="0"/>
+              <a:t>To get the digit for each set of permissions, you add up the values for the desired permissions:</a:t>
+            </a:r>
+          </a:p>
+          <a:p>
+            <a:endParaRPr lang="en-US" dirty="0"/>
+          </a:p>
+          <a:p>
+            <a:r>
+              <a:rPr lang="en-US" dirty="0"/>
+              <a:t>7 = r (4) + w (2) + x (1) = Read, Write, Execute</a:t>
+            </a:r>
+          </a:p>
+          <a:p>
+            <a:endParaRPr lang="en-US" dirty="0"/>
+          </a:p>
+          <a:p>
+            <a:r>
+              <a:rPr lang="en-US" dirty="0"/>
+              <a:t>5 = r (4) + x (1) = Read, Execute</a:t>
+            </a:r>
+          </a:p>
+          <a:p>
+            <a:endParaRPr lang="en-US" dirty="0"/>
+          </a:p>
+          <a:p>
+            <a:r>
+              <a:rPr lang="en-US" dirty="0"/>
+              <a:t>6 = r (4) + w (2) = Read, Write</a:t>
+            </a:r>
+          </a:p>
+          <a:p>
+            <a:endParaRPr lang="en-US" dirty="0"/>
+          </a:p>
+          <a:p>
+            <a:r>
+              <a:rPr lang="en-US" dirty="0"/>
+              <a:t>4 = r (4) = Read only</a:t>
+            </a:r>
+          </a:p>
+          <a:p>
+            <a:endParaRPr lang="en-US" dirty="0"/>
+          </a:p>
+          <a:p>
+            <a:r>
+              <a:rPr lang="en-US" dirty="0"/>
+              <a:t>So, 755 translates to:</a:t>
+            </a:r>
+          </a:p>
+          <a:p>
+            <a:endParaRPr lang="en-US" dirty="0"/>
+          </a:p>
+          <a:p>
+            <a:r>
+              <a:rPr lang="en-US" dirty="0"/>
+              <a:t>Owner: Read, Write, Execute</a:t>
+            </a:r>
+          </a:p>
+          <a:p>
+            <a:endParaRPr lang="en-US" dirty="0"/>
+          </a:p>
+          <a:p>
+            <a:r>
+              <a:rPr lang="en-US" dirty="0"/>
+              <a:t>Group: Read, Execute</a:t>
+            </a:r>
+          </a:p>
+          <a:p>
+            <a:endParaRPr lang="en-US" dirty="0"/>
+          </a:p>
+          <a:p>
+            <a:r>
+              <a:rPr lang="en-US" dirty="0"/>
+              <a:t>Others: Read, Execute</a:t>
+            </a:r>
+          </a:p>
+          <a:p>
+            <a:endParaRPr lang="en-US" dirty="0"/>
+          </a:p>
+          <a:p>
+            <a:endParaRPr lang="en-US" dirty="0"/>
+          </a:p>
+          <a:p>
+            <a:endParaRPr lang="en-US" dirty="0"/>
+          </a:p>
+        </p:txBody>
+      </p:sp>
+      <p:sp>
+        <p:nvSpPr>
+          <p:cNvPr id="4" name="Slide Number Placeholder 3">
+            <a:extLst>
+              <a:ext uri="{FF2B5EF4-FFF2-40B4-BE49-F238E27FC236}">
+                <a16:creationId xmlns:a16="http://schemas.microsoft.com/office/drawing/2014/main" id="{5DC4B489-A24F-5F24-7A3C-D9D8BF866830}"/>
+              </a:ext>
+            </a:extLst>
+          </p:cNvPr>
+          <p:cNvSpPr>
+            <a:spLocks noGrp="1"/>
+          </p:cNvSpPr>
+          <p:nvPr>
+            <p:ph type="sldNum" sz="quarter" idx="5"/>
+          </p:nvPr>
+        </p:nvSpPr>
+        <p:spPr/>
+        <p:txBody>
+          <a:bodyPr/>
+          <a:lstStyle/>
+          <a:p>
+            <a:fld id="{82869989-EB00-4EE7-BCB5-25BDC5BB29F8}" type="slidenum">
+              <a:rPr lang="en-US" smtClean="0"/>
+              <a:t>11</a:t>
+            </a:fld>
+            <a:endParaRPr lang="en-US"/>
+          </a:p>
+        </p:txBody>
+      </p:sp>
+    </p:spTree>
+    <p:extLst>
+      <p:ext uri="{BB962C8B-B14F-4D97-AF65-F5344CB8AC3E}">
+        <p14:creationId xmlns:p14="http://schemas.microsoft.com/office/powerpoint/2010/main" val="3635696968"/>
+      </p:ext>
+    </p:extLst>
+  </p:cSld>
+  <p:clrMapOvr>
+    <a:masterClrMapping/>
+  </p:clrMapOvr>
+</p:notes>
+</file>
+
+<file path=ppt/notesSlides/notesSlide12.xml><?xml version="1.0" encoding="utf-8"?>
+<p:notes xmlns:a="http://schemas.openxmlformats.org/drawingml/2006/main" xmlns:r="http://schemas.openxmlformats.org/officeDocument/2006/relationships" xmlns:p="http://schemas.openxmlformats.org/presentationml/2006/main">
+  <p:cSld>
+    <p:spTree>
+      <p:nvGrpSpPr>
+        <p:cNvPr id="1" name="">
+          <a:extLst>
+            <a:ext uri="{FF2B5EF4-FFF2-40B4-BE49-F238E27FC236}">
+              <a16:creationId xmlns:a16="http://schemas.microsoft.com/office/drawing/2014/main" id="{4431E3D5-8F82-DE77-B2C8-0A272A3F88DE}"/>
+            </a:ext>
+          </a:extLst>
+        </p:cNvPr>
+        <p:cNvGrpSpPr/>
+        <p:nvPr/>
+      </p:nvGrpSpPr>
+      <p:grpSpPr>
+        <a:xfrm>
+          <a:off x="0" y="0"/>
+          <a:ext cx="0" cy="0"/>
+          <a:chOff x="0" y="0"/>
+          <a:chExt cx="0" cy="0"/>
+        </a:xfrm>
+      </p:grpSpPr>
+      <p:sp>
+        <p:nvSpPr>
+          <p:cNvPr id="2" name="Slide Image Placeholder 1">
+            <a:extLst>
+              <a:ext uri="{FF2B5EF4-FFF2-40B4-BE49-F238E27FC236}">
+                <a16:creationId xmlns:a16="http://schemas.microsoft.com/office/drawing/2014/main" id="{D0259ADA-C42F-122B-6270-3B3D7D2DC9A7}"/>
+              </a:ext>
+            </a:extLst>
+          </p:cNvPr>
+          <p:cNvSpPr>
+            <a:spLocks noGrp="1" noRot="1" noChangeAspect="1"/>
+          </p:cNvSpPr>
+          <p:nvPr>
+            <p:ph type="sldImg"/>
+          </p:nvPr>
+        </p:nvSpPr>
+        <p:spPr/>
+      </p:sp>
+      <p:sp>
+        <p:nvSpPr>
+          <p:cNvPr id="3" name="Notes Placeholder 2">
+            <a:extLst>
+              <a:ext uri="{FF2B5EF4-FFF2-40B4-BE49-F238E27FC236}">
+                <a16:creationId xmlns:a16="http://schemas.microsoft.com/office/drawing/2014/main" id="{AB761E8E-2C23-8C3D-DE0B-95E0E8D61B10}"/>
+              </a:ext>
+            </a:extLst>
+          </p:cNvPr>
+          <p:cNvSpPr>
+            <a:spLocks noGrp="1"/>
+          </p:cNvSpPr>
+          <p:nvPr>
+            <p:ph type="body" idx="1"/>
+          </p:nvPr>
+        </p:nvSpPr>
+        <p:spPr/>
+        <p:txBody>
+          <a:bodyPr/>
+          <a:lstStyle/>
+          <a:p>
+            <a:r>
+              <a:rPr lang="en-US" dirty="0"/>
+              <a:t>System administrators manage access and privileges by grouping users and assigning permissions accordingly</a:t>
+            </a:r>
+          </a:p>
+        </p:txBody>
+      </p:sp>
+      <p:sp>
+        <p:nvSpPr>
+          <p:cNvPr id="4" name="Slide Number Placeholder 3">
+            <a:extLst>
+              <a:ext uri="{FF2B5EF4-FFF2-40B4-BE49-F238E27FC236}">
+                <a16:creationId xmlns:a16="http://schemas.microsoft.com/office/drawing/2014/main" id="{ADC26EA4-CDB9-DA49-2A4A-E6DDEEA6FC46}"/>
+              </a:ext>
+            </a:extLst>
+          </p:cNvPr>
+          <p:cNvSpPr>
+            <a:spLocks noGrp="1"/>
+          </p:cNvSpPr>
+          <p:nvPr>
+            <p:ph type="sldNum" sz="quarter" idx="5"/>
+          </p:nvPr>
+        </p:nvSpPr>
+        <p:spPr/>
+        <p:txBody>
+          <a:bodyPr/>
+          <a:lstStyle/>
+          <a:p>
+            <a:fld id="{82869989-EB00-4EE7-BCB5-25BDC5BB29F8}" type="slidenum">
+              <a:rPr lang="en-US" smtClean="0"/>
+              <a:t>12</a:t>
+            </a:fld>
+            <a:endParaRPr lang="en-US"/>
+          </a:p>
+        </p:txBody>
+      </p:sp>
+    </p:spTree>
+    <p:extLst>
+      <p:ext uri="{BB962C8B-B14F-4D97-AF65-F5344CB8AC3E}">
+        <p14:creationId xmlns:p14="http://schemas.microsoft.com/office/powerpoint/2010/main" val="1261773958"/>
+      </p:ext>
+    </p:extLst>
+  </p:cSld>
+  <p:clrMapOvr>
+    <a:masterClrMapping/>
+  </p:clrMapOvr>
+</p:notes>
+</file>
+
+<file path=ppt/notesSlides/notesSlide13.xml><?xml version="1.0" encoding="utf-8"?>
+<p:notes xmlns:a="http://schemas.openxmlformats.org/drawingml/2006/main" xmlns:r="http://schemas.openxmlformats.org/officeDocument/2006/relationships" xmlns:p="http://schemas.openxmlformats.org/presentationml/2006/main">
+  <p:cSld>
+    <p:spTree>
+      <p:nvGrpSpPr>
         <p:cNvPr id="1" name=""/>
         <p:cNvGrpSpPr/>
         <p:nvPr/>
@@ -860,7 +1542,7 @@
           <a:p>
             <a:fld id="{82869989-EB00-4EE7-BCB5-25BDC5BB29F8}" type="slidenum">
               <a:rPr lang="en-US" smtClean="0"/>
-              <a:t>11</a:t>
+              <a:t>14</a:t>
             </a:fld>
             <a:endParaRPr lang="en-US"/>
           </a:p>
@@ -1051,6 +1733,117 @@
 </file>
 
 <file path=ppt/notesSlides/notesSlide4.xml><?xml version="1.0" encoding="utf-8"?>
+<p:notes xmlns:a="http://schemas.openxmlformats.org/drawingml/2006/main" xmlns:r="http://schemas.openxmlformats.org/officeDocument/2006/relationships" xmlns:p="http://schemas.openxmlformats.org/presentationml/2006/main">
+  <p:cSld>
+    <p:spTree>
+      <p:nvGrpSpPr>
+        <p:cNvPr id="1" name="">
+          <a:extLst>
+            <a:ext uri="{FF2B5EF4-FFF2-40B4-BE49-F238E27FC236}">
+              <a16:creationId xmlns:a16="http://schemas.microsoft.com/office/drawing/2014/main" id="{BF2F534C-821D-5770-5894-F00FEABEE22A}"/>
+            </a:ext>
+          </a:extLst>
+        </p:cNvPr>
+        <p:cNvGrpSpPr/>
+        <p:nvPr/>
+      </p:nvGrpSpPr>
+      <p:grpSpPr>
+        <a:xfrm>
+          <a:off x="0" y="0"/>
+          <a:ext cx="0" cy="0"/>
+          <a:chOff x="0" y="0"/>
+          <a:chExt cx="0" cy="0"/>
+        </a:xfrm>
+      </p:grpSpPr>
+      <p:sp>
+        <p:nvSpPr>
+          <p:cNvPr id="2" name="Slide Image Placeholder 1">
+            <a:extLst>
+              <a:ext uri="{FF2B5EF4-FFF2-40B4-BE49-F238E27FC236}">
+                <a16:creationId xmlns:a16="http://schemas.microsoft.com/office/drawing/2014/main" id="{AB4D8E0B-CC87-FC4B-2AE6-7ACE108917BE}"/>
+              </a:ext>
+            </a:extLst>
+          </p:cNvPr>
+          <p:cNvSpPr>
+            <a:spLocks noGrp="1" noRot="1" noChangeAspect="1"/>
+          </p:cNvSpPr>
+          <p:nvPr>
+            <p:ph type="sldImg"/>
+          </p:nvPr>
+        </p:nvSpPr>
+        <p:spPr/>
+      </p:sp>
+      <p:sp>
+        <p:nvSpPr>
+          <p:cNvPr id="3" name="Notes Placeholder 2">
+            <a:extLst>
+              <a:ext uri="{FF2B5EF4-FFF2-40B4-BE49-F238E27FC236}">
+                <a16:creationId xmlns:a16="http://schemas.microsoft.com/office/drawing/2014/main" id="{DD7BB490-EAAC-2FBE-DF4E-19B0AE68D658}"/>
+              </a:ext>
+            </a:extLst>
+          </p:cNvPr>
+          <p:cNvSpPr>
+            <a:spLocks noGrp="1"/>
+          </p:cNvSpPr>
+          <p:nvPr>
+            <p:ph type="body" idx="1"/>
+          </p:nvPr>
+        </p:nvSpPr>
+        <p:spPr/>
+        <p:txBody>
+          <a:bodyPr/>
+          <a:lstStyle/>
+          <a:p>
+            <a:r>
+              <a:rPr lang="en-US" dirty="0"/>
+              <a:t>Linux is a powerful OS known for stability and flexibility. Unlike Windows, it's open-source, meaning anyone can modify and distribute it. It's the backbone of most web servers and cloud systems. It uses a command-line interface (CLI) for many tasks, especially for administrators and developers.</a:t>
+            </a:r>
+          </a:p>
+        </p:txBody>
+      </p:sp>
+      <p:sp>
+        <p:nvSpPr>
+          <p:cNvPr id="4" name="Slide Number Placeholder 3">
+            <a:extLst>
+              <a:ext uri="{FF2B5EF4-FFF2-40B4-BE49-F238E27FC236}">
+                <a16:creationId xmlns:a16="http://schemas.microsoft.com/office/drawing/2014/main" id="{D6F8687E-CD14-3256-DE56-BF69CA25789B}"/>
+              </a:ext>
+            </a:extLst>
+          </p:cNvPr>
+          <p:cNvSpPr>
+            <a:spLocks noGrp="1"/>
+          </p:cNvSpPr>
+          <p:nvPr>
+            <p:ph type="sldNum" sz="quarter" idx="5"/>
+          </p:nvPr>
+        </p:nvSpPr>
+        <p:spPr/>
+        <p:txBody>
+          <a:bodyPr/>
+          <a:lstStyle/>
+          <a:p>
+            <a:fld id="{82869989-EB00-4EE7-BCB5-25BDC5BB29F8}" type="slidenum">
+              <a:rPr lang="en-US" smtClean="0"/>
+              <a:t>4</a:t>
+            </a:fld>
+            <a:endParaRPr lang="en-US"/>
+          </a:p>
+        </p:txBody>
+      </p:sp>
+    </p:spTree>
+    <p:extLst>
+      <p:ext uri="{BB962C8B-B14F-4D97-AF65-F5344CB8AC3E}">
+        <p14:creationId xmlns:p14="http://schemas.microsoft.com/office/powerpoint/2010/main" val="357275808"/>
+      </p:ext>
+    </p:extLst>
+  </p:cSld>
+  <p:clrMapOvr>
+    <a:masterClrMapping/>
+  </p:clrMapOvr>
+</p:notes>
+</file>
+
+<file path=ppt/notesSlides/notesSlide5.xml><?xml version="1.0" encoding="utf-8"?>
 <p:notes xmlns:a="http://schemas.openxmlformats.org/drawingml/2006/main" xmlns:r="http://schemas.openxmlformats.org/officeDocument/2006/relationships" xmlns:p="http://schemas.openxmlformats.org/presentationml/2006/main">
   <p:cSld>
     <p:spTree>
@@ -1232,7 +2025,7 @@
           <a:p>
             <a:fld id="{0FA2C36E-4514-46D1-9D76-0A014263E463}" type="slidenum">
               <a:rPr lang="en-US" smtClean="0"/>
-              <a:t>4</a:t>
+              <a:t>5</a:t>
             </a:fld>
             <a:endParaRPr lang="en-US"/>
           </a:p>
@@ -1251,7 +2044,7 @@
 </p:notes>
 </file>
 
-<file path=ppt/notesSlides/notesSlide5.xml><?xml version="1.0" encoding="utf-8"?>
+<file path=ppt/notesSlides/notesSlide6.xml><?xml version="1.0" encoding="utf-8"?>
 <p:notes xmlns:a="http://schemas.openxmlformats.org/drawingml/2006/main" xmlns:r="http://schemas.openxmlformats.org/officeDocument/2006/relationships" xmlns:p="http://schemas.openxmlformats.org/presentationml/2006/main">
   <p:cSld>
     <p:spTree>
@@ -1394,7 +2187,7 @@
           <a:p>
             <a:fld id="{0FA2C36E-4514-46D1-9D76-0A014263E463}" type="slidenum">
               <a:rPr lang="en-US" smtClean="0"/>
-              <a:t>5</a:t>
+              <a:t>6</a:t>
             </a:fld>
             <a:endParaRPr lang="en-US"/>
           </a:p>
@@ -1413,7 +2206,119 @@
 </p:notes>
 </file>
 
-<file path=ppt/notesSlides/notesSlide6.xml><?xml version="1.0" encoding="utf-8"?>
+<file path=ppt/notesSlides/notesSlide7.xml><?xml version="1.0" encoding="utf-8"?>
+<p:notes xmlns:a="http://schemas.openxmlformats.org/drawingml/2006/main" xmlns:r="http://schemas.openxmlformats.org/officeDocument/2006/relationships" xmlns:p="http://schemas.openxmlformats.org/presentationml/2006/main">
+  <p:cSld>
+    <p:spTree>
+      <p:nvGrpSpPr>
+        <p:cNvPr id="1" name="">
+          <a:extLst>
+            <a:ext uri="{FF2B5EF4-FFF2-40B4-BE49-F238E27FC236}">
+              <a16:creationId xmlns:a16="http://schemas.microsoft.com/office/drawing/2014/main" id="{08D678CA-5B08-E5BC-20F1-70931DFF5BD5}"/>
+            </a:ext>
+          </a:extLst>
+        </p:cNvPr>
+        <p:cNvGrpSpPr/>
+        <p:nvPr/>
+      </p:nvGrpSpPr>
+      <p:grpSpPr>
+        <a:xfrm>
+          <a:off x="0" y="0"/>
+          <a:ext cx="0" cy="0"/>
+          <a:chOff x="0" y="0"/>
+          <a:chExt cx="0" cy="0"/>
+        </a:xfrm>
+      </p:grpSpPr>
+      <p:sp>
+        <p:nvSpPr>
+          <p:cNvPr id="2" name="Slide Image Placeholder 1">
+            <a:extLst>
+              <a:ext uri="{FF2B5EF4-FFF2-40B4-BE49-F238E27FC236}">
+                <a16:creationId xmlns:a16="http://schemas.microsoft.com/office/drawing/2014/main" id="{44B9B2A1-98B4-FCE4-3191-17FDA357B523}"/>
+              </a:ext>
+            </a:extLst>
+          </p:cNvPr>
+          <p:cNvSpPr>
+            <a:spLocks noGrp="1" noRot="1" noChangeAspect="1"/>
+          </p:cNvSpPr>
+          <p:nvPr>
+            <p:ph type="sldImg"/>
+          </p:nvPr>
+        </p:nvSpPr>
+        <p:spPr/>
+      </p:sp>
+      <p:sp>
+        <p:nvSpPr>
+          <p:cNvPr id="3" name="Notes Placeholder 2">
+            <a:extLst>
+              <a:ext uri="{FF2B5EF4-FFF2-40B4-BE49-F238E27FC236}">
+                <a16:creationId xmlns:a16="http://schemas.microsoft.com/office/drawing/2014/main" id="{5EA1038D-893A-A258-A204-D76919431759}"/>
+              </a:ext>
+            </a:extLst>
+          </p:cNvPr>
+          <p:cNvSpPr>
+            <a:spLocks noGrp="1"/>
+          </p:cNvSpPr>
+          <p:nvPr>
+            <p:ph type="body" idx="1"/>
+          </p:nvPr>
+        </p:nvSpPr>
+        <p:spPr/>
+        <p:txBody>
+          <a:bodyPr/>
+          <a:lstStyle/>
+          <a:p>
+            <a:r>
+              <a:rPr lang="en-US" b="1" dirty="0"/>
+              <a:t>https://www.kali.org/docs/introduction/what-is-kali-linux/</a:t>
+            </a:r>
+            <a:endParaRPr lang="en-US" dirty="0"/>
+          </a:p>
+        </p:txBody>
+      </p:sp>
+      <p:sp>
+        <p:nvSpPr>
+          <p:cNvPr id="4" name="Slide Number Placeholder 3">
+            <a:extLst>
+              <a:ext uri="{FF2B5EF4-FFF2-40B4-BE49-F238E27FC236}">
+                <a16:creationId xmlns:a16="http://schemas.microsoft.com/office/drawing/2014/main" id="{E940DC84-6BE5-C3D4-F5AA-A1E62519F0C1}"/>
+              </a:ext>
+            </a:extLst>
+          </p:cNvPr>
+          <p:cNvSpPr>
+            <a:spLocks noGrp="1"/>
+          </p:cNvSpPr>
+          <p:nvPr>
+            <p:ph type="sldNum" sz="quarter" idx="5"/>
+          </p:nvPr>
+        </p:nvSpPr>
+        <p:spPr/>
+        <p:txBody>
+          <a:bodyPr/>
+          <a:lstStyle/>
+          <a:p>
+            <a:fld id="{0FA2C36E-4514-46D1-9D76-0A014263E463}" type="slidenum">
+              <a:rPr lang="en-US" smtClean="0"/>
+              <a:t>7</a:t>
+            </a:fld>
+            <a:endParaRPr lang="en-US"/>
+          </a:p>
+        </p:txBody>
+      </p:sp>
+    </p:spTree>
+    <p:extLst>
+      <p:ext uri="{BB962C8B-B14F-4D97-AF65-F5344CB8AC3E}">
+        <p14:creationId xmlns:p14="http://schemas.microsoft.com/office/powerpoint/2010/main" val="2817548518"/>
+      </p:ext>
+    </p:extLst>
+  </p:cSld>
+  <p:clrMapOvr>
+    <a:masterClrMapping/>
+  </p:clrMapOvr>
+</p:notes>
+</file>
+
+<file path=ppt/notesSlides/notesSlide8.xml><?xml version="1.0" encoding="utf-8"?>
 <p:notes xmlns:a="http://schemas.openxmlformats.org/drawingml/2006/main" xmlns:r="http://schemas.openxmlformats.org/officeDocument/2006/relationships" xmlns:p="http://schemas.openxmlformats.org/presentationml/2006/main">
   <p:cSld>
     <p:spTree>
@@ -1457,6 +2362,228 @@
           <a:bodyPr/>
           <a:lstStyle/>
           <a:p>
+            <a:r>
+              <a:rPr lang="en-US" dirty="0"/>
+              <a:t>https://www.kali.org/docs/installation/hard-disk-install/</a:t>
+            </a:r>
+          </a:p>
+          <a:p>
+            <a:endParaRPr lang="en-US" dirty="0"/>
+          </a:p>
+          <a:p>
+            <a:endParaRPr lang="en-US" dirty="0"/>
+          </a:p>
+          <a:p>
+            <a:r>
+              <a:rPr lang="en-US" b="1" dirty="0"/>
+              <a:t>What do these terms mean?</a:t>
+            </a:r>
+          </a:p>
+          <a:p>
+            <a:r>
+              <a:rPr lang="en-US" b="1" dirty="0"/>
+              <a:t>🔹 SSH Only</a:t>
+            </a:r>
+          </a:p>
+          <a:p>
+            <a:r>
+              <a:rPr lang="en-US" dirty="0"/>
+              <a:t>Stands for </a:t>
+            </a:r>
+            <a:r>
+              <a:rPr lang="en-US" b="1" dirty="0"/>
+              <a:t>Secure Shell</a:t>
+            </a:r>
+            <a:r>
+              <a:rPr lang="en-US" dirty="0"/>
+              <a:t> access only.</a:t>
+            </a:r>
+          </a:p>
+          <a:p>
+            <a:r>
+              <a:rPr lang="en-US" b="1" dirty="0"/>
+              <a:t>No desktop environment</a:t>
+            </a:r>
+            <a:r>
+              <a:rPr lang="en-US" dirty="0"/>
+              <a:t> (just terminal/command line).</a:t>
+            </a:r>
+          </a:p>
+          <a:p>
+            <a:r>
+              <a:rPr lang="en-US" dirty="0"/>
+              <a:t>Very lightweight – good for servers or virtual machines with low RAM.</a:t>
+            </a:r>
+          </a:p>
+          <a:p>
+            <a:r>
+              <a:rPr lang="en-US" dirty="0"/>
+              <a:t>Uses as little as </a:t>
+            </a:r>
+            <a:r>
+              <a:rPr lang="en-US" b="1" dirty="0"/>
+              <a:t>128 MB RAM</a:t>
+            </a:r>
+            <a:r>
+              <a:rPr lang="en-US" dirty="0"/>
+              <a:t> and </a:t>
+            </a:r>
+            <a:r>
+              <a:rPr lang="en-US" b="1" dirty="0"/>
+              <a:t>2 GB disk</a:t>
+            </a:r>
+            <a:r>
+              <a:rPr lang="en-US" dirty="0"/>
+              <a:t>.</a:t>
+            </a:r>
+          </a:p>
+          <a:p>
+            <a:r>
+              <a:rPr lang="en-US" dirty="0"/>
+              <a:t>You interact with it </a:t>
+            </a:r>
+            <a:r>
+              <a:rPr lang="en-US" b="1" dirty="0"/>
+              <a:t>via terminal</a:t>
+            </a:r>
+            <a:r>
+              <a:rPr lang="en-US" dirty="0"/>
+              <a:t> (locally or remotely).</a:t>
+            </a:r>
+          </a:p>
+          <a:p>
+            <a:r>
+              <a:rPr lang="en-US" b="1" dirty="0"/>
+              <a:t>🔹 </a:t>
+            </a:r>
+            <a:r>
+              <a:rPr lang="en-US" b="1" dirty="0" err="1"/>
+              <a:t>Xfce</a:t>
+            </a:r>
+            <a:r>
+              <a:rPr lang="en-US" b="1" dirty="0"/>
+              <a:t> (XFCE4)</a:t>
+            </a:r>
+          </a:p>
+          <a:p>
+            <a:r>
+              <a:rPr lang="en-US" dirty="0"/>
+              <a:t>A </a:t>
+            </a:r>
+            <a:r>
+              <a:rPr lang="en-US" b="1" dirty="0"/>
+              <a:t>desktop environment</a:t>
+            </a:r>
+            <a:r>
+              <a:rPr lang="en-US" dirty="0"/>
+              <a:t> for Linux — lightweight, fast, and beginner-friendly.</a:t>
+            </a:r>
+          </a:p>
+          <a:p>
+            <a:r>
+              <a:rPr lang="en-US" dirty="0"/>
+              <a:t>Gives you a </a:t>
+            </a:r>
+            <a:r>
+              <a:rPr lang="en-US" b="1" dirty="0"/>
+              <a:t>graphical interface</a:t>
+            </a:r>
+            <a:r>
+              <a:rPr lang="en-US" dirty="0"/>
+              <a:t> (like Windows-style).</a:t>
+            </a:r>
+          </a:p>
+          <a:p>
+            <a:r>
+              <a:rPr lang="en-US" dirty="0"/>
+              <a:t>Recommended for most users who want a GUI.</a:t>
+            </a:r>
+          </a:p>
+          <a:p>
+            <a:r>
+              <a:rPr lang="en-US" dirty="0"/>
+              <a:t>Needs </a:t>
+            </a:r>
+            <a:r>
+              <a:rPr lang="en-US" b="1" dirty="0"/>
+              <a:t>2 GB RAM</a:t>
+            </a:r>
+            <a:r>
+              <a:rPr lang="en-US" dirty="0"/>
+              <a:t> and </a:t>
+            </a:r>
+            <a:r>
+              <a:rPr lang="en-US" b="1" dirty="0"/>
+              <a:t>20 GB disk space</a:t>
+            </a:r>
+            <a:r>
+              <a:rPr lang="en-US" dirty="0"/>
+              <a:t>.</a:t>
+            </a:r>
+          </a:p>
+          <a:p>
+            <a:r>
+              <a:rPr lang="en-US" b="1" dirty="0"/>
+              <a:t>🔹 kali-</a:t>
+            </a:r>
+            <a:r>
+              <a:rPr lang="en-US" b="1" dirty="0" err="1"/>
+              <a:t>linux</a:t>
+            </a:r>
+            <a:r>
+              <a:rPr lang="en-US" b="1" dirty="0"/>
+              <a:t>-default metapackage</a:t>
+            </a:r>
+          </a:p>
+          <a:p>
+            <a:r>
+              <a:rPr lang="en-US" dirty="0"/>
+              <a:t>A </a:t>
+            </a:r>
+            <a:r>
+              <a:rPr lang="en-US" b="1" dirty="0"/>
+              <a:t>bundle of tools</a:t>
+            </a:r>
+            <a:r>
+              <a:rPr lang="en-US" dirty="0"/>
+              <a:t> that come pre-installed in Kali Linux.</a:t>
+            </a:r>
+          </a:p>
+          <a:p>
+            <a:r>
+              <a:rPr lang="en-US" dirty="0"/>
+              <a:t>Includes tools like Nmap, Wireshark, Metasploit, Burp Suite, etc.</a:t>
+            </a:r>
+          </a:p>
+          <a:p>
+            <a:r>
+              <a:rPr lang="en-US" dirty="0"/>
+              <a:t>If you install this, you're getting the </a:t>
+            </a:r>
+            <a:r>
+              <a:rPr lang="en-US" b="1" dirty="0"/>
+              <a:t>full Kali experience</a:t>
+            </a:r>
+            <a:r>
+              <a:rPr lang="en-US" dirty="0"/>
+              <a:t>.</a:t>
+            </a:r>
+          </a:p>
+          <a:p>
+            <a:r>
+              <a:rPr lang="en-US" dirty="0"/>
+              <a:t>Needs </a:t>
+            </a:r>
+            <a:r>
+              <a:rPr lang="en-US" b="1" dirty="0"/>
+              <a:t>more RAM</a:t>
+            </a:r>
+            <a:r>
+              <a:rPr lang="en-US" dirty="0"/>
+              <a:t> (especially if using heavy tools).</a:t>
+            </a:r>
+          </a:p>
+          <a:p>
             <a:endParaRPr lang="en-US" dirty="0"/>
           </a:p>
         </p:txBody>
@@ -1478,7 +2605,7 @@
           <a:p>
             <a:fld id="{82869989-EB00-4EE7-BCB5-25BDC5BB29F8}" type="slidenum">
               <a:rPr lang="en-US" smtClean="0"/>
-              <a:t>6</a:t>
+              <a:t>8</a:t>
             </a:fld>
             <a:endParaRPr lang="en-US"/>
           </a:p>
@@ -1497,7 +2624,7 @@
 </p:notes>
 </file>
 
-<file path=ppt/notesSlides/notesSlide7.xml><?xml version="1.0" encoding="utf-8"?>
+<file path=ppt/notesSlides/notesSlide9.xml><?xml version="1.0" encoding="utf-8"?>
 <p:notes xmlns:a="http://schemas.openxmlformats.org/drawingml/2006/main" xmlns:r="http://schemas.openxmlformats.org/officeDocument/2006/relationships" xmlns:p="http://schemas.openxmlformats.org/presentationml/2006/main">
   <p:cSld>
     <p:spTree>
@@ -1505,7 +2632,7 @@
         <p:cNvPr id="1" name="">
           <a:extLst>
             <a:ext uri="{FF2B5EF4-FFF2-40B4-BE49-F238E27FC236}">
-              <a16:creationId xmlns:a16="http://schemas.microsoft.com/office/drawing/2014/main" id="{F10EABBD-BC8D-82DA-2ED5-DC3ADEC8D340}"/>
+              <a16:creationId xmlns:a16="http://schemas.microsoft.com/office/drawing/2014/main" id="{0E9729AE-9E53-6B67-B175-77A921B32E28}"/>
             </a:ext>
           </a:extLst>
         </p:cNvPr>
@@ -1525,7 +2652,7 @@
           <p:cNvPr id="2" name="Slide Image Placeholder 1">
             <a:extLst>
               <a:ext uri="{FF2B5EF4-FFF2-40B4-BE49-F238E27FC236}">
-                <a16:creationId xmlns:a16="http://schemas.microsoft.com/office/drawing/2014/main" id="{36B24FEE-060F-EDFB-1842-7A4E90077979}"/>
+                <a16:creationId xmlns:a16="http://schemas.microsoft.com/office/drawing/2014/main" id="{4BC363FB-3286-8435-7F9E-4857AA91C0C7}"/>
               </a:ext>
             </a:extLst>
           </p:cNvPr>
@@ -1543,7 +2670,7 @@
           <p:cNvPr id="3" name="Notes Placeholder 2">
             <a:extLst>
               <a:ext uri="{FF2B5EF4-FFF2-40B4-BE49-F238E27FC236}">
-                <a16:creationId xmlns:a16="http://schemas.microsoft.com/office/drawing/2014/main" id="{399D80C7-11E5-7629-7754-C3FC5D61A1BD}"/>
+                <a16:creationId xmlns:a16="http://schemas.microsoft.com/office/drawing/2014/main" id="{8DAF723C-5E1D-D3D2-C5F8-EADBF0A1B2BE}"/>
               </a:ext>
             </a:extLst>
           </p:cNvPr>
@@ -1559,36 +2686,6 @@
           <a:bodyPr/>
           <a:lstStyle/>
           <a:p>
-            <a:r>
-              <a:rPr lang="en-US" dirty="0" err="1"/>
-              <a:t>pwd</a:t>
-            </a:r>
-            <a:r>
-              <a:rPr lang="en-US" dirty="0"/>
-              <a:t> shows you where you are in the file system.</a:t>
-            </a:r>
-          </a:p>
-          <a:p>
-            <a:r>
-              <a:rPr lang="en-US" dirty="0"/>
-              <a:t>cd </a:t>
-            </a:r>
-            <a:r>
-              <a:rPr lang="en-US" dirty="0" err="1"/>
-              <a:t>foldername</a:t>
-            </a:r>
-            <a:r>
-              <a:rPr lang="en-US" dirty="0"/>
-              <a:t> lets you move into folders.</a:t>
-            </a:r>
-          </a:p>
-          <a:p>
-            <a:r>
-              <a:rPr lang="en-US" dirty="0"/>
-              <a:t>ls lists contents in the current folder. Use ls -l for detailed view.</a:t>
-            </a:r>
-          </a:p>
-          <a:p>
             <a:endParaRPr lang="en-US" dirty="0"/>
           </a:p>
         </p:txBody>
@@ -1598,7 +2695,7 @@
           <p:cNvPr id="4" name="Slide Number Placeholder 3">
             <a:extLst>
               <a:ext uri="{FF2B5EF4-FFF2-40B4-BE49-F238E27FC236}">
-                <a16:creationId xmlns:a16="http://schemas.microsoft.com/office/drawing/2014/main" id="{808B5BFA-E578-661B-AF47-8389BB06B9F8}"/>
+                <a16:creationId xmlns:a16="http://schemas.microsoft.com/office/drawing/2014/main" id="{1C8C1B83-135B-CB6C-CD23-E8E6FB0EB58B}"/>
               </a:ext>
             </a:extLst>
           </p:cNvPr>
@@ -1616,7 +2713,7 @@
           <a:p>
             <a:fld id="{82869989-EB00-4EE7-BCB5-25BDC5BB29F8}" type="slidenum">
               <a:rPr lang="en-US" smtClean="0"/>
-              <a:t>7</a:t>
+              <a:t>9</a:t>
             </a:fld>
             <a:endParaRPr lang="en-US"/>
           </a:p>
@@ -1625,548 +2722,7 @@
     </p:spTree>
     <p:extLst>
       <p:ext uri="{BB962C8B-B14F-4D97-AF65-F5344CB8AC3E}">
-        <p14:creationId xmlns:p14="http://schemas.microsoft.com/office/powerpoint/2010/main" val="268914562"/>
-      </p:ext>
-    </p:extLst>
-  </p:cSld>
-  <p:clrMapOvr>
-    <a:masterClrMapping/>
-  </p:clrMapOvr>
-</p:notes>
-</file>
-
-<file path=ppt/notesSlides/notesSlide8.xml><?xml version="1.0" encoding="utf-8"?>
-<p:notes xmlns:a="http://schemas.openxmlformats.org/drawingml/2006/main" xmlns:r="http://schemas.openxmlformats.org/officeDocument/2006/relationships" xmlns:p="http://schemas.openxmlformats.org/presentationml/2006/main">
-  <p:cSld>
-    <p:spTree>
-      <p:nvGrpSpPr>
-        <p:cNvPr id="1" name="">
-          <a:extLst>
-            <a:ext uri="{FF2B5EF4-FFF2-40B4-BE49-F238E27FC236}">
-              <a16:creationId xmlns:a16="http://schemas.microsoft.com/office/drawing/2014/main" id="{426112F3-08C9-0260-7304-5681AF47ADB6}"/>
-            </a:ext>
-          </a:extLst>
-        </p:cNvPr>
-        <p:cNvGrpSpPr/>
-        <p:nvPr/>
-      </p:nvGrpSpPr>
-      <p:grpSpPr>
-        <a:xfrm>
-          <a:off x="0" y="0"/>
-          <a:ext cx="0" cy="0"/>
-          <a:chOff x="0" y="0"/>
-          <a:chExt cx="0" cy="0"/>
-        </a:xfrm>
-      </p:grpSpPr>
-      <p:sp>
-        <p:nvSpPr>
-          <p:cNvPr id="2" name="Slide Image Placeholder 1">
-            <a:extLst>
-              <a:ext uri="{FF2B5EF4-FFF2-40B4-BE49-F238E27FC236}">
-                <a16:creationId xmlns:a16="http://schemas.microsoft.com/office/drawing/2014/main" id="{458F4D28-1CEF-BDB9-9A57-9A31129A02B7}"/>
-              </a:ext>
-            </a:extLst>
-          </p:cNvPr>
-          <p:cNvSpPr>
-            <a:spLocks noGrp="1" noRot="1" noChangeAspect="1"/>
-          </p:cNvSpPr>
-          <p:nvPr>
-            <p:ph type="sldImg"/>
-          </p:nvPr>
-        </p:nvSpPr>
-        <p:spPr/>
-      </p:sp>
-      <p:sp>
-        <p:nvSpPr>
-          <p:cNvPr id="3" name="Notes Placeholder 2">
-            <a:extLst>
-              <a:ext uri="{FF2B5EF4-FFF2-40B4-BE49-F238E27FC236}">
-                <a16:creationId xmlns:a16="http://schemas.microsoft.com/office/drawing/2014/main" id="{263FCE9E-EE1E-1EA4-8C86-3C6A680771F7}"/>
-              </a:ext>
-            </a:extLst>
-          </p:cNvPr>
-          <p:cNvSpPr>
-            <a:spLocks noGrp="1"/>
-          </p:cNvSpPr>
-          <p:nvPr>
-            <p:ph type="body" idx="1"/>
-          </p:nvPr>
-        </p:nvSpPr>
-        <p:spPr/>
-        <p:txBody>
-          <a:bodyPr/>
-          <a:lstStyle/>
-          <a:p>
-            <a:r>
-              <a:rPr lang="en-US" dirty="0"/>
-              <a:t>View permissions:</a:t>
-            </a:r>
-          </a:p>
-          <a:p>
-            <a:r>
-              <a:rPr lang="en-US" dirty="0"/>
-              <a:t>ls -l file.txt</a:t>
-            </a:r>
-          </a:p>
-          <a:p>
-            <a:endParaRPr lang="en-US" dirty="0"/>
-          </a:p>
-          <a:p>
-            <a:r>
-              <a:rPr lang="en-US" dirty="0"/>
-              <a:t>Change permissions:</a:t>
-            </a:r>
-          </a:p>
-          <a:p>
-            <a:r>
-              <a:rPr lang="en-US" dirty="0" err="1"/>
-              <a:t>chmod</a:t>
-            </a:r>
-            <a:r>
-              <a:rPr lang="en-US" dirty="0"/>
-              <a:t> 755 script.sh</a:t>
-            </a:r>
-          </a:p>
-          <a:p>
-            <a:endParaRPr lang="en-US" dirty="0"/>
-          </a:p>
-          <a:p>
-            <a:r>
-              <a:rPr lang="en-US" dirty="0"/>
-              <a:t>Change owner:</a:t>
-            </a:r>
-          </a:p>
-          <a:p>
-            <a:r>
-              <a:rPr lang="en-US" dirty="0" err="1"/>
-              <a:t>chown</a:t>
-            </a:r>
-            <a:r>
-              <a:rPr lang="en-US" dirty="0"/>
-              <a:t> </a:t>
-            </a:r>
-            <a:r>
-              <a:rPr lang="en-US" dirty="0" err="1"/>
-              <a:t>user:group</a:t>
-            </a:r>
-            <a:r>
-              <a:rPr lang="en-US" dirty="0"/>
-              <a:t> file.txt</a:t>
-            </a:r>
-          </a:p>
-          <a:p>
-            <a:endParaRPr lang="en-US" dirty="0"/>
-          </a:p>
-          <a:p>
-            <a:r>
-              <a:rPr lang="en-US" dirty="0"/>
-              <a:t>Permission Output Example:</a:t>
-            </a:r>
-          </a:p>
-          <a:p>
-            <a:endParaRPr lang="en-US" dirty="0"/>
-          </a:p>
-          <a:p>
-            <a:r>
-              <a:rPr lang="en-US" dirty="0"/>
-              <a:t>-</a:t>
-            </a:r>
-            <a:r>
-              <a:rPr lang="en-US" dirty="0" err="1"/>
-              <a:t>rwxr-xr</a:t>
-            </a:r>
-            <a:r>
-              <a:rPr lang="en-US" dirty="0"/>
-              <a:t>--  1 user group  file.txt</a:t>
-            </a:r>
-          </a:p>
-          <a:p>
-            <a:endParaRPr lang="en-US" dirty="0"/>
-          </a:p>
-          <a:p>
-            <a:endParaRPr lang="en-US" dirty="0"/>
-          </a:p>
-          <a:p>
-            <a:endParaRPr lang="en-US" dirty="0"/>
-          </a:p>
-          <a:p>
-            <a:r>
-              <a:rPr lang="en-US" dirty="0"/>
-              <a:t>Let's break down how it works:</a:t>
-            </a:r>
-          </a:p>
-          <a:p>
-            <a:endParaRPr lang="en-US" dirty="0"/>
-          </a:p>
-          <a:p>
-            <a:r>
-              <a:rPr lang="en-US" dirty="0" err="1"/>
-              <a:t>chmod</a:t>
-            </a:r>
-            <a:endParaRPr lang="en-US" dirty="0"/>
-          </a:p>
-          <a:p>
-            <a:r>
-              <a:rPr lang="en-US" dirty="0"/>
-              <a:t>This is the command itself, short for "change mode." It's used to modify file permissions.</a:t>
-            </a:r>
-          </a:p>
-          <a:p>
-            <a:endParaRPr lang="en-US" dirty="0"/>
-          </a:p>
-          <a:p>
-            <a:r>
-              <a:rPr lang="en-US" dirty="0"/>
-              <a:t>755</a:t>
-            </a:r>
-          </a:p>
-          <a:p>
-            <a:r>
-              <a:rPr lang="en-US" dirty="0"/>
-              <a:t>This is the octal representation of the permissions, and it's the core of the command. It's a three-digit number, where each digit corresponds to a specific set of permissions:</a:t>
-            </a:r>
-          </a:p>
-          <a:p>
-            <a:endParaRPr lang="en-US" dirty="0"/>
-          </a:p>
-          <a:p>
-            <a:r>
-              <a:rPr lang="en-US" dirty="0"/>
-              <a:t>First Digit (7): Owner Permissions</a:t>
-            </a:r>
-          </a:p>
-          <a:p>
-            <a:endParaRPr lang="en-US" dirty="0"/>
-          </a:p>
-          <a:p>
-            <a:r>
-              <a:rPr lang="en-US" dirty="0"/>
-              <a:t>This 7 means the owner of the file has read, write, and execute permissions.</a:t>
-            </a:r>
-          </a:p>
-          <a:p>
-            <a:endParaRPr lang="en-US" dirty="0"/>
-          </a:p>
-          <a:p>
-            <a:r>
-              <a:rPr lang="en-US" dirty="0"/>
-              <a:t>Second Digit (5): Group Permissions</a:t>
-            </a:r>
-          </a:p>
-          <a:p>
-            <a:endParaRPr lang="en-US" dirty="0"/>
-          </a:p>
-          <a:p>
-            <a:r>
-              <a:rPr lang="en-US" dirty="0"/>
-              <a:t>This 5 means users belonging to the file's group have read and execute permissions, but not write permission.</a:t>
-            </a:r>
-          </a:p>
-          <a:p>
-            <a:endParaRPr lang="en-US" dirty="0"/>
-          </a:p>
-          <a:p>
-            <a:r>
-              <a:rPr lang="en-US" dirty="0"/>
-              <a:t>Third Digit (5): Others Permissions</a:t>
-            </a:r>
-          </a:p>
-          <a:p>
-            <a:endParaRPr lang="en-US" dirty="0"/>
-          </a:p>
-          <a:p>
-            <a:r>
-              <a:rPr lang="en-US" dirty="0"/>
-              <a:t>This 5 means all other users on the system (who are neither the owner nor in the file's group) have read and execute permissions, but not write permission.</a:t>
-            </a:r>
-          </a:p>
-          <a:p>
-            <a:endParaRPr lang="en-US" dirty="0"/>
-          </a:p>
-          <a:p>
-            <a:r>
-              <a:rPr lang="en-US" dirty="0"/>
-              <a:t>How the Numbers Map to Permissions:</a:t>
-            </a:r>
-          </a:p>
-          <a:p>
-            <a:r>
-              <a:rPr lang="en-US" dirty="0"/>
-              <a:t>Each permission type has a numerical value:</a:t>
-            </a:r>
-          </a:p>
-          <a:p>
-            <a:endParaRPr lang="en-US" dirty="0"/>
-          </a:p>
-          <a:p>
-            <a:r>
-              <a:rPr lang="en-US" dirty="0"/>
-              <a:t>r (read) = 4</a:t>
-            </a:r>
-          </a:p>
-          <a:p>
-            <a:endParaRPr lang="en-US" dirty="0"/>
-          </a:p>
-          <a:p>
-            <a:r>
-              <a:rPr lang="en-US" dirty="0"/>
-              <a:t>w (write) = 2</a:t>
-            </a:r>
-          </a:p>
-          <a:p>
-            <a:endParaRPr lang="en-US" dirty="0"/>
-          </a:p>
-          <a:p>
-            <a:r>
-              <a:rPr lang="en-US" dirty="0"/>
-              <a:t>x (execute) = 1</a:t>
-            </a:r>
-          </a:p>
-          <a:p>
-            <a:endParaRPr lang="en-US" dirty="0"/>
-          </a:p>
-          <a:p>
-            <a:r>
-              <a:rPr lang="en-US" dirty="0"/>
-              <a:t>No permission = 0</a:t>
-            </a:r>
-          </a:p>
-          <a:p>
-            <a:endParaRPr lang="en-US" dirty="0"/>
-          </a:p>
-          <a:p>
-            <a:r>
-              <a:rPr lang="en-US" dirty="0"/>
-              <a:t>To get the digit for each set of permissions, you add up the values for the desired permissions:</a:t>
-            </a:r>
-          </a:p>
-          <a:p>
-            <a:endParaRPr lang="en-US" dirty="0"/>
-          </a:p>
-          <a:p>
-            <a:r>
-              <a:rPr lang="en-US" dirty="0"/>
-              <a:t>7 = r (4) + w (2) + x (1) = Read, Write, Execute</a:t>
-            </a:r>
-          </a:p>
-          <a:p>
-            <a:endParaRPr lang="en-US" dirty="0"/>
-          </a:p>
-          <a:p>
-            <a:r>
-              <a:rPr lang="en-US" dirty="0"/>
-              <a:t>5 = r (4) + x (1) = Read, Execute</a:t>
-            </a:r>
-          </a:p>
-          <a:p>
-            <a:endParaRPr lang="en-US" dirty="0"/>
-          </a:p>
-          <a:p>
-            <a:r>
-              <a:rPr lang="en-US" dirty="0"/>
-              <a:t>6 = r (4) + w (2) = Read, Write</a:t>
-            </a:r>
-          </a:p>
-          <a:p>
-            <a:endParaRPr lang="en-US" dirty="0"/>
-          </a:p>
-          <a:p>
-            <a:r>
-              <a:rPr lang="en-US" dirty="0"/>
-              <a:t>4 = r (4) = Read only</a:t>
-            </a:r>
-          </a:p>
-          <a:p>
-            <a:endParaRPr lang="en-US" dirty="0"/>
-          </a:p>
-          <a:p>
-            <a:r>
-              <a:rPr lang="en-US" dirty="0"/>
-              <a:t>So, 755 translates to:</a:t>
-            </a:r>
-          </a:p>
-          <a:p>
-            <a:endParaRPr lang="en-US" dirty="0"/>
-          </a:p>
-          <a:p>
-            <a:r>
-              <a:rPr lang="en-US" dirty="0"/>
-              <a:t>Owner: Read, Write, Execute</a:t>
-            </a:r>
-          </a:p>
-          <a:p>
-            <a:endParaRPr lang="en-US" dirty="0"/>
-          </a:p>
-          <a:p>
-            <a:r>
-              <a:rPr lang="en-US" dirty="0"/>
-              <a:t>Group: Read, Execute</a:t>
-            </a:r>
-          </a:p>
-          <a:p>
-            <a:endParaRPr lang="en-US" dirty="0"/>
-          </a:p>
-          <a:p>
-            <a:r>
-              <a:rPr lang="en-US" dirty="0"/>
-              <a:t>Others: Read, Execute</a:t>
-            </a:r>
-          </a:p>
-          <a:p>
-            <a:endParaRPr lang="en-US" dirty="0"/>
-          </a:p>
-          <a:p>
-            <a:endParaRPr lang="en-US" dirty="0"/>
-          </a:p>
-          <a:p>
-            <a:endParaRPr lang="en-US" dirty="0"/>
-          </a:p>
-        </p:txBody>
-      </p:sp>
-      <p:sp>
-        <p:nvSpPr>
-          <p:cNvPr id="4" name="Slide Number Placeholder 3">
-            <a:extLst>
-              <a:ext uri="{FF2B5EF4-FFF2-40B4-BE49-F238E27FC236}">
-                <a16:creationId xmlns:a16="http://schemas.microsoft.com/office/drawing/2014/main" id="{5DC4B489-A24F-5F24-7A3C-D9D8BF866830}"/>
-              </a:ext>
-            </a:extLst>
-          </p:cNvPr>
-          <p:cNvSpPr>
-            <a:spLocks noGrp="1"/>
-          </p:cNvSpPr>
-          <p:nvPr>
-            <p:ph type="sldNum" sz="quarter" idx="5"/>
-          </p:nvPr>
-        </p:nvSpPr>
-        <p:spPr/>
-        <p:txBody>
-          <a:bodyPr/>
-          <a:lstStyle/>
-          <a:p>
-            <a:fld id="{82869989-EB00-4EE7-BCB5-25BDC5BB29F8}" type="slidenum">
-              <a:rPr lang="en-US" smtClean="0"/>
-              <a:t>8</a:t>
-            </a:fld>
-            <a:endParaRPr lang="en-US"/>
-          </a:p>
-        </p:txBody>
-      </p:sp>
-    </p:spTree>
-    <p:extLst>
-      <p:ext uri="{BB962C8B-B14F-4D97-AF65-F5344CB8AC3E}">
-        <p14:creationId xmlns:p14="http://schemas.microsoft.com/office/powerpoint/2010/main" val="3635696968"/>
-      </p:ext>
-    </p:extLst>
-  </p:cSld>
-  <p:clrMapOvr>
-    <a:masterClrMapping/>
-  </p:clrMapOvr>
-</p:notes>
-</file>
-
-<file path=ppt/notesSlides/notesSlide9.xml><?xml version="1.0" encoding="utf-8"?>
-<p:notes xmlns:a="http://schemas.openxmlformats.org/drawingml/2006/main" xmlns:r="http://schemas.openxmlformats.org/officeDocument/2006/relationships" xmlns:p="http://schemas.openxmlformats.org/presentationml/2006/main">
-  <p:cSld>
-    <p:spTree>
-      <p:nvGrpSpPr>
-        <p:cNvPr id="1" name="">
-          <a:extLst>
-            <a:ext uri="{FF2B5EF4-FFF2-40B4-BE49-F238E27FC236}">
-              <a16:creationId xmlns:a16="http://schemas.microsoft.com/office/drawing/2014/main" id="{4431E3D5-8F82-DE77-B2C8-0A272A3F88DE}"/>
-            </a:ext>
-          </a:extLst>
-        </p:cNvPr>
-        <p:cNvGrpSpPr/>
-        <p:nvPr/>
-      </p:nvGrpSpPr>
-      <p:grpSpPr>
-        <a:xfrm>
-          <a:off x="0" y="0"/>
-          <a:ext cx="0" cy="0"/>
-          <a:chOff x="0" y="0"/>
-          <a:chExt cx="0" cy="0"/>
-        </a:xfrm>
-      </p:grpSpPr>
-      <p:sp>
-        <p:nvSpPr>
-          <p:cNvPr id="2" name="Slide Image Placeholder 1">
-            <a:extLst>
-              <a:ext uri="{FF2B5EF4-FFF2-40B4-BE49-F238E27FC236}">
-                <a16:creationId xmlns:a16="http://schemas.microsoft.com/office/drawing/2014/main" id="{D0259ADA-C42F-122B-6270-3B3D7D2DC9A7}"/>
-              </a:ext>
-            </a:extLst>
-          </p:cNvPr>
-          <p:cNvSpPr>
-            <a:spLocks noGrp="1" noRot="1" noChangeAspect="1"/>
-          </p:cNvSpPr>
-          <p:nvPr>
-            <p:ph type="sldImg"/>
-          </p:nvPr>
-        </p:nvSpPr>
-        <p:spPr/>
-      </p:sp>
-      <p:sp>
-        <p:nvSpPr>
-          <p:cNvPr id="3" name="Notes Placeholder 2">
-            <a:extLst>
-              <a:ext uri="{FF2B5EF4-FFF2-40B4-BE49-F238E27FC236}">
-                <a16:creationId xmlns:a16="http://schemas.microsoft.com/office/drawing/2014/main" id="{AB761E8E-2C23-8C3D-DE0B-95E0E8D61B10}"/>
-              </a:ext>
-            </a:extLst>
-          </p:cNvPr>
-          <p:cNvSpPr>
-            <a:spLocks noGrp="1"/>
-          </p:cNvSpPr>
-          <p:nvPr>
-            <p:ph type="body" idx="1"/>
-          </p:nvPr>
-        </p:nvSpPr>
-        <p:spPr/>
-        <p:txBody>
-          <a:bodyPr/>
-          <a:lstStyle/>
-          <a:p>
-            <a:r>
-              <a:rPr lang="en-US" dirty="0"/>
-              <a:t>System administrators manage access and privileges by grouping users and assigning permissions accordingly</a:t>
-            </a:r>
-          </a:p>
-        </p:txBody>
-      </p:sp>
-      <p:sp>
-        <p:nvSpPr>
-          <p:cNvPr id="4" name="Slide Number Placeholder 3">
-            <a:extLst>
-              <a:ext uri="{FF2B5EF4-FFF2-40B4-BE49-F238E27FC236}">
-                <a16:creationId xmlns:a16="http://schemas.microsoft.com/office/drawing/2014/main" id="{ADC26EA4-CDB9-DA49-2A4A-E6DDEEA6FC46}"/>
-              </a:ext>
-            </a:extLst>
-          </p:cNvPr>
-          <p:cNvSpPr>
-            <a:spLocks noGrp="1"/>
-          </p:cNvSpPr>
-          <p:nvPr>
-            <p:ph type="sldNum" sz="quarter" idx="5"/>
-          </p:nvPr>
-        </p:nvSpPr>
-        <p:spPr/>
-        <p:txBody>
-          <a:bodyPr/>
-          <a:lstStyle/>
-          <a:p>
-            <a:fld id="{82869989-EB00-4EE7-BCB5-25BDC5BB29F8}" type="slidenum">
-              <a:rPr lang="en-US" smtClean="0"/>
-              <a:t>9</a:t>
-            </a:fld>
-            <a:endParaRPr lang="en-US"/>
-          </a:p>
-        </p:txBody>
-      </p:sp>
-    </p:spTree>
-    <p:extLst>
-      <p:ext uri="{BB962C8B-B14F-4D97-AF65-F5344CB8AC3E}">
-        <p14:creationId xmlns:p14="http://schemas.microsoft.com/office/powerpoint/2010/main" val="1261773958"/>
+        <p14:creationId xmlns:p14="http://schemas.microsoft.com/office/powerpoint/2010/main" val="2139334104"/>
       </p:ext>
     </p:extLst>
   </p:cSld>
@@ -4317,7 +4873,7 @@
           <a:p>
             <a:fld id="{384A29A4-78C8-47AB-BA06-22CB45938951}" type="datetime1">
               <a:rPr lang="en-US" smtClean="0"/>
-              <a:t>7/19/2025</a:t>
+              <a:t>7/21/2025</a:t>
             </a:fld>
             <a:endParaRPr lang="en-US"/>
           </a:p>
@@ -4512,7 +5068,7 @@
           <a:p>
             <a:fld id="{E1ED4ACF-2D82-46F2-A8E9-23963AA34E86}" type="datetime1">
               <a:rPr lang="en-US" smtClean="0"/>
-              <a:t>7/19/2025</a:t>
+              <a:t>7/21/2025</a:t>
             </a:fld>
             <a:endParaRPr lang="en-US"/>
           </a:p>
@@ -4696,7 +5252,7 @@
           <a:p>
             <a:fld id="{AE374B5B-21A0-4192-BF4C-38187F1A68D8}" type="datetime1">
               <a:rPr lang="en-US" smtClean="0"/>
-              <a:t>7/19/2025</a:t>
+              <a:t>7/21/2025</a:t>
             </a:fld>
             <a:endParaRPr lang="en-US"/>
           </a:p>
@@ -7037,7 +7593,7 @@
           <a:p>
             <a:fld id="{33B5CF7C-B333-48E1-A4A6-83A3C8B73AC0}" type="datetime1">
               <a:rPr lang="en-US" smtClean="0"/>
-              <a:t>7/19/2025</a:t>
+              <a:t>7/21/2025</a:t>
             </a:fld>
             <a:endParaRPr lang="en-US"/>
           </a:p>
@@ -7490,7 +8046,7 @@
           <a:p>
             <a:fld id="{AE320762-5CBF-4210-AB54-376B091119F8}" type="datetime1">
               <a:rPr lang="en-US" smtClean="0"/>
-              <a:t>7/19/2025</a:t>
+              <a:t>7/21/2025</a:t>
             </a:fld>
             <a:endParaRPr lang="en-US"/>
           </a:p>
@@ -7622,7 +8178,7 @@
           <a:p>
             <a:fld id="{7F0DB371-BF5F-4058-A212-1A908E4D2674}" type="datetime1">
               <a:rPr lang="en-US" smtClean="0"/>
-              <a:t>7/19/2025</a:t>
+              <a:t>7/21/2025</a:t>
             </a:fld>
             <a:endParaRPr lang="en-US"/>
           </a:p>
@@ -9555,7 +10111,7 @@
           <a:p>
             <a:fld id="{60A4083B-90AA-48CF-BAD5-00AA24D7F288}" type="datetime1">
               <a:rPr lang="en-US" smtClean="0"/>
-              <a:t>7/19/2025</a:t>
+              <a:t>7/21/2025</a:t>
             </a:fld>
             <a:endParaRPr lang="en-US"/>
           </a:p>
@@ -11814,7 +12370,7 @@
             <a:fld id="{F5BAF629-ECA2-4CF3-B790-9D9BDED98269}" type="datetime1">
               <a:rPr lang="en-US" smtClean="0"/>
               <a:pPr/>
-              <a:t>7/19/2025</a:t>
+              <a:t>7/21/2025</a:t>
             </a:fld>
             <a:endParaRPr lang="en-US"/>
           </a:p>
@@ -16109,7 +16665,7 @@
             <a:fld id="{B51B2453-8663-4C69-AF73-9FD7B1DEC5D0}" type="datetime1">
               <a:rPr lang="en-US" smtClean="0"/>
               <a:pPr/>
-              <a:t>7/19/2025</a:t>
+              <a:t>7/21/2025</a:t>
             </a:fld>
             <a:endParaRPr lang="en-US" dirty="0"/>
           </a:p>
@@ -16642,6 +17198,814 @@
   <p:cSld>
     <p:spTree>
       <p:nvGrpSpPr>
+        <p:cNvPr id="1" name="">
+          <a:extLst>
+            <a:ext uri="{FF2B5EF4-FFF2-40B4-BE49-F238E27FC236}">
+              <a16:creationId xmlns:a16="http://schemas.microsoft.com/office/drawing/2014/main" id="{096E4C19-C511-AF73-801B-99E42AA9A53B}"/>
+            </a:ext>
+          </a:extLst>
+        </p:cNvPr>
+        <p:cNvGrpSpPr/>
+        <p:nvPr/>
+      </p:nvGrpSpPr>
+      <p:grpSpPr>
+        <a:xfrm>
+          <a:off x="0" y="0"/>
+          <a:ext cx="0" cy="0"/>
+          <a:chOff x="0" y="0"/>
+          <a:chExt cx="0" cy="0"/>
+        </a:xfrm>
+      </p:grpSpPr>
+      <p:sp>
+        <p:nvSpPr>
+          <p:cNvPr id="2" name="Title 1">
+            <a:extLst>
+              <a:ext uri="{FF2B5EF4-FFF2-40B4-BE49-F238E27FC236}">
+                <a16:creationId xmlns:a16="http://schemas.microsoft.com/office/drawing/2014/main" id="{ED61B802-0AD0-CC01-C9E5-1FC51B9717A9}"/>
+              </a:ext>
+            </a:extLst>
+          </p:cNvPr>
+          <p:cNvSpPr>
+            <a:spLocks noGrp="1"/>
+          </p:cNvSpPr>
+          <p:nvPr>
+            <p:ph type="title"/>
+          </p:nvPr>
+        </p:nvSpPr>
+        <p:spPr>
+          <a:xfrm>
+            <a:off x="1295400" y="503853"/>
+            <a:ext cx="9601200" cy="1142385"/>
+          </a:xfrm>
+        </p:spPr>
+        <p:txBody>
+          <a:bodyPr vert="horz" lIns="91440" tIns="45720" rIns="91440" bIns="45720" rtlCol="0" anchor="b">
+            <a:normAutofit/>
+          </a:bodyPr>
+          <a:lstStyle/>
+          <a:p>
+            <a:r>
+              <a:rPr lang="en-US" b="1" kern="1200" dirty="0">
+                <a:latin typeface="+mj-lt"/>
+                <a:ea typeface="+mj-ea"/>
+                <a:cs typeface="+mj-cs"/>
+              </a:rPr>
+              <a:t>Navigating Linux using CLI</a:t>
+            </a:r>
+          </a:p>
+        </p:txBody>
+      </p:sp>
+      <p:sp>
+        <p:nvSpPr>
+          <p:cNvPr id="8" name="TextBox 7">
+            <a:extLst>
+              <a:ext uri="{FF2B5EF4-FFF2-40B4-BE49-F238E27FC236}">
+                <a16:creationId xmlns:a16="http://schemas.microsoft.com/office/drawing/2014/main" id="{20941964-AF5A-33CF-A946-513D0AAE6DC3}"/>
+              </a:ext>
+            </a:extLst>
+          </p:cNvPr>
+          <p:cNvSpPr txBox="1"/>
+          <p:nvPr/>
+        </p:nvSpPr>
+        <p:spPr>
+          <a:xfrm>
+            <a:off x="1295400" y="1981201"/>
+            <a:ext cx="9601200" cy="3809999"/>
+          </a:xfrm>
+          <a:prstGeom prst="rect">
+            <a:avLst/>
+          </a:prstGeom>
+        </p:spPr>
+        <p:txBody>
+          <a:bodyPr vert="horz" lIns="91440" tIns="45720" rIns="91440" bIns="45720" rtlCol="0">
+            <a:normAutofit/>
+          </a:bodyPr>
+          <a:lstStyle/>
+          <a:p>
+            <a:pPr marL="228600" indent="-228600">
+              <a:lnSpc>
+                <a:spcPct val="90000"/>
+              </a:lnSpc>
+              <a:spcBef>
+                <a:spcPts val="1800"/>
+              </a:spcBef>
+              <a:buClr>
+                <a:schemeClr val="accent1">
+                  <a:lumMod val="75000"/>
+                </a:schemeClr>
+              </a:buClr>
+              <a:buSzPct val="100000"/>
+              <a:buFont typeface="Arial" pitchFamily="34" charset="0"/>
+              <a:buChar char="▪"/>
+            </a:pPr>
+            <a:r>
+              <a:rPr lang="en-US" sz="2000" dirty="0" err="1"/>
+              <a:t>pwd</a:t>
+            </a:r>
+            <a:r>
+              <a:rPr lang="en-US" sz="2000" dirty="0"/>
+              <a:t> – Print current Directory</a:t>
+            </a:r>
+          </a:p>
+          <a:p>
+            <a:pPr marL="228600" indent="-228600">
+              <a:lnSpc>
+                <a:spcPct val="90000"/>
+              </a:lnSpc>
+              <a:spcBef>
+                <a:spcPts val="1800"/>
+              </a:spcBef>
+              <a:buClr>
+                <a:schemeClr val="accent1">
+                  <a:lumMod val="75000"/>
+                </a:schemeClr>
+              </a:buClr>
+              <a:buSzPct val="100000"/>
+              <a:buFont typeface="Arial" pitchFamily="34" charset="0"/>
+              <a:buChar char="▪"/>
+            </a:pPr>
+            <a:r>
+              <a:rPr lang="en-US" sz="2000" dirty="0"/>
+              <a:t>ls – List directory contents</a:t>
+            </a:r>
+          </a:p>
+          <a:p>
+            <a:pPr marL="228600" indent="-228600">
+              <a:lnSpc>
+                <a:spcPct val="90000"/>
+              </a:lnSpc>
+              <a:spcBef>
+                <a:spcPts val="1800"/>
+              </a:spcBef>
+              <a:buClr>
+                <a:schemeClr val="accent1">
+                  <a:lumMod val="75000"/>
+                </a:schemeClr>
+              </a:buClr>
+              <a:buSzPct val="100000"/>
+              <a:buFont typeface="Arial" pitchFamily="34" charset="0"/>
+              <a:buChar char="▪"/>
+            </a:pPr>
+            <a:r>
+              <a:rPr lang="en-US" sz="2000" dirty="0"/>
+              <a:t>cd – Change directory</a:t>
+            </a:r>
+          </a:p>
+          <a:p>
+            <a:pPr marL="228600" indent="-228600">
+              <a:lnSpc>
+                <a:spcPct val="90000"/>
+              </a:lnSpc>
+              <a:spcBef>
+                <a:spcPts val="1800"/>
+              </a:spcBef>
+              <a:buClr>
+                <a:schemeClr val="accent1">
+                  <a:lumMod val="75000"/>
+                </a:schemeClr>
+              </a:buClr>
+              <a:buSzPct val="100000"/>
+              <a:buFont typeface="Arial" pitchFamily="34" charset="0"/>
+              <a:buChar char="▪"/>
+            </a:pPr>
+            <a:r>
+              <a:rPr lang="en-US" sz="2000" dirty="0"/>
+              <a:t>clear – Clear the terminal</a:t>
+            </a:r>
+          </a:p>
+        </p:txBody>
+      </p:sp>
+    </p:spTree>
+    <p:extLst>
+      <p:ext uri="{BB962C8B-B14F-4D97-AF65-F5344CB8AC3E}">
+        <p14:creationId xmlns:p14="http://schemas.microsoft.com/office/powerpoint/2010/main" val="1914491881"/>
+      </p:ext>
+    </p:extLst>
+  </p:cSld>
+  <p:clrMapOvr>
+    <a:masterClrMapping/>
+  </p:clrMapOvr>
+  <mc:AlternateContent xmlns:mc="http://schemas.openxmlformats.org/markup-compatibility/2006" xmlns:p14="http://schemas.microsoft.com/office/powerpoint/2010/main">
+    <mc:Choice Requires="p14">
+      <p:transition spd="med" p14:dur="700">
+        <p:fade/>
+      </p:transition>
+    </mc:Choice>
+    <mc:Fallback xmlns="">
+      <p:transition spd="med">
+        <p:fade/>
+      </p:transition>
+    </mc:Fallback>
+  </mc:AlternateContent>
+</p:sld>
+</file>
+
+<file path=ppt/slides/slide11.xml><?xml version="1.0" encoding="utf-8"?>
+<p:sld xmlns:a="http://schemas.openxmlformats.org/drawingml/2006/main" xmlns:r="http://schemas.openxmlformats.org/officeDocument/2006/relationships" xmlns:p="http://schemas.openxmlformats.org/presentationml/2006/main">
+  <p:cSld>
+    <p:spTree>
+      <p:nvGrpSpPr>
+        <p:cNvPr id="1" name="">
+          <a:extLst>
+            <a:ext uri="{FF2B5EF4-FFF2-40B4-BE49-F238E27FC236}">
+              <a16:creationId xmlns:a16="http://schemas.microsoft.com/office/drawing/2014/main" id="{D94204A5-3606-7FF7-A18E-41A782C44DD2}"/>
+            </a:ext>
+          </a:extLst>
+        </p:cNvPr>
+        <p:cNvGrpSpPr/>
+        <p:nvPr/>
+      </p:nvGrpSpPr>
+      <p:grpSpPr>
+        <a:xfrm>
+          <a:off x="0" y="0"/>
+          <a:ext cx="0" cy="0"/>
+          <a:chOff x="0" y="0"/>
+          <a:chExt cx="0" cy="0"/>
+        </a:xfrm>
+      </p:grpSpPr>
+      <p:sp>
+        <p:nvSpPr>
+          <p:cNvPr id="2" name="Title 1">
+            <a:extLst>
+              <a:ext uri="{FF2B5EF4-FFF2-40B4-BE49-F238E27FC236}">
+                <a16:creationId xmlns:a16="http://schemas.microsoft.com/office/drawing/2014/main" id="{5EA41EBF-985A-B61F-9DC8-79CDF5C632D8}"/>
+              </a:ext>
+            </a:extLst>
+          </p:cNvPr>
+          <p:cNvSpPr>
+            <a:spLocks noGrp="1"/>
+          </p:cNvSpPr>
+          <p:nvPr>
+            <p:ph type="title"/>
+          </p:nvPr>
+        </p:nvSpPr>
+        <p:spPr>
+          <a:xfrm>
+            <a:off x="1295400" y="503853"/>
+            <a:ext cx="9601200" cy="1142385"/>
+          </a:xfrm>
+        </p:spPr>
+        <p:txBody>
+          <a:bodyPr vert="horz" lIns="91440" tIns="45720" rIns="91440" bIns="45720" rtlCol="0" anchor="b">
+            <a:normAutofit/>
+          </a:bodyPr>
+          <a:lstStyle/>
+          <a:p>
+            <a:r>
+              <a:rPr lang="en-US" dirty="0"/>
+              <a:t>File and Directory Permissions</a:t>
+            </a:r>
+            <a:endParaRPr lang="en-US" b="1" kern="1200" dirty="0">
+              <a:latin typeface="+mj-lt"/>
+              <a:ea typeface="+mj-ea"/>
+              <a:cs typeface="+mj-cs"/>
+            </a:endParaRPr>
+          </a:p>
+        </p:txBody>
+      </p:sp>
+      <p:sp>
+        <p:nvSpPr>
+          <p:cNvPr id="8" name="TextBox 7">
+            <a:extLst>
+              <a:ext uri="{FF2B5EF4-FFF2-40B4-BE49-F238E27FC236}">
+                <a16:creationId xmlns:a16="http://schemas.microsoft.com/office/drawing/2014/main" id="{03C9F1E8-E645-D6AE-D3D9-BACF53389E44}"/>
+              </a:ext>
+            </a:extLst>
+          </p:cNvPr>
+          <p:cNvSpPr txBox="1"/>
+          <p:nvPr/>
+        </p:nvSpPr>
+        <p:spPr>
+          <a:xfrm>
+            <a:off x="1295400" y="1981201"/>
+            <a:ext cx="9601200" cy="3809999"/>
+          </a:xfrm>
+          <a:prstGeom prst="rect">
+            <a:avLst/>
+          </a:prstGeom>
+        </p:spPr>
+        <p:txBody>
+          <a:bodyPr vert="horz" lIns="91440" tIns="45720" rIns="91440" bIns="45720" rtlCol="0">
+            <a:normAutofit/>
+          </a:bodyPr>
+          <a:lstStyle/>
+          <a:p>
+            <a:pPr marL="228600" indent="-228600">
+              <a:lnSpc>
+                <a:spcPct val="90000"/>
+              </a:lnSpc>
+              <a:spcBef>
+                <a:spcPts val="1800"/>
+              </a:spcBef>
+              <a:buClr>
+                <a:schemeClr val="accent1">
+                  <a:lumMod val="75000"/>
+                </a:schemeClr>
+              </a:buClr>
+              <a:buSzPct val="100000"/>
+              <a:buFont typeface="Arial" pitchFamily="34" charset="0"/>
+              <a:buChar char="▪"/>
+            </a:pPr>
+            <a:r>
+              <a:rPr lang="en-US" sz="2000" dirty="0"/>
+              <a:t>Owner</a:t>
+            </a:r>
+          </a:p>
+          <a:p>
+            <a:pPr marL="228600" indent="-228600">
+              <a:lnSpc>
+                <a:spcPct val="90000"/>
+              </a:lnSpc>
+              <a:spcBef>
+                <a:spcPts val="1800"/>
+              </a:spcBef>
+              <a:buClr>
+                <a:schemeClr val="accent1">
+                  <a:lumMod val="75000"/>
+                </a:schemeClr>
+              </a:buClr>
+              <a:buSzPct val="100000"/>
+              <a:buFont typeface="Arial" pitchFamily="34" charset="0"/>
+              <a:buChar char="▪"/>
+            </a:pPr>
+            <a:r>
+              <a:rPr lang="en-US" sz="2000" dirty="0"/>
+              <a:t>Group</a:t>
+            </a:r>
+          </a:p>
+          <a:p>
+            <a:pPr marL="228600" indent="-228600">
+              <a:lnSpc>
+                <a:spcPct val="90000"/>
+              </a:lnSpc>
+              <a:spcBef>
+                <a:spcPts val="1800"/>
+              </a:spcBef>
+              <a:buClr>
+                <a:schemeClr val="accent1">
+                  <a:lumMod val="75000"/>
+                </a:schemeClr>
+              </a:buClr>
+              <a:buSzPct val="100000"/>
+              <a:buFont typeface="Arial" pitchFamily="34" charset="0"/>
+              <a:buChar char="▪"/>
+            </a:pPr>
+            <a:r>
+              <a:rPr lang="en-US" sz="2000" dirty="0"/>
+              <a:t>Others</a:t>
+            </a:r>
+          </a:p>
+        </p:txBody>
+      </p:sp>
+      <p:sp>
+        <p:nvSpPr>
+          <p:cNvPr id="5" name="TextBox 4">
+            <a:extLst>
+              <a:ext uri="{FF2B5EF4-FFF2-40B4-BE49-F238E27FC236}">
+                <a16:creationId xmlns:a16="http://schemas.microsoft.com/office/drawing/2014/main" id="{833F48B7-370F-1583-525D-F705B55D2918}"/>
+              </a:ext>
+            </a:extLst>
+          </p:cNvPr>
+          <p:cNvSpPr txBox="1"/>
+          <p:nvPr/>
+        </p:nvSpPr>
+        <p:spPr>
+          <a:xfrm>
+            <a:off x="5557684" y="1854875"/>
+            <a:ext cx="6105832" cy="2031325"/>
+          </a:xfrm>
+          <a:prstGeom prst="rect">
+            <a:avLst/>
+          </a:prstGeom>
+          <a:noFill/>
+        </p:spPr>
+        <p:txBody>
+          <a:bodyPr wrap="square">
+            <a:spAutoFit/>
+          </a:bodyPr>
+          <a:lstStyle/>
+          <a:p>
+            <a:r>
+              <a:rPr lang="en-US" dirty="0"/>
+              <a:t>Permission Types:</a:t>
+            </a:r>
+          </a:p>
+          <a:p>
+            <a:endParaRPr lang="en-US" dirty="0"/>
+          </a:p>
+          <a:p>
+            <a:r>
+              <a:rPr lang="en-US" dirty="0"/>
+              <a:t>r – read</a:t>
+            </a:r>
+          </a:p>
+          <a:p>
+            <a:endParaRPr lang="en-US" dirty="0"/>
+          </a:p>
+          <a:p>
+            <a:r>
+              <a:rPr lang="en-US" dirty="0"/>
+              <a:t>w – write</a:t>
+            </a:r>
+          </a:p>
+          <a:p>
+            <a:endParaRPr lang="en-US" dirty="0"/>
+          </a:p>
+          <a:p>
+            <a:r>
+              <a:rPr lang="en-US" dirty="0"/>
+              <a:t>x – execute</a:t>
+            </a:r>
+          </a:p>
+        </p:txBody>
+      </p:sp>
+    </p:spTree>
+    <p:extLst>
+      <p:ext uri="{BB962C8B-B14F-4D97-AF65-F5344CB8AC3E}">
+        <p14:creationId xmlns:p14="http://schemas.microsoft.com/office/powerpoint/2010/main" val="1849615621"/>
+      </p:ext>
+    </p:extLst>
+  </p:cSld>
+  <p:clrMapOvr>
+    <a:masterClrMapping/>
+  </p:clrMapOvr>
+  <mc:AlternateContent xmlns:mc="http://schemas.openxmlformats.org/markup-compatibility/2006" xmlns:p14="http://schemas.microsoft.com/office/powerpoint/2010/main">
+    <mc:Choice Requires="p14">
+      <p:transition spd="med" p14:dur="700">
+        <p:fade/>
+      </p:transition>
+    </mc:Choice>
+    <mc:Fallback xmlns="">
+      <p:transition spd="med">
+        <p:fade/>
+      </p:transition>
+    </mc:Fallback>
+  </mc:AlternateContent>
+</p:sld>
+</file>
+
+<file path=ppt/slides/slide12.xml><?xml version="1.0" encoding="utf-8"?>
+<p:sld xmlns:a="http://schemas.openxmlformats.org/drawingml/2006/main" xmlns:r="http://schemas.openxmlformats.org/officeDocument/2006/relationships" xmlns:p="http://schemas.openxmlformats.org/presentationml/2006/main">
+  <p:cSld>
+    <p:spTree>
+      <p:nvGrpSpPr>
+        <p:cNvPr id="1" name="">
+          <a:extLst>
+            <a:ext uri="{FF2B5EF4-FFF2-40B4-BE49-F238E27FC236}">
+              <a16:creationId xmlns:a16="http://schemas.microsoft.com/office/drawing/2014/main" id="{2F91C23F-09DC-9233-2165-DCCEF50BE5EF}"/>
+            </a:ext>
+          </a:extLst>
+        </p:cNvPr>
+        <p:cNvGrpSpPr/>
+        <p:nvPr/>
+      </p:nvGrpSpPr>
+      <p:grpSpPr>
+        <a:xfrm>
+          <a:off x="0" y="0"/>
+          <a:ext cx="0" cy="0"/>
+          <a:chOff x="0" y="0"/>
+          <a:chExt cx="0" cy="0"/>
+        </a:xfrm>
+      </p:grpSpPr>
+      <p:sp>
+        <p:nvSpPr>
+          <p:cNvPr id="2" name="Title 1">
+            <a:extLst>
+              <a:ext uri="{FF2B5EF4-FFF2-40B4-BE49-F238E27FC236}">
+                <a16:creationId xmlns:a16="http://schemas.microsoft.com/office/drawing/2014/main" id="{33FE29A1-19D5-9891-001F-A67324EEB65B}"/>
+              </a:ext>
+            </a:extLst>
+          </p:cNvPr>
+          <p:cNvSpPr>
+            <a:spLocks noGrp="1"/>
+          </p:cNvSpPr>
+          <p:nvPr>
+            <p:ph type="title"/>
+          </p:nvPr>
+        </p:nvSpPr>
+        <p:spPr>
+          <a:xfrm>
+            <a:off x="1295400" y="503853"/>
+            <a:ext cx="9601200" cy="1142385"/>
+          </a:xfrm>
+        </p:spPr>
+        <p:txBody>
+          <a:bodyPr vert="horz" lIns="91440" tIns="45720" rIns="91440" bIns="45720" rtlCol="0" anchor="b">
+            <a:normAutofit/>
+          </a:bodyPr>
+          <a:lstStyle/>
+          <a:p>
+            <a:r>
+              <a:rPr lang="en-US" dirty="0"/>
+              <a:t>Managing Users and Groups</a:t>
+            </a:r>
+            <a:endParaRPr lang="en-US" b="1" kern="1200" dirty="0">
+              <a:latin typeface="+mj-lt"/>
+              <a:ea typeface="+mj-ea"/>
+              <a:cs typeface="+mj-cs"/>
+            </a:endParaRPr>
+          </a:p>
+        </p:txBody>
+      </p:sp>
+      <p:sp>
+        <p:nvSpPr>
+          <p:cNvPr id="8" name="TextBox 7">
+            <a:extLst>
+              <a:ext uri="{FF2B5EF4-FFF2-40B4-BE49-F238E27FC236}">
+                <a16:creationId xmlns:a16="http://schemas.microsoft.com/office/drawing/2014/main" id="{54101C3C-AE2D-59BE-BADD-EFA79B83ACF9}"/>
+              </a:ext>
+            </a:extLst>
+          </p:cNvPr>
+          <p:cNvSpPr txBox="1"/>
+          <p:nvPr/>
+        </p:nvSpPr>
+        <p:spPr>
+          <a:xfrm>
+            <a:off x="1295400" y="1981201"/>
+            <a:ext cx="9601200" cy="3809999"/>
+          </a:xfrm>
+          <a:prstGeom prst="rect">
+            <a:avLst/>
+          </a:prstGeom>
+        </p:spPr>
+        <p:txBody>
+          <a:bodyPr vert="horz" lIns="91440" tIns="45720" rIns="91440" bIns="45720" rtlCol="0">
+            <a:normAutofit/>
+          </a:bodyPr>
+          <a:lstStyle/>
+          <a:p>
+            <a:pPr marL="228600" indent="-228600">
+              <a:lnSpc>
+                <a:spcPct val="90000"/>
+              </a:lnSpc>
+              <a:spcBef>
+                <a:spcPts val="1800"/>
+              </a:spcBef>
+              <a:buClr>
+                <a:schemeClr val="accent1">
+                  <a:lumMod val="75000"/>
+                </a:schemeClr>
+              </a:buClr>
+              <a:buSzPct val="100000"/>
+              <a:buFont typeface="Arial" pitchFamily="34" charset="0"/>
+              <a:buChar char="▪"/>
+            </a:pPr>
+            <a:r>
+              <a:rPr lang="en-US" sz="2000" dirty="0"/>
+              <a:t>Add user: </a:t>
+            </a:r>
+            <a:r>
+              <a:rPr lang="en-US" sz="2000" dirty="0" err="1"/>
+              <a:t>sudo</a:t>
+            </a:r>
+            <a:r>
+              <a:rPr lang="en-US" sz="2000" dirty="0"/>
+              <a:t> </a:t>
+            </a:r>
+            <a:r>
+              <a:rPr lang="en-US" sz="2000" dirty="0" err="1"/>
+              <a:t>adduser</a:t>
+            </a:r>
+            <a:r>
+              <a:rPr lang="en-US" sz="2000" dirty="0"/>
+              <a:t> </a:t>
+            </a:r>
+            <a:r>
+              <a:rPr lang="en-US" sz="2000" dirty="0" err="1"/>
+              <a:t>newuser</a:t>
+            </a:r>
+            <a:endParaRPr lang="en-US" sz="2000" dirty="0"/>
+          </a:p>
+          <a:p>
+            <a:pPr marL="228600" indent="-228600">
+              <a:lnSpc>
+                <a:spcPct val="90000"/>
+              </a:lnSpc>
+              <a:spcBef>
+                <a:spcPts val="1800"/>
+              </a:spcBef>
+              <a:buClr>
+                <a:schemeClr val="accent1">
+                  <a:lumMod val="75000"/>
+                </a:schemeClr>
+              </a:buClr>
+              <a:buSzPct val="100000"/>
+              <a:buFont typeface="Arial" pitchFamily="34" charset="0"/>
+              <a:buChar char="▪"/>
+            </a:pPr>
+            <a:r>
+              <a:rPr lang="en-US" sz="2000" dirty="0"/>
+              <a:t>Delete user: </a:t>
+            </a:r>
+            <a:r>
+              <a:rPr lang="en-US" sz="2000" dirty="0" err="1"/>
+              <a:t>sudo</a:t>
+            </a:r>
+            <a:r>
+              <a:rPr lang="en-US" sz="2000" dirty="0"/>
+              <a:t> </a:t>
+            </a:r>
+            <a:r>
+              <a:rPr lang="en-US" sz="2000" dirty="0" err="1"/>
+              <a:t>deluser</a:t>
+            </a:r>
+            <a:r>
+              <a:rPr lang="en-US" sz="2000" dirty="0"/>
+              <a:t> </a:t>
+            </a:r>
+            <a:r>
+              <a:rPr lang="en-US" sz="2000" dirty="0" err="1"/>
+              <a:t>newuser</a:t>
+            </a:r>
+            <a:endParaRPr lang="en-US" sz="2000" dirty="0"/>
+          </a:p>
+          <a:p>
+            <a:pPr marL="228600" indent="-228600">
+              <a:lnSpc>
+                <a:spcPct val="90000"/>
+              </a:lnSpc>
+              <a:spcBef>
+                <a:spcPts val="1800"/>
+              </a:spcBef>
+              <a:buClr>
+                <a:schemeClr val="accent1">
+                  <a:lumMod val="75000"/>
+                </a:schemeClr>
+              </a:buClr>
+              <a:buSzPct val="100000"/>
+              <a:buFont typeface="Arial" pitchFamily="34" charset="0"/>
+              <a:buChar char="▪"/>
+            </a:pPr>
+            <a:r>
+              <a:rPr lang="en-US" sz="2000" dirty="0"/>
+              <a:t>Add group: </a:t>
+            </a:r>
+            <a:r>
+              <a:rPr lang="en-US" sz="2000" dirty="0" err="1"/>
+              <a:t>sudo</a:t>
+            </a:r>
+            <a:r>
+              <a:rPr lang="en-US" sz="2000" dirty="0"/>
+              <a:t> </a:t>
+            </a:r>
+            <a:r>
+              <a:rPr lang="en-US" sz="2000" dirty="0" err="1"/>
+              <a:t>addgroup</a:t>
+            </a:r>
+            <a:r>
+              <a:rPr lang="en-US" sz="2000" dirty="0"/>
+              <a:t> </a:t>
+            </a:r>
+            <a:r>
+              <a:rPr lang="en-US" sz="2000" dirty="0" err="1"/>
+              <a:t>devs</a:t>
+            </a:r>
+            <a:endParaRPr lang="en-US" sz="2000" dirty="0"/>
+          </a:p>
+          <a:p>
+            <a:pPr marL="228600" indent="-228600">
+              <a:lnSpc>
+                <a:spcPct val="90000"/>
+              </a:lnSpc>
+              <a:spcBef>
+                <a:spcPts val="1800"/>
+              </a:spcBef>
+              <a:buClr>
+                <a:schemeClr val="accent1">
+                  <a:lumMod val="75000"/>
+                </a:schemeClr>
+              </a:buClr>
+              <a:buSzPct val="100000"/>
+              <a:buFont typeface="Arial" pitchFamily="34" charset="0"/>
+              <a:buChar char="▪"/>
+            </a:pPr>
+            <a:r>
+              <a:rPr lang="en-US" sz="2000" dirty="0"/>
+              <a:t>Add user to group: </a:t>
+            </a:r>
+            <a:r>
+              <a:rPr lang="en-US" sz="2000" dirty="0" err="1"/>
+              <a:t>sudo</a:t>
+            </a:r>
+            <a:r>
+              <a:rPr lang="en-US" sz="2000" dirty="0"/>
+              <a:t> </a:t>
+            </a:r>
+            <a:r>
+              <a:rPr lang="en-US" sz="2000" dirty="0" err="1"/>
+              <a:t>usermod</a:t>
+            </a:r>
+            <a:r>
+              <a:rPr lang="en-US" sz="2000" dirty="0"/>
+              <a:t> -</a:t>
+            </a:r>
+            <a:r>
+              <a:rPr lang="en-US" sz="2000" dirty="0" err="1"/>
+              <a:t>aG</a:t>
+            </a:r>
+            <a:r>
+              <a:rPr lang="en-US" sz="2000" dirty="0"/>
+              <a:t> </a:t>
+            </a:r>
+            <a:r>
+              <a:rPr lang="en-US" sz="2000" dirty="0" err="1"/>
+              <a:t>devs</a:t>
+            </a:r>
+            <a:r>
+              <a:rPr lang="en-US" sz="2000" dirty="0"/>
+              <a:t> </a:t>
+            </a:r>
+            <a:r>
+              <a:rPr lang="en-US" sz="2000" dirty="0" err="1"/>
+              <a:t>newuser</a:t>
+            </a:r>
+            <a:endParaRPr lang="en-US" sz="2000" dirty="0"/>
+          </a:p>
+          <a:p>
+            <a:pPr marL="228600" indent="-228600">
+              <a:lnSpc>
+                <a:spcPct val="90000"/>
+              </a:lnSpc>
+              <a:spcBef>
+                <a:spcPts val="1800"/>
+              </a:spcBef>
+              <a:buClr>
+                <a:schemeClr val="accent1">
+                  <a:lumMod val="75000"/>
+                </a:schemeClr>
+              </a:buClr>
+              <a:buSzPct val="100000"/>
+              <a:buFont typeface="Arial" pitchFamily="34" charset="0"/>
+              <a:buChar char="▪"/>
+            </a:pPr>
+            <a:r>
+              <a:rPr lang="en-US" sz="2000" dirty="0"/>
+              <a:t>cut -d: -f1 /</a:t>
+            </a:r>
+            <a:r>
+              <a:rPr lang="en-US" sz="2000" dirty="0" err="1"/>
+              <a:t>etc</a:t>
+            </a:r>
+            <a:r>
+              <a:rPr lang="en-US" sz="2000" dirty="0"/>
+              <a:t>/passwd – fetch </a:t>
+            </a:r>
+            <a:r>
+              <a:rPr lang="en-US" sz="2000"/>
+              <a:t>all account</a:t>
+            </a:r>
+          </a:p>
+          <a:p>
+            <a:pPr marL="228600" indent="-228600">
+              <a:lnSpc>
+                <a:spcPct val="90000"/>
+              </a:lnSpc>
+              <a:spcBef>
+                <a:spcPts val="1800"/>
+              </a:spcBef>
+              <a:buClr>
+                <a:schemeClr val="accent1">
+                  <a:lumMod val="75000"/>
+                </a:schemeClr>
+              </a:buClr>
+              <a:buSzPct val="100000"/>
+              <a:buFont typeface="Arial" pitchFamily="34" charset="0"/>
+              <a:buChar char="▪"/>
+            </a:pPr>
+            <a:endParaRPr lang="en-US" sz="2000" dirty="0"/>
+          </a:p>
+        </p:txBody>
+      </p:sp>
+    </p:spTree>
+    <p:extLst>
+      <p:ext uri="{BB962C8B-B14F-4D97-AF65-F5344CB8AC3E}">
+        <p14:creationId xmlns:p14="http://schemas.microsoft.com/office/powerpoint/2010/main" val="3572049542"/>
+      </p:ext>
+    </p:extLst>
+  </p:cSld>
+  <p:clrMapOvr>
+    <a:masterClrMapping/>
+  </p:clrMapOvr>
+  <mc:AlternateContent xmlns:mc="http://schemas.openxmlformats.org/markup-compatibility/2006" xmlns:p14="http://schemas.microsoft.com/office/powerpoint/2010/main">
+    <mc:Choice Requires="p14">
+      <p:transition spd="med" p14:dur="700">
+        <p:fade/>
+      </p:transition>
+    </mc:Choice>
+    <mc:Fallback xmlns="">
+      <p:transition spd="med">
+        <p:fade/>
+      </p:transition>
+    </mc:Fallback>
+  </mc:AlternateContent>
+</p:sld>
+</file>
+
+<file path=ppt/slides/slide13.xml><?xml version="1.0" encoding="utf-8"?>
+<p:sld xmlns:a="http://schemas.openxmlformats.org/drawingml/2006/main" xmlns:r="http://schemas.openxmlformats.org/officeDocument/2006/relationships" xmlns:p="http://schemas.openxmlformats.org/presentationml/2006/main">
+  <p:cSld>
+    <p:spTree>
+      <p:nvGrpSpPr>
         <p:cNvPr id="1" name=""/>
         <p:cNvGrpSpPr/>
         <p:nvPr/>
@@ -16869,7 +18233,7 @@
 </p:sld>
 </file>
 
-<file path=ppt/slides/slide11.xml><?xml version="1.0" encoding="utf-8"?>
+<file path=ppt/slides/slide14.xml><?xml version="1.0" encoding="utf-8"?>
 <p:sld xmlns:a="http://schemas.openxmlformats.org/drawingml/2006/main" xmlns:r="http://schemas.openxmlformats.org/officeDocument/2006/relationships" xmlns:p="http://schemas.openxmlformats.org/presentationml/2006/main">
   <p:cSld>
     <p:spTree>
@@ -17237,6 +18601,184 @@
 </file>
 
 <file path=ppt/slides/slide4.xml><?xml version="1.0" encoding="utf-8"?>
+<p:sld xmlns:a="http://schemas.openxmlformats.org/drawingml/2006/main" xmlns:r="http://schemas.openxmlformats.org/officeDocument/2006/relationships" xmlns:p="http://schemas.openxmlformats.org/presentationml/2006/main">
+  <p:cSld>
+    <p:spTree>
+      <p:nvGrpSpPr>
+        <p:cNvPr id="1" name="">
+          <a:extLst>
+            <a:ext uri="{FF2B5EF4-FFF2-40B4-BE49-F238E27FC236}">
+              <a16:creationId xmlns:a16="http://schemas.microsoft.com/office/drawing/2014/main" id="{88D27E18-63AB-E94A-FD3D-D42785AE9DA3}"/>
+            </a:ext>
+          </a:extLst>
+        </p:cNvPr>
+        <p:cNvGrpSpPr/>
+        <p:nvPr/>
+      </p:nvGrpSpPr>
+      <p:grpSpPr>
+        <a:xfrm>
+          <a:off x="0" y="0"/>
+          <a:ext cx="0" cy="0"/>
+          <a:chOff x="0" y="0"/>
+          <a:chExt cx="0" cy="0"/>
+        </a:xfrm>
+      </p:grpSpPr>
+      <p:sp>
+        <p:nvSpPr>
+          <p:cNvPr id="2" name="Title 1">
+            <a:extLst>
+              <a:ext uri="{FF2B5EF4-FFF2-40B4-BE49-F238E27FC236}">
+                <a16:creationId xmlns:a16="http://schemas.microsoft.com/office/drawing/2014/main" id="{1F7A4B49-903C-BAA9-79F7-9A3FB90D8BE5}"/>
+              </a:ext>
+            </a:extLst>
+          </p:cNvPr>
+          <p:cNvSpPr>
+            <a:spLocks noGrp="1"/>
+          </p:cNvSpPr>
+          <p:nvPr>
+            <p:ph type="title"/>
+          </p:nvPr>
+        </p:nvSpPr>
+        <p:spPr>
+          <a:xfrm>
+            <a:off x="1295400" y="503853"/>
+            <a:ext cx="9601200" cy="1142385"/>
+          </a:xfrm>
+        </p:spPr>
+        <p:txBody>
+          <a:bodyPr anchor="b">
+            <a:normAutofit/>
+          </a:bodyPr>
+          <a:lstStyle/>
+          <a:p>
+            <a:r>
+              <a:rPr lang="en-US" dirty="0"/>
+              <a:t>About Linux</a:t>
+            </a:r>
+          </a:p>
+        </p:txBody>
+      </p:sp>
+      <p:sp>
+        <p:nvSpPr>
+          <p:cNvPr id="3" name="Content Placeholder 2">
+            <a:extLst>
+              <a:ext uri="{FF2B5EF4-FFF2-40B4-BE49-F238E27FC236}">
+                <a16:creationId xmlns:a16="http://schemas.microsoft.com/office/drawing/2014/main" id="{18438E0A-45FE-3961-E132-19F470613021}"/>
+              </a:ext>
+            </a:extLst>
+          </p:cNvPr>
+          <p:cNvSpPr>
+            <a:spLocks noGrp="1"/>
+          </p:cNvSpPr>
+          <p:nvPr>
+            <p:ph sz="half" idx="1"/>
+          </p:nvPr>
+        </p:nvSpPr>
+        <p:spPr>
+          <a:xfrm>
+            <a:off x="1295400" y="1981199"/>
+            <a:ext cx="10401300" cy="3810001"/>
+          </a:xfrm>
+        </p:spPr>
+        <p:txBody>
+          <a:bodyPr>
+            <a:normAutofit/>
+          </a:bodyPr>
+          <a:lstStyle/>
+          <a:p>
+            <a:r>
+              <a:rPr lang="en-US" dirty="0">
+                <a:hlinkClick r:id="rId3"/>
+              </a:rPr>
+              <a:t>Kali Linux</a:t>
+            </a:r>
+            <a:r>
+              <a:rPr lang="en-US" dirty="0"/>
+              <a:t> </a:t>
+            </a:r>
+            <a:r>
+              <a:rPr lang="en-US" i="1" dirty="0"/>
+              <a:t>(formerly known as </a:t>
+            </a:r>
+            <a:r>
+              <a:rPr lang="en-US" i="1" dirty="0" err="1">
+                <a:hlinkClick r:id="rId4"/>
+              </a:rPr>
+              <a:t>BackTrack</a:t>
+            </a:r>
+            <a:r>
+              <a:rPr lang="en-US" i="1" dirty="0">
+                <a:hlinkClick r:id="rId4"/>
+              </a:rPr>
+              <a:t> Linux</a:t>
+            </a:r>
+            <a:r>
+              <a:rPr lang="en-US" i="1" dirty="0"/>
+              <a:t>)</a:t>
+            </a:r>
+            <a:r>
+              <a:rPr lang="en-US" dirty="0"/>
+              <a:t> is an </a:t>
+            </a:r>
+            <a:r>
+              <a:rPr lang="en-US" dirty="0">
+                <a:hlinkClick r:id="rId5"/>
+              </a:rPr>
+              <a:t>open-source</a:t>
+            </a:r>
+            <a:r>
+              <a:rPr lang="en-US" dirty="0"/>
+              <a:t>, </a:t>
+            </a:r>
+            <a:r>
+              <a:rPr lang="en-US" dirty="0">
+                <a:hlinkClick r:id="rId6"/>
+              </a:rPr>
+              <a:t>Debian-based Linux</a:t>
+            </a:r>
+            <a:r>
+              <a:rPr lang="en-US" dirty="0"/>
+              <a:t> distribution which allows users to perform advanced penetration testing and security auditing. It runs on multiple platforms and is freely available and accessible to both information security professionals and hobbyists.</a:t>
+            </a:r>
+          </a:p>
+          <a:p>
+            <a:r>
+              <a:rPr lang="en-US" dirty="0"/>
+              <a:t> It was officially launched on March 13, 2013.</a:t>
+            </a:r>
+            <a:br>
+              <a:rPr lang="en-US" dirty="0"/>
+            </a:br>
+            <a:endParaRPr lang="en-US" dirty="0"/>
+          </a:p>
+        </p:txBody>
+      </p:sp>
+    </p:spTree>
+    <p:extLst>
+      <p:ext uri="{BB962C8B-B14F-4D97-AF65-F5344CB8AC3E}">
+        <p14:creationId xmlns:p14="http://schemas.microsoft.com/office/powerpoint/2010/main" val="2015445870"/>
+      </p:ext>
+    </p:extLst>
+  </p:cSld>
+  <p:clrMapOvr>
+    <a:masterClrMapping/>
+  </p:clrMapOvr>
+  <mc:AlternateContent xmlns:mc="http://schemas.openxmlformats.org/markup-compatibility/2006">
+    <mc:Choice xmlns:p14="http://schemas.microsoft.com/office/powerpoint/2010/main" Requires="p14">
+      <p:transition spd="med" p14:dur="700">
+        <p:fade/>
+      </p:transition>
+    </mc:Choice>
+    <mc:Fallback>
+      <p:transition spd="med">
+        <p:fade/>
+      </p:transition>
+    </mc:Fallback>
+  </mc:AlternateContent>
+</p:sld>
+</file>
+
+<file path=ppt/slides/slide5.xml><?xml version="1.0" encoding="utf-8"?>
 <p:sld xmlns:a="http://schemas.openxmlformats.org/drawingml/2006/main" xmlns:r="http://schemas.openxmlformats.org/officeDocument/2006/relationships" xmlns:p="http://schemas.openxmlformats.org/presentationml/2006/main">
   <p:cSld>
     <p:spTree>
@@ -17565,8 +19107,8 @@
 </p:sld>
 </file>
 
-<file path=ppt/slides/slide5.xml><?xml version="1.0" encoding="utf-8"?>
-<p:sld xmlns:a="http://schemas.openxmlformats.org/drawingml/2006/main" xmlns:r="http://schemas.openxmlformats.org/officeDocument/2006/relationships" xmlns:p="http://schemas.openxmlformats.org/presentationml/2006/main">
+<file path=ppt/slides/slide6.xml><?xml version="1.0" encoding="utf-8"?>
+<p:sld xmlns:a="http://schemas.openxmlformats.org/drawingml/2006/main" xmlns:r="http://schemas.openxmlformats.org/officeDocument/2006/relationships" xmlns:p="http://schemas.openxmlformats.org/presentationml/2006/main" show="0">
   <p:cSld>
     <p:spTree>
       <p:nvGrpSpPr>
@@ -17627,7 +19169,7 @@
               </a:spcAft>
             </a:pPr>
             <a:r>
-              <a:rPr lang="en-US" sz="3200" b="1" kern="1200">
+              <a:rPr lang="en-US" sz="3200" b="1" kern="1200" dirty="0">
                 <a:solidFill>
                   <a:schemeClr val="accent1">
                     <a:lumMod val="75000"/>
@@ -17637,7 +19179,33 @@
                 <a:ea typeface="+mj-ea"/>
                 <a:cs typeface="+mj-cs"/>
               </a:rPr>
-              <a:t>Why We Use Ubuntu?</a:t>
+              <a:t>Why We Use </a:t>
+            </a:r>
+            <a:r>
+              <a:rPr lang="en-US" sz="3200" b="1" dirty="0">
+                <a:solidFill>
+                  <a:schemeClr val="accent1">
+                    <a:lumMod val="75000"/>
+                  </a:schemeClr>
+                </a:solidFill>
+                <a:latin typeface="+mj-lt"/>
+                <a:ea typeface="+mj-ea"/>
+                <a:cs typeface="+mj-cs"/>
+              </a:rPr>
+              <a:t>Ubuntu</a:t>
+            </a:r>
+            <a:r>
+              <a:rPr lang="en-US" sz="3200" b="1" kern="1200" dirty="0">
+                <a:solidFill>
+                  <a:schemeClr val="accent1">
+                    <a:lumMod val="75000"/>
+                  </a:schemeClr>
+                </a:solidFill>
+                <a:latin typeface="+mj-lt"/>
+                <a:ea typeface="+mj-ea"/>
+                <a:cs typeface="+mj-cs"/>
+              </a:rPr>
+              <a:t>?</a:t>
             </a:r>
           </a:p>
         </p:txBody>
@@ -17865,13 +19433,13 @@
   <p:clrMapOvr>
     <a:masterClrMapping/>
   </p:clrMapOvr>
-  <mc:AlternateContent xmlns:mc="http://schemas.openxmlformats.org/markup-compatibility/2006" xmlns:p14="http://schemas.microsoft.com/office/powerpoint/2010/main">
-    <mc:Choice Requires="p14">
+  <mc:AlternateContent xmlns:mc="http://schemas.openxmlformats.org/markup-compatibility/2006">
+    <mc:Choice xmlns:p14="http://schemas.microsoft.com/office/powerpoint/2010/main" Requires="p14">
       <p:transition spd="med" p14:dur="700">
         <p:fade/>
       </p:transition>
     </mc:Choice>
-    <mc:Fallback xmlns="">
+    <mc:Fallback>
       <p:transition spd="med">
         <p:fade/>
       </p:transition>
@@ -17880,7 +19448,342 @@
 </p:sld>
 </file>
 
-<file path=ppt/slides/slide6.xml><?xml version="1.0" encoding="utf-8"?>
+<file path=ppt/slides/slide7.xml><?xml version="1.0" encoding="utf-8"?>
+<p:sld xmlns:a="http://schemas.openxmlformats.org/drawingml/2006/main" xmlns:r="http://schemas.openxmlformats.org/officeDocument/2006/relationships" xmlns:p="http://schemas.openxmlformats.org/presentationml/2006/main">
+  <p:cSld>
+    <p:spTree>
+      <p:nvGrpSpPr>
+        <p:cNvPr id="1" name="">
+          <a:extLst>
+            <a:ext uri="{FF2B5EF4-FFF2-40B4-BE49-F238E27FC236}">
+              <a16:creationId xmlns:a16="http://schemas.microsoft.com/office/drawing/2014/main" id="{CC250C46-244E-6B74-9904-00010D81ECD8}"/>
+            </a:ext>
+          </a:extLst>
+        </p:cNvPr>
+        <p:cNvGrpSpPr/>
+        <p:nvPr/>
+      </p:nvGrpSpPr>
+      <p:grpSpPr>
+        <a:xfrm>
+          <a:off x="0" y="0"/>
+          <a:ext cx="0" cy="0"/>
+          <a:chOff x="0" y="0"/>
+          <a:chExt cx="0" cy="0"/>
+        </a:xfrm>
+      </p:grpSpPr>
+      <p:sp>
+        <p:nvSpPr>
+          <p:cNvPr id="3" name="TextBox 2">
+            <a:extLst>
+              <a:ext uri="{FF2B5EF4-FFF2-40B4-BE49-F238E27FC236}">
+                <a16:creationId xmlns:a16="http://schemas.microsoft.com/office/drawing/2014/main" id="{A9122C9C-760A-7E0F-A2BB-223675CD35A5}"/>
+              </a:ext>
+            </a:extLst>
+          </p:cNvPr>
+          <p:cNvSpPr txBox="1"/>
+          <p:nvPr/>
+        </p:nvSpPr>
+        <p:spPr>
+          <a:xfrm>
+            <a:off x="1295400" y="503853"/>
+            <a:ext cx="9601200" cy="1142385"/>
+          </a:xfrm>
+          <a:prstGeom prst="rect">
+            <a:avLst/>
+          </a:prstGeom>
+        </p:spPr>
+        <p:txBody>
+          <a:bodyPr vert="horz" lIns="91440" tIns="45720" rIns="91440" bIns="45720" rtlCol="0" anchor="b">
+            <a:normAutofit/>
+          </a:bodyPr>
+          <a:lstStyle/>
+          <a:p>
+            <a:pPr>
+              <a:lnSpc>
+                <a:spcPct val="90000"/>
+              </a:lnSpc>
+              <a:spcBef>
+                <a:spcPct val="0"/>
+              </a:spcBef>
+              <a:spcAft>
+                <a:spcPts val="600"/>
+              </a:spcAft>
+            </a:pPr>
+            <a:r>
+              <a:rPr lang="en-US" sz="3200" b="1" kern="1200" dirty="0">
+                <a:solidFill>
+                  <a:schemeClr val="accent1">
+                    <a:lumMod val="75000"/>
+                  </a:schemeClr>
+                </a:solidFill>
+                <a:latin typeface="+mj-lt"/>
+                <a:ea typeface="+mj-ea"/>
+                <a:cs typeface="+mj-cs"/>
+              </a:rPr>
+              <a:t>Why We Use Kali?</a:t>
+            </a:r>
+          </a:p>
+        </p:txBody>
+      </p:sp>
+      <p:sp>
+        <p:nvSpPr>
+          <p:cNvPr id="4" name="TextBox 3">
+            <a:extLst>
+              <a:ext uri="{FF2B5EF4-FFF2-40B4-BE49-F238E27FC236}">
+                <a16:creationId xmlns:a16="http://schemas.microsoft.com/office/drawing/2014/main" id="{0BE1EFB3-4E26-864B-F926-14E7DC477D74}"/>
+              </a:ext>
+            </a:extLst>
+          </p:cNvPr>
+          <p:cNvSpPr txBox="1"/>
+          <p:nvPr/>
+        </p:nvSpPr>
+        <p:spPr>
+          <a:xfrm>
+            <a:off x="1295400" y="1981199"/>
+            <a:ext cx="4572000" cy="3810001"/>
+          </a:xfrm>
+          <a:prstGeom prst="rect">
+            <a:avLst/>
+          </a:prstGeom>
+        </p:spPr>
+        <p:txBody>
+          <a:bodyPr vert="horz" lIns="91440" tIns="45720" rIns="91440" bIns="45720" rtlCol="0">
+            <a:normAutofit/>
+          </a:bodyPr>
+          <a:lstStyle/>
+          <a:p>
+            <a:pPr marL="228600" indent="-228600">
+              <a:lnSpc>
+                <a:spcPct val="90000"/>
+              </a:lnSpc>
+              <a:spcBef>
+                <a:spcPts val="1800"/>
+              </a:spcBef>
+              <a:buClr>
+                <a:schemeClr val="accent1">
+                  <a:lumMod val="75000"/>
+                </a:schemeClr>
+              </a:buClr>
+              <a:buSzPct val="100000"/>
+              <a:buFont typeface="Arial" pitchFamily="34" charset="0"/>
+              <a:buChar char="▪"/>
+            </a:pPr>
+            <a:r>
+              <a:rPr lang="en-US" sz="1400" b="1"/>
+              <a:t>Free and Always Will Be</a:t>
+            </a:r>
+            <a:r>
+              <a:rPr lang="en-US" sz="1400"/>
+              <a:t>: No cost, fully accessible to everyone.</a:t>
+            </a:r>
+          </a:p>
+          <a:p>
+            <a:pPr marL="228600" indent="-228600">
+              <a:lnSpc>
+                <a:spcPct val="90000"/>
+              </a:lnSpc>
+              <a:spcBef>
+                <a:spcPts val="1800"/>
+              </a:spcBef>
+              <a:buClr>
+                <a:schemeClr val="accent1">
+                  <a:lumMod val="75000"/>
+                </a:schemeClr>
+              </a:buClr>
+              <a:buSzPct val="100000"/>
+              <a:buFont typeface="Arial" pitchFamily="34" charset="0"/>
+              <a:buChar char="▪"/>
+            </a:pPr>
+            <a:r>
+              <a:rPr lang="en-US" sz="1400" b="1"/>
+              <a:t>Open Source</a:t>
+            </a:r>
+            <a:r>
+              <a:rPr lang="en-US" sz="1400"/>
+              <a:t>: Source code is public and customizable.</a:t>
+            </a:r>
+          </a:p>
+          <a:p>
+            <a:pPr marL="228600" indent="-228600">
+              <a:lnSpc>
+                <a:spcPct val="90000"/>
+              </a:lnSpc>
+              <a:spcBef>
+                <a:spcPts val="1800"/>
+              </a:spcBef>
+              <a:buClr>
+                <a:schemeClr val="accent1">
+                  <a:lumMod val="75000"/>
+                </a:schemeClr>
+              </a:buClr>
+              <a:buSzPct val="100000"/>
+              <a:buFont typeface="Arial" pitchFamily="34" charset="0"/>
+              <a:buChar char="▪"/>
+            </a:pPr>
+            <a:r>
+              <a:rPr lang="en-US" sz="1400" b="1"/>
+              <a:t>Standard-Compliant</a:t>
+            </a:r>
+            <a:r>
+              <a:rPr lang="en-US" sz="1400"/>
+              <a:t>: Follows Linux Filesystem Hierarchy for easy navigation.</a:t>
+            </a:r>
+          </a:p>
+          <a:p>
+            <a:pPr marL="228600" indent="-228600">
+              <a:lnSpc>
+                <a:spcPct val="90000"/>
+              </a:lnSpc>
+              <a:spcBef>
+                <a:spcPts val="1800"/>
+              </a:spcBef>
+              <a:buClr>
+                <a:schemeClr val="accent1">
+                  <a:lumMod val="75000"/>
+                </a:schemeClr>
+              </a:buClr>
+              <a:buSzPct val="100000"/>
+              <a:buFont typeface="Arial" pitchFamily="34" charset="0"/>
+              <a:buChar char="▪"/>
+            </a:pPr>
+            <a:r>
+              <a:rPr lang="en-US" sz="1400" b="1"/>
+              <a:t>Device Compatibility</a:t>
+            </a:r>
+            <a:r>
+              <a:rPr lang="en-US" sz="1400"/>
+              <a:t>: Supports a wide range of hardware and wireless devices.</a:t>
+            </a:r>
+          </a:p>
+          <a:p>
+            <a:pPr marL="228600" indent="-228600">
+              <a:lnSpc>
+                <a:spcPct val="90000"/>
+              </a:lnSpc>
+              <a:spcBef>
+                <a:spcPts val="1800"/>
+              </a:spcBef>
+              <a:buClr>
+                <a:schemeClr val="accent1">
+                  <a:lumMod val="75000"/>
+                </a:schemeClr>
+              </a:buClr>
+              <a:buSzPct val="100000"/>
+              <a:buFont typeface="Arial" pitchFamily="34" charset="0"/>
+              <a:buChar char="▪"/>
+            </a:pPr>
+            <a:r>
+              <a:rPr lang="en-US" sz="1400" b="1"/>
+              <a:t>Custom Kernel for Security Testing</a:t>
+            </a:r>
+            <a:r>
+              <a:rPr lang="en-US" sz="1400"/>
+              <a:t>: Built-in support for wireless injection.</a:t>
+            </a:r>
+          </a:p>
+          <a:p>
+            <a:pPr marL="228600" indent="-228600">
+              <a:lnSpc>
+                <a:spcPct val="90000"/>
+              </a:lnSpc>
+              <a:spcBef>
+                <a:spcPts val="1800"/>
+              </a:spcBef>
+              <a:buClr>
+                <a:schemeClr val="accent1">
+                  <a:lumMod val="75000"/>
+                </a:schemeClr>
+              </a:buClr>
+              <a:buSzPct val="100000"/>
+              <a:buFont typeface="Arial" pitchFamily="34" charset="0"/>
+              <a:buChar char="▪"/>
+            </a:pPr>
+            <a:r>
+              <a:rPr lang="en-US" sz="1400" b="1"/>
+              <a:t>Secure Development</a:t>
+            </a:r>
+            <a:r>
+              <a:rPr lang="en-US" sz="1400"/>
+              <a:t>: Maintained by a trusted, security-focused team.</a:t>
+            </a:r>
+          </a:p>
+        </p:txBody>
+      </p:sp>
+      <p:pic>
+        <p:nvPicPr>
+          <p:cNvPr id="2" name="Picture 6" descr="Kali Linux Logo PNG Vector">
+            <a:extLst>
+              <a:ext uri="{FF2B5EF4-FFF2-40B4-BE49-F238E27FC236}">
+                <a16:creationId xmlns:a16="http://schemas.microsoft.com/office/drawing/2014/main" id="{1E8E0A40-C15A-A31A-33E6-A0A53D81E297}"/>
+              </a:ext>
+            </a:extLst>
+          </p:cNvPr>
+          <p:cNvPicPr>
+            <a:picLocks noChangeAspect="1" noChangeArrowheads="1"/>
+          </p:cNvPicPr>
+          <p:nvPr/>
+        </p:nvPicPr>
+        <p:blipFill>
+          <a:blip r:embed="rId3">
+            <a:extLst>
+              <a:ext uri="{28A0092B-C50C-407E-A947-70E740481C1C}">
+                <a14:useLocalDpi xmlns:a14="http://schemas.microsoft.com/office/drawing/2010/main" val="0"/>
+              </a:ext>
+            </a:extLst>
+          </a:blip>
+          <a:srcRect b="16667"/>
+          <a:stretch>
+            <a:fillRect/>
+          </a:stretch>
+        </p:blipFill>
+        <p:spPr bwMode="auto">
+          <a:xfrm>
+            <a:off x="6324600" y="1771649"/>
+            <a:ext cx="4572000" cy="3810001"/>
+          </a:xfrm>
+          <a:prstGeom prst="rect">
+            <a:avLst/>
+          </a:prstGeom>
+          <a:solidFill>
+            <a:srgbClr val="FFFFFF"/>
+          </a:solidFill>
+          <a:extLst>
+            <a:ext uri="{909E8E84-426E-40DD-AFC4-6F175D3DCCD1}">
+              <a14:hiddenFill xmlns:a14="http://schemas.microsoft.com/office/drawing/2010/main">
+                <a:solidFill>
+                  <a:srgbClr val="FFFFFF"/>
+                </a:solidFill>
+              </a14:hiddenFill>
+            </a:ext>
+          </a:extLst>
+        </p:spPr>
+      </p:pic>
+    </p:spTree>
+    <p:extLst>
+      <p:ext uri="{BB962C8B-B14F-4D97-AF65-F5344CB8AC3E}">
+        <p14:creationId xmlns:p14="http://schemas.microsoft.com/office/powerpoint/2010/main" val="3375957003"/>
+      </p:ext>
+    </p:extLst>
+  </p:cSld>
+  <p:clrMapOvr>
+    <a:masterClrMapping/>
+  </p:clrMapOvr>
+  <mc:AlternateContent xmlns:mc="http://schemas.openxmlformats.org/markup-compatibility/2006">
+    <mc:Choice xmlns:p14="http://schemas.microsoft.com/office/powerpoint/2010/main" Requires="p14">
+      <p:transition spd="med" p14:dur="700">
+        <p:fade/>
+      </p:transition>
+    </mc:Choice>
+    <mc:Fallback>
+      <p:transition spd="med">
+        <p:fade/>
+      </p:transition>
+    </mc:Fallback>
+  </mc:AlternateContent>
+</p:sld>
+</file>
+
+<file path=ppt/slides/slide8.xml><?xml version="1.0" encoding="utf-8"?>
 <p:sld xmlns:a="http://schemas.openxmlformats.org/drawingml/2006/main" xmlns:r="http://schemas.openxmlformats.org/officeDocument/2006/relationships" xmlns:p="http://schemas.openxmlformats.org/presentationml/2006/main">
   <p:cSld>
     <p:spTree>
@@ -17977,10 +19880,54 @@
               <a:buChar char="▪"/>
             </a:pPr>
             <a:r>
-              <a:rPr lang="en-US" sz="1900" b="0" i="0" dirty="0">
-                <a:effectLst/>
-              </a:rPr>
-              <a:t>Ubuntu Desktop Edition</a:t>
+              <a:rPr lang="en-US" sz="1900" dirty="0"/>
+              <a:t>Minimal Setup (SSH only):</a:t>
+            </a:r>
+          </a:p>
+          <a:p>
+            <a:pPr fontAlgn="base">
+              <a:lnSpc>
+                <a:spcPct val="90000"/>
+              </a:lnSpc>
+              <a:spcBef>
+                <a:spcPts val="1800"/>
+              </a:spcBef>
+              <a:spcAft>
+                <a:spcPts val="600"/>
+              </a:spcAft>
+              <a:buClr>
+                <a:schemeClr val="accent1">
+                  <a:lumMod val="75000"/>
+                </a:schemeClr>
+              </a:buClr>
+              <a:buSzPct val="100000"/>
+            </a:pPr>
+            <a:r>
+              <a:rPr lang="en-US" sz="1900" dirty="0"/>
+              <a:t>-128 MB RAM (512 MB recommended)</a:t>
+            </a:r>
+          </a:p>
+          <a:p>
+            <a:pPr fontAlgn="base">
+              <a:lnSpc>
+                <a:spcPct val="90000"/>
+              </a:lnSpc>
+              <a:spcBef>
+                <a:spcPts val="1800"/>
+              </a:spcBef>
+              <a:spcAft>
+                <a:spcPts val="600"/>
+              </a:spcAft>
+              <a:buClr>
+                <a:schemeClr val="accent1">
+                  <a:lumMod val="75000"/>
+                </a:schemeClr>
+              </a:buClr>
+              <a:buSzPct val="100000"/>
+            </a:pPr>
+            <a:r>
+              <a:rPr lang="en-US" sz="1900" dirty="0"/>
+              <a:t>-2 GB disk space</a:t>
             </a:r>
           </a:p>
           <a:p>
@@ -18004,10 +19951,54 @@
               <a:buChar char="▪"/>
             </a:pPr>
             <a:r>
-              <a:rPr lang="en-US" sz="1900" b="0" i="0" dirty="0">
-                <a:effectLst/>
-              </a:rPr>
-              <a:t>2 GHz dual-core processor</a:t>
+              <a:rPr lang="en-US" sz="1900" dirty="0"/>
+              <a:t>Standard Desktop (Xfce4 + tools):</a:t>
+            </a:r>
+          </a:p>
+          <a:p>
+            <a:pPr fontAlgn="base">
+              <a:lnSpc>
+                <a:spcPct val="90000"/>
+              </a:lnSpc>
+              <a:spcBef>
+                <a:spcPts val="1800"/>
+              </a:spcBef>
+              <a:spcAft>
+                <a:spcPts val="600"/>
+              </a:spcAft>
+              <a:buClr>
+                <a:schemeClr val="accent1">
+                  <a:lumMod val="75000"/>
+                </a:schemeClr>
+              </a:buClr>
+              <a:buSzPct val="100000"/>
+            </a:pPr>
+            <a:r>
+              <a:rPr lang="en-US" sz="1900" dirty="0"/>
+              <a:t>-At least 2 GB RAM</a:t>
+            </a:r>
+          </a:p>
+          <a:p>
+            <a:pPr fontAlgn="base">
+              <a:lnSpc>
+                <a:spcPct val="90000"/>
+              </a:lnSpc>
+              <a:spcBef>
+                <a:spcPts val="1800"/>
+              </a:spcBef>
+              <a:spcAft>
+                <a:spcPts val="600"/>
+              </a:spcAft>
+              <a:buClr>
+                <a:schemeClr val="accent1">
+                  <a:lumMod val="75000"/>
+                </a:schemeClr>
+              </a:buClr>
+              <a:buSzPct val="100000"/>
+            </a:pPr>
+            <a:r>
+              <a:rPr lang="en-US" sz="1900" dirty="0"/>
+              <a:t>-20 GB disk space</a:t>
             </a:r>
           </a:p>
           <a:p>
@@ -18031,14 +20022,12 @@
               <a:buChar char="▪"/>
             </a:pPr>
             <a:r>
-              <a:rPr lang="en-US" sz="1900" b="0" i="0" dirty="0">
-                <a:effectLst/>
-              </a:rPr>
-              <a:t>4096 MiB RAM (system memory) for physical installs.</a:t>
-            </a:r>
-          </a:p>
-          <a:p>
-            <a:pPr marL="228600" indent="-228600" fontAlgn="base">
+              <a:rPr lang="en-US" sz="1900" dirty="0"/>
+              <a:t>For Heavy Tools (e.g., Burp Suite):</a:t>
+            </a:r>
+          </a:p>
+          <a:p>
+            <a:pPr fontAlgn="base">
               <a:lnSpc>
                 <a:spcPct val="90000"/>
               </a:lnSpc>
@@ -18054,30 +20043,14 @@
                 </a:schemeClr>
               </a:buClr>
               <a:buSzPct val="100000"/>
-              <a:buFont typeface="Arial" pitchFamily="34" charset="0"/>
-              <a:buChar char="▪"/>
             </a:pPr>
             <a:r>
-              <a:rPr lang="en-US" sz="1900" b="0" i="0" dirty="0">
-                <a:effectLst/>
-              </a:rPr>
-              <a:t>2048 MiB RAM for </a:t>
-            </a:r>
-            <a:r>
-              <a:rPr lang="en-US" sz="1900" b="0" i="0" dirty="0" err="1">
-                <a:effectLst/>
-              </a:rPr>
-              <a:t>virtualised</a:t>
-            </a:r>
-            <a:r>
-              <a:rPr lang="en-US" sz="1900" b="0" i="0" dirty="0">
-                <a:effectLst/>
-              </a:rPr>
-              <a:t> installs.</a:t>
-            </a:r>
-          </a:p>
-          <a:p>
-            <a:pPr marL="228600" indent="-228600" fontAlgn="base">
+              <a:rPr lang="en-US" sz="1900" dirty="0"/>
+              <a:t>-At least 8 GB RAM</a:t>
+            </a:r>
+          </a:p>
+          <a:p>
+            <a:pPr fontAlgn="base">
               <a:lnSpc>
                 <a:spcPct val="90000"/>
               </a:lnSpc>
@@ -18093,148 +20066,14 @@
                 </a:schemeClr>
               </a:buClr>
               <a:buSzPct val="100000"/>
-              <a:buFont typeface="Arial" pitchFamily="34" charset="0"/>
-              <a:buChar char="▪"/>
             </a:pPr>
             <a:r>
-              <a:rPr lang="en-US" sz="1900" b="0" i="0" dirty="0">
-                <a:effectLst/>
-              </a:rPr>
-              <a:t>25 GB (8.6 GB for minimal) of hard-drive space (or USB stick, memory card or external drive but see </a:t>
-            </a:r>
-            <a:r>
-              <a:rPr lang="en-US" sz="1900" b="0" i="0" dirty="0" err="1">
-                <a:effectLst/>
-              </a:rPr>
-              <a:t>LiveCD</a:t>
-            </a:r>
-            <a:r>
-              <a:rPr lang="en-US" sz="1900" b="0" i="0" dirty="0">
-                <a:effectLst/>
-              </a:rPr>
-              <a:t> for an alternative approach)</a:t>
-            </a:r>
-          </a:p>
-          <a:p>
-            <a:pPr marL="228600" indent="-228600" fontAlgn="base">
-              <a:lnSpc>
-                <a:spcPct val="90000"/>
-              </a:lnSpc>
-              <a:spcBef>
-                <a:spcPts val="1800"/>
-              </a:spcBef>
-              <a:spcAft>
-                <a:spcPts val="600"/>
-              </a:spcAft>
-              <a:buClr>
-                <a:schemeClr val="accent1">
-                  <a:lumMod val="75000"/>
-                </a:schemeClr>
-              </a:buClr>
-              <a:buSzPct val="100000"/>
-              <a:buFont typeface="Arial" pitchFamily="34" charset="0"/>
-              <a:buChar char="▪"/>
-            </a:pPr>
-            <a:r>
-              <a:rPr lang="en-US" sz="1900" b="0" i="0" dirty="0">
-                <a:effectLst/>
-              </a:rPr>
-              <a:t>3D acceleration-capable GPU with at least 256 MB of VRAM</a:t>
-            </a:r>
-          </a:p>
-          <a:p>
-            <a:pPr marL="228600" indent="-228600" fontAlgn="base">
-              <a:lnSpc>
-                <a:spcPct val="90000"/>
-              </a:lnSpc>
-              <a:spcBef>
-                <a:spcPts val="1800"/>
-              </a:spcBef>
-              <a:spcAft>
-                <a:spcPts val="600"/>
-              </a:spcAft>
-              <a:buClr>
-                <a:schemeClr val="accent1">
-                  <a:lumMod val="75000"/>
-                </a:schemeClr>
-              </a:buClr>
-              <a:buSzPct val="100000"/>
-              <a:buFont typeface="Arial" pitchFamily="34" charset="0"/>
-              <a:buChar char="▪"/>
-            </a:pPr>
-            <a:r>
-              <a:rPr lang="en-US" sz="1900" b="0" i="0" dirty="0">
-                <a:effectLst/>
-              </a:rPr>
-              <a:t>1024x768 or higher resolution display</a:t>
-            </a:r>
-          </a:p>
-          <a:p>
-            <a:pPr marL="228600" indent="-228600" fontAlgn="base">
-              <a:lnSpc>
-                <a:spcPct val="90000"/>
-              </a:lnSpc>
-              <a:spcBef>
-                <a:spcPts val="1800"/>
-              </a:spcBef>
-              <a:spcAft>
-                <a:spcPts val="600"/>
-              </a:spcAft>
-              <a:buClr>
-                <a:schemeClr val="accent1">
-                  <a:lumMod val="75000"/>
-                </a:schemeClr>
-              </a:buClr>
-              <a:buSzPct val="100000"/>
-              <a:buFont typeface="Arial" pitchFamily="34" charset="0"/>
-              <a:buChar char="▪"/>
-            </a:pPr>
-            <a:r>
-              <a:rPr lang="en-US" sz="1900" b="0" i="0" dirty="0">
-                <a:effectLst/>
-              </a:rPr>
-              <a:t>USB flash drive or DVD drive or for the installer media</a:t>
-            </a:r>
-          </a:p>
-          <a:p>
-            <a:pPr marL="228600" indent="-228600" fontAlgn="base">
-              <a:lnSpc>
-                <a:spcPct val="90000"/>
-              </a:lnSpc>
-              <a:spcBef>
-                <a:spcPts val="1800"/>
-              </a:spcBef>
-              <a:spcAft>
-                <a:spcPts val="600"/>
-              </a:spcAft>
-              <a:buClr>
-                <a:schemeClr val="accent1">
-                  <a:lumMod val="75000"/>
-                </a:schemeClr>
-              </a:buClr>
-              <a:buSzPct val="100000"/>
-              <a:buFont typeface="Arial" pitchFamily="34" charset="0"/>
-              <a:buChar char="▪"/>
-            </a:pPr>
-            <a:r>
-              <a:rPr lang="en-US" sz="1900" b="0" i="0" u="none" strike="noStrike" dirty="0">
-                <a:effectLst/>
-                <a:hlinkClick r:id="rId3">
-                  <a:extLst>
-                    <a:ext uri="{A12FA001-AC4F-418D-AE19-62706E023703}">
-                      <ahyp:hlinkClr xmlns:ahyp="http://schemas.microsoft.com/office/drawing/2018/hyperlinkcolor" val="tx"/>
-                    </a:ext>
-                  </a:extLst>
-                </a:hlinkClick>
-              </a:rPr>
-              <a:t>Internet access</a:t>
-            </a:r>
-            <a:r>
-              <a:rPr lang="en-US" sz="1900" b="0" i="0" dirty="0">
-                <a:effectLst/>
-              </a:rPr>
-              <a:t> is helpful</a:t>
-            </a:r>
+              <a:rPr lang="en-US" sz="1900" dirty="0"/>
+              <a:t>-More if running large apps or multiple tools simultaneously</a:t>
+            </a:r>
+            <a:endParaRPr lang="en-US" sz="1900" b="0" i="0" dirty="0">
+              <a:effectLst/>
+            </a:endParaRPr>
           </a:p>
         </p:txBody>
       </p:sp>
@@ -18263,15 +20102,15 @@
 </p:sld>
 </file>
 
-<file path=ppt/slides/slide7.xml><?xml version="1.0" encoding="utf-8"?>
-<p:sld xmlns:a="http://schemas.openxmlformats.org/drawingml/2006/main" xmlns:r="http://schemas.openxmlformats.org/officeDocument/2006/relationships" xmlns:p="http://schemas.openxmlformats.org/presentationml/2006/main">
+<file path=ppt/slides/slide9.xml><?xml version="1.0" encoding="utf-8"?>
+<p:sld xmlns:a="http://schemas.openxmlformats.org/drawingml/2006/main" xmlns:r="http://schemas.openxmlformats.org/officeDocument/2006/relationships" xmlns:p="http://schemas.openxmlformats.org/presentationml/2006/main" show="0">
   <p:cSld>
     <p:spTree>
       <p:nvGrpSpPr>
         <p:cNvPr id="1" name="">
           <a:extLst>
             <a:ext uri="{FF2B5EF4-FFF2-40B4-BE49-F238E27FC236}">
-              <a16:creationId xmlns:a16="http://schemas.microsoft.com/office/drawing/2014/main" id="{096E4C19-C511-AF73-801B-99E42AA9A53B}"/>
+              <a16:creationId xmlns:a16="http://schemas.microsoft.com/office/drawing/2014/main" id="{8382C89B-694A-CF56-58D3-38705FFA3C5D}"/>
             </a:ext>
           </a:extLst>
         </p:cNvPr>
@@ -18291,7 +20130,7 @@
           <p:cNvPr id="2" name="Title 1">
             <a:extLst>
               <a:ext uri="{FF2B5EF4-FFF2-40B4-BE49-F238E27FC236}">
-                <a16:creationId xmlns:a16="http://schemas.microsoft.com/office/drawing/2014/main" id="{ED61B802-0AD0-CC01-C9E5-1FC51B9717A9}"/>
+                <a16:creationId xmlns:a16="http://schemas.microsoft.com/office/drawing/2014/main" id="{2EC35E2C-D4C1-ADF0-6F01-53A6D791FD6C}"/>
               </a:ext>
             </a:extLst>
           </p:cNvPr>
@@ -18304,8 +20143,8 @@
         </p:nvSpPr>
         <p:spPr>
           <a:xfrm>
-            <a:off x="1295400" y="503853"/>
-            <a:ext cx="9601200" cy="1142385"/>
+            <a:off x="7913152" y="571500"/>
+            <a:ext cx="3657600" cy="2197100"/>
           </a:xfrm>
         </p:spPr>
         <p:txBody>
@@ -18315,22 +20154,22 @@
           <a:lstStyle/>
           <a:p>
             <a:r>
-              <a:rPr lang="en-US" b="1" kern="1200" dirty="0">
+              <a:rPr lang="en-US" b="1" kern="1200">
                 <a:latin typeface="+mj-lt"/>
                 <a:ea typeface="+mj-ea"/>
                 <a:cs typeface="+mj-cs"/>
               </a:rPr>
-              <a:t>Navigating Linux using CLI</a:t>
+              <a:t>Let’s install it!</a:t>
             </a:r>
           </a:p>
         </p:txBody>
       </p:sp>
       <p:sp>
         <p:nvSpPr>
-          <p:cNvPr id="8" name="TextBox 7">
+          <p:cNvPr id="11" name="TextBox 10">
             <a:extLst>
               <a:ext uri="{FF2B5EF4-FFF2-40B4-BE49-F238E27FC236}">
-                <a16:creationId xmlns:a16="http://schemas.microsoft.com/office/drawing/2014/main" id="{20941964-AF5A-33CF-A946-513D0AAE6DC3}"/>
+                <a16:creationId xmlns:a16="http://schemas.microsoft.com/office/drawing/2014/main" id="{37919C15-0BDF-DBE9-4EC2-3CC88540A482}"/>
               </a:ext>
             </a:extLst>
           </p:cNvPr>
@@ -18339,8 +20178,8 @@
         </p:nvSpPr>
         <p:spPr>
           <a:xfrm>
-            <a:off x="1295400" y="1981201"/>
-            <a:ext cx="9601200" cy="3809999"/>
+            <a:off x="543197" y="571500"/>
+            <a:ext cx="6217920" cy="5715000"/>
           </a:xfrm>
           <a:prstGeom prst="rect">
             <a:avLst/>
@@ -18352,13 +20191,16 @@
           </a:bodyPr>
           <a:lstStyle/>
           <a:p>
-            <a:pPr marL="228600" indent="-228600">
+            <a:pPr marL="228600" indent="-228600" fontAlgn="base">
               <a:lnSpc>
                 <a:spcPct val="90000"/>
               </a:lnSpc>
               <a:spcBef>
                 <a:spcPts val="1800"/>
               </a:spcBef>
+              <a:spcAft>
+                <a:spcPts val="600"/>
+              </a:spcAft>
               <a:buClr>
                 <a:schemeClr val="accent1">
                   <a:lumMod val="75000"/>
@@ -18369,22 +20211,23 @@
               <a:buChar char="▪"/>
             </a:pPr>
             <a:r>
-              <a:rPr lang="en-US" sz="2000" dirty="0" err="1"/>
-              <a:t>pwd</a:t>
-            </a:r>
-            <a:r>
-              <a:rPr lang="en-US" sz="2000" dirty="0"/>
-              <a:t> – Print current Directory</a:t>
-            </a:r>
-          </a:p>
-          <a:p>
-            <a:pPr marL="228600" indent="-228600">
+              <a:rPr lang="en-US" sz="1900" b="0" i="0" dirty="0">
+                <a:effectLst/>
+              </a:rPr>
+              <a:t>Ubuntu Desktop Edition</a:t>
+            </a:r>
+          </a:p>
+          <a:p>
+            <a:pPr marL="228600" indent="-228600" fontAlgn="base">
               <a:lnSpc>
                 <a:spcPct val="90000"/>
               </a:lnSpc>
               <a:spcBef>
                 <a:spcPts val="1800"/>
               </a:spcBef>
+              <a:spcAft>
+                <a:spcPts val="600"/>
+              </a:spcAft>
               <a:buClr>
                 <a:schemeClr val="accent1">
                   <a:lumMod val="75000"/>
@@ -18395,18 +20238,23 @@
               <a:buChar char="▪"/>
             </a:pPr>
             <a:r>
-              <a:rPr lang="en-US" sz="2000" dirty="0"/>
-              <a:t>ls – List directory contents</a:t>
-            </a:r>
-          </a:p>
-          <a:p>
-            <a:pPr marL="228600" indent="-228600">
+              <a:rPr lang="en-US" sz="1900" b="0" i="0" dirty="0">
+                <a:effectLst/>
+              </a:rPr>
+              <a:t>2 GHz dual-core processor</a:t>
+            </a:r>
+          </a:p>
+          <a:p>
+            <a:pPr marL="228600" indent="-228600" fontAlgn="base">
               <a:lnSpc>
                 <a:spcPct val="90000"/>
               </a:lnSpc>
               <a:spcBef>
                 <a:spcPts val="1800"/>
               </a:spcBef>
+              <a:spcAft>
+                <a:spcPts val="600"/>
+              </a:spcAft>
               <a:buClr>
                 <a:schemeClr val="accent1">
                   <a:lumMod val="75000"/>
@@ -18417,18 +20265,23 @@
               <a:buChar char="▪"/>
             </a:pPr>
             <a:r>
-              <a:rPr lang="en-US" sz="2000" dirty="0"/>
-              <a:t>cd – Change directory</a:t>
-            </a:r>
-          </a:p>
-          <a:p>
-            <a:pPr marL="228600" indent="-228600">
+              <a:rPr lang="en-US" sz="1900" b="0" i="0" dirty="0">
+                <a:effectLst/>
+              </a:rPr>
+              <a:t>4096 MiB RAM (system memory) for physical installs.</a:t>
+            </a:r>
+          </a:p>
+          <a:p>
+            <a:pPr marL="228600" indent="-228600" fontAlgn="base">
               <a:lnSpc>
                 <a:spcPct val="90000"/>
               </a:lnSpc>
               <a:spcBef>
                 <a:spcPts val="1800"/>
               </a:spcBef>
+              <a:spcAft>
+                <a:spcPts val="600"/>
+              </a:spcAft>
               <a:buClr>
                 <a:schemeClr val="accent1">
                   <a:lumMod val="75000"/>
@@ -18439,134 +20292,35 @@
               <a:buChar char="▪"/>
             </a:pPr>
             <a:r>
-              <a:rPr lang="en-US" sz="2000" dirty="0"/>
-              <a:t>clear – Clear the terminal</a:t>
-            </a:r>
-          </a:p>
-        </p:txBody>
-      </p:sp>
-    </p:spTree>
-    <p:extLst>
-      <p:ext uri="{BB962C8B-B14F-4D97-AF65-F5344CB8AC3E}">
-        <p14:creationId xmlns:p14="http://schemas.microsoft.com/office/powerpoint/2010/main" val="1914491881"/>
-      </p:ext>
-    </p:extLst>
-  </p:cSld>
-  <p:clrMapOvr>
-    <a:masterClrMapping/>
-  </p:clrMapOvr>
-  <mc:AlternateContent xmlns:mc="http://schemas.openxmlformats.org/markup-compatibility/2006" xmlns:p14="http://schemas.microsoft.com/office/powerpoint/2010/main">
-    <mc:Choice Requires="p14">
-      <p:transition spd="med" p14:dur="700">
-        <p:fade/>
-      </p:transition>
-    </mc:Choice>
-    <mc:Fallback xmlns="">
-      <p:transition spd="med">
-        <p:fade/>
-      </p:transition>
-    </mc:Fallback>
-  </mc:AlternateContent>
-</p:sld>
-</file>
-
-<file path=ppt/slides/slide8.xml><?xml version="1.0" encoding="utf-8"?>
-<p:sld xmlns:a="http://schemas.openxmlformats.org/drawingml/2006/main" xmlns:r="http://schemas.openxmlformats.org/officeDocument/2006/relationships" xmlns:p="http://schemas.openxmlformats.org/presentationml/2006/main">
-  <p:cSld>
-    <p:spTree>
-      <p:nvGrpSpPr>
-        <p:cNvPr id="1" name="">
-          <a:extLst>
-            <a:ext uri="{FF2B5EF4-FFF2-40B4-BE49-F238E27FC236}">
-              <a16:creationId xmlns:a16="http://schemas.microsoft.com/office/drawing/2014/main" id="{D94204A5-3606-7FF7-A18E-41A782C44DD2}"/>
-            </a:ext>
-          </a:extLst>
-        </p:cNvPr>
-        <p:cNvGrpSpPr/>
-        <p:nvPr/>
-      </p:nvGrpSpPr>
-      <p:grpSpPr>
-        <a:xfrm>
-          <a:off x="0" y="0"/>
-          <a:ext cx="0" cy="0"/>
-          <a:chOff x="0" y="0"/>
-          <a:chExt cx="0" cy="0"/>
-        </a:xfrm>
-      </p:grpSpPr>
-      <p:sp>
-        <p:nvSpPr>
-          <p:cNvPr id="2" name="Title 1">
-            <a:extLst>
-              <a:ext uri="{FF2B5EF4-FFF2-40B4-BE49-F238E27FC236}">
-                <a16:creationId xmlns:a16="http://schemas.microsoft.com/office/drawing/2014/main" id="{5EA41EBF-985A-B61F-9DC8-79CDF5C632D8}"/>
-              </a:ext>
-            </a:extLst>
-          </p:cNvPr>
-          <p:cNvSpPr>
-            <a:spLocks noGrp="1"/>
-          </p:cNvSpPr>
-          <p:nvPr>
-            <p:ph type="title"/>
-          </p:nvPr>
-        </p:nvSpPr>
-        <p:spPr>
-          <a:xfrm>
-            <a:off x="1295400" y="503853"/>
-            <a:ext cx="9601200" cy="1142385"/>
-          </a:xfrm>
-        </p:spPr>
-        <p:txBody>
-          <a:bodyPr vert="horz" lIns="91440" tIns="45720" rIns="91440" bIns="45720" rtlCol="0" anchor="b">
-            <a:normAutofit/>
-          </a:bodyPr>
-          <a:lstStyle/>
-          <a:p>
-            <a:r>
-              <a:rPr lang="en-US" dirty="0"/>
-              <a:t>File and Directory Permissions</a:t>
-            </a:r>
-            <a:endParaRPr lang="en-US" b="1" kern="1200" dirty="0">
-              <a:latin typeface="+mj-lt"/>
-              <a:ea typeface="+mj-ea"/>
-              <a:cs typeface="+mj-cs"/>
-            </a:endParaRPr>
-          </a:p>
-        </p:txBody>
-      </p:sp>
-      <p:sp>
-        <p:nvSpPr>
-          <p:cNvPr id="8" name="TextBox 7">
-            <a:extLst>
-              <a:ext uri="{FF2B5EF4-FFF2-40B4-BE49-F238E27FC236}">
-                <a16:creationId xmlns:a16="http://schemas.microsoft.com/office/drawing/2014/main" id="{03C9F1E8-E645-D6AE-D3D9-BACF53389E44}"/>
-              </a:ext>
-            </a:extLst>
-          </p:cNvPr>
-          <p:cNvSpPr txBox="1"/>
-          <p:nvPr/>
-        </p:nvSpPr>
-        <p:spPr>
-          <a:xfrm>
-            <a:off x="1295400" y="1981201"/>
-            <a:ext cx="9601200" cy="3809999"/>
-          </a:xfrm>
-          <a:prstGeom prst="rect">
-            <a:avLst/>
-          </a:prstGeom>
-        </p:spPr>
-        <p:txBody>
-          <a:bodyPr vert="horz" lIns="91440" tIns="45720" rIns="91440" bIns="45720" rtlCol="0">
-            <a:normAutofit/>
-          </a:bodyPr>
-          <a:lstStyle/>
-          <a:p>
-            <a:pPr marL="228600" indent="-228600">
+              <a:rPr lang="en-US" sz="1900" b="0" i="0" dirty="0">
+                <a:effectLst/>
+              </a:rPr>
+              <a:t>2048 MiB RAM for </a:t>
+            </a:r>
+            <a:r>
+              <a:rPr lang="en-US" sz="1900" b="0" i="0" dirty="0" err="1">
+                <a:effectLst/>
+              </a:rPr>
+              <a:t>virtualised</a:t>
+            </a:r>
+            <a:r>
+              <a:rPr lang="en-US" sz="1900" b="0" i="0" dirty="0">
+                <a:effectLst/>
+              </a:rPr>
+              <a:t> installs.</a:t>
+            </a:r>
+          </a:p>
+          <a:p>
+            <a:pPr marL="228600" indent="-228600" fontAlgn="base">
               <a:lnSpc>
                 <a:spcPct val="90000"/>
               </a:lnSpc>
               <a:spcBef>
                 <a:spcPts val="1800"/>
               </a:spcBef>
+              <a:spcAft>
+                <a:spcPts val="600"/>
+              </a:spcAft>
               <a:buClr>
                 <a:schemeClr val="accent1">
                   <a:lumMod val="75000"/>
@@ -18577,18 +20331,35 @@
               <a:buChar char="▪"/>
             </a:pPr>
             <a:r>
-              <a:rPr lang="en-US" sz="2000" dirty="0"/>
-              <a:t>Owner</a:t>
-            </a:r>
-          </a:p>
-          <a:p>
-            <a:pPr marL="228600" indent="-228600">
+              <a:rPr lang="en-US" sz="1900" b="0" i="0" dirty="0">
+                <a:effectLst/>
+              </a:rPr>
+              <a:t>25 GB (8.6 GB for minimal) of hard-drive space (or USB stick, memory card or external drive but see </a:t>
+            </a:r>
+            <a:r>
+              <a:rPr lang="en-US" sz="1900" b="0" i="0" dirty="0" err="1">
+                <a:effectLst/>
+              </a:rPr>
+              <a:t>LiveCD</a:t>
+            </a:r>
+            <a:r>
+              <a:rPr lang="en-US" sz="1900" b="0" i="0" dirty="0">
+                <a:effectLst/>
+              </a:rPr>
+              <a:t> for an alternative approach)</a:t>
+            </a:r>
+          </a:p>
+          <a:p>
+            <a:pPr marL="228600" indent="-228600" fontAlgn="base">
               <a:lnSpc>
                 <a:spcPct val="90000"/>
               </a:lnSpc>
               <a:spcBef>
                 <a:spcPts val="1800"/>
               </a:spcBef>
+              <a:spcAft>
+                <a:spcPts val="600"/>
+              </a:spcAft>
               <a:buClr>
                 <a:schemeClr val="accent1">
                   <a:lumMod val="75000"/>
@@ -18599,18 +20370,23 @@
               <a:buChar char="▪"/>
             </a:pPr>
             <a:r>
-              <a:rPr lang="en-US" sz="2000" dirty="0"/>
-              <a:t>Group</a:t>
-            </a:r>
-          </a:p>
-          <a:p>
-            <a:pPr marL="228600" indent="-228600">
+              <a:rPr lang="en-US" sz="1900" b="0" i="0" dirty="0">
+                <a:effectLst/>
+              </a:rPr>
+              <a:t>3D acceleration-capable GPU with at least 256 MB of VRAM</a:t>
+            </a:r>
+          </a:p>
+          <a:p>
+            <a:pPr marL="228600" indent="-228600" fontAlgn="base">
               <a:lnSpc>
                 <a:spcPct val="90000"/>
               </a:lnSpc>
               <a:spcBef>
                 <a:spcPts val="1800"/>
               </a:spcBef>
+              <a:spcAft>
+                <a:spcPts val="600"/>
+              </a:spcAft>
               <a:buClr>
                 <a:schemeClr val="accent1">
                   <a:lumMod val="75000"/>
@@ -18621,196 +20397,23 @@
               <a:buChar char="▪"/>
             </a:pPr>
             <a:r>
-              <a:rPr lang="en-US" sz="2000" dirty="0"/>
-              <a:t>Others</a:t>
-            </a:r>
-          </a:p>
-        </p:txBody>
-      </p:sp>
-      <p:sp>
-        <p:nvSpPr>
-          <p:cNvPr id="5" name="TextBox 4">
-            <a:extLst>
-              <a:ext uri="{FF2B5EF4-FFF2-40B4-BE49-F238E27FC236}">
-                <a16:creationId xmlns:a16="http://schemas.microsoft.com/office/drawing/2014/main" id="{833F48B7-370F-1583-525D-F705B55D2918}"/>
-              </a:ext>
-            </a:extLst>
-          </p:cNvPr>
-          <p:cNvSpPr txBox="1"/>
-          <p:nvPr/>
-        </p:nvSpPr>
-        <p:spPr>
-          <a:xfrm>
-            <a:off x="5557684" y="1854875"/>
-            <a:ext cx="6105832" cy="2031325"/>
-          </a:xfrm>
-          <a:prstGeom prst="rect">
-            <a:avLst/>
-          </a:prstGeom>
-          <a:noFill/>
-        </p:spPr>
-        <p:txBody>
-          <a:bodyPr wrap="square">
-            <a:spAutoFit/>
-          </a:bodyPr>
-          <a:lstStyle/>
-          <a:p>
-            <a:r>
-              <a:rPr lang="en-US" dirty="0"/>
-              <a:t>Permission Types:</a:t>
-            </a:r>
-          </a:p>
-          <a:p>
-            <a:endParaRPr lang="en-US" dirty="0"/>
-          </a:p>
-          <a:p>
-            <a:r>
-              <a:rPr lang="en-US" dirty="0"/>
-              <a:t>r – read</a:t>
-            </a:r>
-          </a:p>
-          <a:p>
-            <a:endParaRPr lang="en-US" dirty="0"/>
-          </a:p>
-          <a:p>
-            <a:r>
-              <a:rPr lang="en-US" dirty="0"/>
-              <a:t>w – write</a:t>
-            </a:r>
-          </a:p>
-          <a:p>
-            <a:endParaRPr lang="en-US" dirty="0"/>
-          </a:p>
-          <a:p>
-            <a:r>
-              <a:rPr lang="en-US" dirty="0"/>
-              <a:t>x – execute</a:t>
-            </a:r>
-          </a:p>
-        </p:txBody>
-      </p:sp>
-    </p:spTree>
-    <p:extLst>
-      <p:ext uri="{BB962C8B-B14F-4D97-AF65-F5344CB8AC3E}">
-        <p14:creationId xmlns:p14="http://schemas.microsoft.com/office/powerpoint/2010/main" val="1849615621"/>
-      </p:ext>
-    </p:extLst>
-  </p:cSld>
-  <p:clrMapOvr>
-    <a:masterClrMapping/>
-  </p:clrMapOvr>
-  <mc:AlternateContent xmlns:mc="http://schemas.openxmlformats.org/markup-compatibility/2006" xmlns:p14="http://schemas.microsoft.com/office/powerpoint/2010/main">
-    <mc:Choice Requires="p14">
-      <p:transition spd="med" p14:dur="700">
-        <p:fade/>
-      </p:transition>
-    </mc:Choice>
-    <mc:Fallback xmlns="">
-      <p:transition spd="med">
-        <p:fade/>
-      </p:transition>
-    </mc:Fallback>
-  </mc:AlternateContent>
-</p:sld>
-</file>
-
-<file path=ppt/slides/slide9.xml><?xml version="1.0" encoding="utf-8"?>
-<p:sld xmlns:a="http://schemas.openxmlformats.org/drawingml/2006/main" xmlns:r="http://schemas.openxmlformats.org/officeDocument/2006/relationships" xmlns:p="http://schemas.openxmlformats.org/presentationml/2006/main">
-  <p:cSld>
-    <p:spTree>
-      <p:nvGrpSpPr>
-        <p:cNvPr id="1" name="">
-          <a:extLst>
-            <a:ext uri="{FF2B5EF4-FFF2-40B4-BE49-F238E27FC236}">
-              <a16:creationId xmlns:a16="http://schemas.microsoft.com/office/drawing/2014/main" id="{2F91C23F-09DC-9233-2165-DCCEF50BE5EF}"/>
-            </a:ext>
-          </a:extLst>
-        </p:cNvPr>
-        <p:cNvGrpSpPr/>
-        <p:nvPr/>
-      </p:nvGrpSpPr>
-      <p:grpSpPr>
-        <a:xfrm>
-          <a:off x="0" y="0"/>
-          <a:ext cx="0" cy="0"/>
-          <a:chOff x="0" y="0"/>
-          <a:chExt cx="0" cy="0"/>
-        </a:xfrm>
-      </p:grpSpPr>
-      <p:sp>
-        <p:nvSpPr>
-          <p:cNvPr id="2" name="Title 1">
-            <a:extLst>
-              <a:ext uri="{FF2B5EF4-FFF2-40B4-BE49-F238E27FC236}">
-                <a16:creationId xmlns:a16="http://schemas.microsoft.com/office/drawing/2014/main" id="{33FE29A1-19D5-9891-001F-A67324EEB65B}"/>
-              </a:ext>
-            </a:extLst>
-          </p:cNvPr>
-          <p:cNvSpPr>
-            <a:spLocks noGrp="1"/>
-          </p:cNvSpPr>
-          <p:nvPr>
-            <p:ph type="title"/>
-          </p:nvPr>
-        </p:nvSpPr>
-        <p:spPr>
-          <a:xfrm>
-            <a:off x="1295400" y="503853"/>
-            <a:ext cx="9601200" cy="1142385"/>
-          </a:xfrm>
-        </p:spPr>
-        <p:txBody>
-          <a:bodyPr vert="horz" lIns="91440" tIns="45720" rIns="91440" bIns="45720" rtlCol="0" anchor="b">
-            <a:normAutofit/>
-          </a:bodyPr>
-          <a:lstStyle/>
-          <a:p>
-            <a:r>
-              <a:rPr lang="en-US" dirty="0"/>
-              <a:t>Managing Users and Groups</a:t>
-            </a:r>
-            <a:endParaRPr lang="en-US" b="1" kern="1200" dirty="0">
-              <a:latin typeface="+mj-lt"/>
-              <a:ea typeface="+mj-ea"/>
-              <a:cs typeface="+mj-cs"/>
-            </a:endParaRPr>
-          </a:p>
-        </p:txBody>
-      </p:sp>
-      <p:sp>
-        <p:nvSpPr>
-          <p:cNvPr id="8" name="TextBox 7">
-            <a:extLst>
-              <a:ext uri="{FF2B5EF4-FFF2-40B4-BE49-F238E27FC236}">
-                <a16:creationId xmlns:a16="http://schemas.microsoft.com/office/drawing/2014/main" id="{54101C3C-AE2D-59BE-BADD-EFA79B83ACF9}"/>
-              </a:ext>
-            </a:extLst>
-          </p:cNvPr>
-          <p:cNvSpPr txBox="1"/>
-          <p:nvPr/>
-        </p:nvSpPr>
-        <p:spPr>
-          <a:xfrm>
-            <a:off x="1295400" y="1981201"/>
-            <a:ext cx="9601200" cy="3809999"/>
-          </a:xfrm>
-          <a:prstGeom prst="rect">
-            <a:avLst/>
-          </a:prstGeom>
-        </p:spPr>
-        <p:txBody>
-          <a:bodyPr vert="horz" lIns="91440" tIns="45720" rIns="91440" bIns="45720" rtlCol="0">
-            <a:normAutofit/>
-          </a:bodyPr>
-          <a:lstStyle/>
-          <a:p>
-            <a:pPr marL="228600" indent="-228600">
+              <a:rPr lang="en-US" sz="1900" b="0" i="0" dirty="0">
+                <a:effectLst/>
+              </a:rPr>
+              <a:t>1024x768 or higher resolution display</a:t>
+            </a:r>
+          </a:p>
+          <a:p>
+            <a:pPr marL="228600" indent="-228600" fontAlgn="base">
               <a:lnSpc>
                 <a:spcPct val="90000"/>
               </a:lnSpc>
               <a:spcBef>
                 <a:spcPts val="1800"/>
               </a:spcBef>
+              <a:spcAft>
+                <a:spcPts val="600"/>
+              </a:spcAft>
               <a:buClr>
                 <a:schemeClr val="accent1">
                   <a:lumMod val="75000"/>
@@ -18821,39 +20424,23 @@
               <a:buChar char="▪"/>
             </a:pPr>
             <a:r>
-              <a:rPr lang="en-US" sz="2000" dirty="0"/>
-              <a:t>Add user: </a:t>
-            </a:r>
-            <a:r>
-              <a:rPr lang="en-US" sz="2000" dirty="0" err="1"/>
-              <a:t>sudo</a:t>
-            </a:r>
-            <a:r>
-              <a:rPr lang="en-US" sz="2000" dirty="0"/>
-              <a:t> </a:t>
-            </a:r>
-            <a:r>
-              <a:rPr lang="en-US" sz="2000" dirty="0" err="1"/>
-              <a:t>adduser</a:t>
-            </a:r>
-            <a:r>
-              <a:rPr lang="en-US" sz="2000" dirty="0"/>
-              <a:t> </a:t>
-            </a:r>
-            <a:r>
-              <a:rPr lang="en-US" sz="2000" dirty="0" err="1"/>
-              <a:t>newuser</a:t>
-            </a:r>
-            <a:endParaRPr lang="en-US" sz="2000" dirty="0"/>
-          </a:p>
-          <a:p>
-            <a:pPr marL="228600" indent="-228600">
+              <a:rPr lang="en-US" sz="1900" b="0" i="0" dirty="0">
+                <a:effectLst/>
+              </a:rPr>
+              <a:t>USB flash drive or DVD drive or for the installer media</a:t>
+            </a:r>
+          </a:p>
+          <a:p>
+            <a:pPr marL="228600" indent="-228600" fontAlgn="base">
               <a:lnSpc>
                 <a:spcPct val="90000"/>
               </a:lnSpc>
               <a:spcBef>
                 <a:spcPts val="1800"/>
               </a:spcBef>
+              <a:spcAft>
+                <a:spcPts val="600"/>
+              </a:spcAft>
               <a:buClr>
                 <a:schemeClr val="accent1">
                   <a:lumMod val="75000"/>
@@ -18864,152 +20451,44 @@
               <a:buChar char="▪"/>
             </a:pPr>
             <a:r>
-              <a:rPr lang="en-US" sz="2000" dirty="0"/>
-              <a:t>Delete user: </a:t>
-            </a:r>
-            <a:r>
-              <a:rPr lang="en-US" sz="2000" dirty="0" err="1"/>
-              <a:t>sudo</a:t>
-            </a:r>
-            <a:r>
-              <a:rPr lang="en-US" sz="2000" dirty="0"/>
-              <a:t> </a:t>
-            </a:r>
-            <a:r>
-              <a:rPr lang="en-US" sz="2000" dirty="0" err="1"/>
-              <a:t>deluser</a:t>
-            </a:r>
-            <a:r>
-              <a:rPr lang="en-US" sz="2000" dirty="0"/>
-              <a:t> </a:t>
-            </a:r>
-            <a:r>
-              <a:rPr lang="en-US" sz="2000" dirty="0" err="1"/>
-              <a:t>newuser</a:t>
-            </a:r>
-            <a:endParaRPr lang="en-US" sz="2000" dirty="0"/>
-          </a:p>
-          <a:p>
-            <a:pPr marL="228600" indent="-228600">
-              <a:lnSpc>
-                <a:spcPct val="90000"/>
-              </a:lnSpc>
-              <a:spcBef>
-                <a:spcPts val="1800"/>
-              </a:spcBef>
-              <a:buClr>
-                <a:schemeClr val="accent1">
-                  <a:lumMod val="75000"/>
-                </a:schemeClr>
-              </a:buClr>
-              <a:buSzPct val="100000"/>
-              <a:buFont typeface="Arial" pitchFamily="34" charset="0"/>
-              <a:buChar char="▪"/>
-            </a:pPr>
-            <a:r>
-              <a:rPr lang="en-US" sz="2000" dirty="0"/>
-              <a:t>Add group: </a:t>
-            </a:r>
-            <a:r>
-              <a:rPr lang="en-US" sz="2000" dirty="0" err="1"/>
-              <a:t>sudo</a:t>
-            </a:r>
-            <a:r>
-              <a:rPr lang="en-US" sz="2000" dirty="0"/>
-              <a:t> </a:t>
-            </a:r>
-            <a:r>
-              <a:rPr lang="en-US" sz="2000" dirty="0" err="1"/>
-              <a:t>addgroup</a:t>
-            </a:r>
-            <a:r>
-              <a:rPr lang="en-US" sz="2000" dirty="0"/>
-              <a:t> </a:t>
-            </a:r>
-            <a:r>
-              <a:rPr lang="en-US" sz="2000" dirty="0" err="1"/>
-              <a:t>devs</a:t>
-            </a:r>
-            <a:endParaRPr lang="en-US" sz="2000" dirty="0"/>
-          </a:p>
-          <a:p>
-            <a:pPr marL="228600" indent="-228600">
-              <a:lnSpc>
-                <a:spcPct val="90000"/>
-              </a:lnSpc>
-              <a:spcBef>
-                <a:spcPts val="1800"/>
-              </a:spcBef>
-              <a:buClr>
-                <a:schemeClr val="accent1">
-                  <a:lumMod val="75000"/>
-                </a:schemeClr>
-              </a:buClr>
-              <a:buSzPct val="100000"/>
-              <a:buFont typeface="Arial" pitchFamily="34" charset="0"/>
-              <a:buChar char="▪"/>
-            </a:pPr>
-            <a:r>
-              <a:rPr lang="en-US" sz="2000" dirty="0"/>
-              <a:t>Add user to group: </a:t>
-            </a:r>
-            <a:r>
-              <a:rPr lang="en-US" sz="2000" dirty="0" err="1"/>
-              <a:t>sudo</a:t>
-            </a:r>
-            <a:r>
-              <a:rPr lang="en-US" sz="2000" dirty="0"/>
-              <a:t> </a:t>
-            </a:r>
-            <a:r>
-              <a:rPr lang="en-US" sz="2000" dirty="0" err="1"/>
-              <a:t>usermod</a:t>
-            </a:r>
-            <a:r>
-              <a:rPr lang="en-US" sz="2000" dirty="0"/>
-              <a:t> -</a:t>
-            </a:r>
-            <a:r>
-              <a:rPr lang="en-US" sz="2000" dirty="0" err="1"/>
-              <a:t>aG</a:t>
-            </a:r>
-            <a:r>
-              <a:rPr lang="en-US" sz="2000" dirty="0"/>
-              <a:t> </a:t>
-            </a:r>
-            <a:r>
-              <a:rPr lang="en-US" sz="2000" dirty="0" err="1"/>
-              <a:t>devs</a:t>
-            </a:r>
-            <a:r>
-              <a:rPr lang="en-US" sz="2000" dirty="0"/>
-              <a:t> </a:t>
-            </a:r>
-            <a:r>
-              <a:rPr lang="en-US" sz="2000" dirty="0" err="1"/>
-              <a:t>newuser</a:t>
-            </a:r>
-            <a:endParaRPr lang="en-US" sz="2000" dirty="0"/>
+              <a:rPr lang="en-US" sz="1900" b="0" i="0" u="none" strike="noStrike" dirty="0">
+                <a:effectLst/>
+                <a:hlinkClick r:id="rId3">
+                  <a:extLst>
+                    <a:ext uri="{A12FA001-AC4F-418D-AE19-62706E023703}">
+                      <ahyp:hlinkClr xmlns:ahyp="http://schemas.microsoft.com/office/drawing/2018/hyperlinkcolor" val="tx"/>
+                    </a:ext>
+                  </a:extLst>
+                </a:hlinkClick>
+              </a:rPr>
+              <a:t>Internet access</a:t>
+            </a:r>
+            <a:r>
+              <a:rPr lang="en-US" sz="1900" b="0" i="0" dirty="0">
+                <a:effectLst/>
+              </a:rPr>
+              <a:t> is helpful</a:t>
+            </a:r>
           </a:p>
         </p:txBody>
       </p:sp>
     </p:spTree>
     <p:extLst>
       <p:ext uri="{BB962C8B-B14F-4D97-AF65-F5344CB8AC3E}">
-        <p14:creationId xmlns:p14="http://schemas.microsoft.com/office/powerpoint/2010/main" val="3572049542"/>
+        <p14:creationId xmlns:p14="http://schemas.microsoft.com/office/powerpoint/2010/main" val="3523105499"/>
       </p:ext>
     </p:extLst>
   </p:cSld>
   <p:clrMapOvr>
     <a:masterClrMapping/>
   </p:clrMapOvr>
-  <mc:AlternateContent xmlns:mc="http://schemas.openxmlformats.org/markup-compatibility/2006" xmlns:p14="http://schemas.microsoft.com/office/powerpoint/2010/main">
-    <mc:Choice Requires="p14">
+  <mc:AlternateContent xmlns:mc="http://schemas.openxmlformats.org/markup-compatibility/2006">
+    <mc:Choice xmlns:p14="http://schemas.microsoft.com/office/powerpoint/2010/main" Requires="p14">
       <p:transition spd="med" p14:dur="700">
         <p:fade/>
       </p:transition>
     </mc:Choice>
-    <mc:Fallback xmlns="">
+    <mc:Fallback>
       <p:transition spd="med">
         <p:fade/>
       </p:transition>

</xml_diff>